<commit_message>
Small increment: reviewed exercises series 1
</commit_message>
<xml_diff>
--- a/wiremock_workshop.pptx
+++ b/wiremock_workshop.pptx
@@ -26,11 +26,11 @@
     <p:sldId id="303" r:id="rId17"/>
     <p:sldId id="332" r:id="rId18"/>
     <p:sldId id="337" r:id="rId19"/>
-    <p:sldId id="306" r:id="rId20"/>
-    <p:sldId id="304" r:id="rId21"/>
-    <p:sldId id="305" r:id="rId22"/>
-    <p:sldId id="338" r:id="rId23"/>
-    <p:sldId id="294" r:id="rId24"/>
+    <p:sldId id="304" r:id="rId20"/>
+    <p:sldId id="305" r:id="rId21"/>
+    <p:sldId id="338" r:id="rId22"/>
+    <p:sldId id="294" r:id="rId23"/>
+    <p:sldId id="306" r:id="rId24"/>
     <p:sldId id="311" r:id="rId25"/>
     <p:sldId id="312" r:id="rId26"/>
     <p:sldId id="313" r:id="rId27"/>
@@ -150,6 +150,11 @@
       </a:defRPr>
     </a:lvl9pPr>
   </p:defaultTextStyle>
+  <p:extLst>
+    <p:ext uri="{EFAFB233-063F-42B5-8137-9DF3F51BA10A}">
+      <p15:sldGuideLst xmlns:p15="http://schemas.microsoft.com/office/powerpoint/2012/main"/>
+    </p:ext>
+  </p:extLst>
 </p:presentation>
 </file>
 
@@ -8437,7 +8442,7 @@
 
 <file path=ppt/slides/slide19.xml><?xml version="1.0" encoding="utf-8"?>
 <p:sld xmlns:a="http://schemas.openxmlformats.org/drawingml/2006/main" xmlns:r="http://schemas.openxmlformats.org/officeDocument/2006/relationships" xmlns:p="http://schemas.openxmlformats.org/presentationml/2006/main">
-  <p:cSld name="Slide51">
+  <p:cSld name="Slide49">
     <p:bg>
       <p:bgPr>
         <a:solidFill>
@@ -8465,7 +8470,7 @@
           <p:cNvPr id="2" name="Title 1">
             <a:extLst>
               <a:ext uri="{FF2B5EF4-FFF2-40B4-BE49-F238E27FC236}">
-                <a16:creationId xmlns:a16="http://schemas.microsoft.com/office/drawing/2014/main" id="{0508229A-D2A9-434E-8091-D7A818FB6F25}"/>
+                <a16:creationId xmlns:a16="http://schemas.microsoft.com/office/drawing/2014/main" id="{450DC844-D34E-4A15-B24A-BD92CE4155B3}"/>
               </a:ext>
             </a:extLst>
           </p:cNvPr>
@@ -8473,7 +8478,7 @@
             <a:spLocks noGrp="1"/>
           </p:cNvSpPr>
           <p:nvPr>
-            <p:ph type="ctrTitle"/>
+            <p:ph type="title"/>
           </p:nvPr>
         </p:nvSpPr>
         <p:spPr/>
@@ -8483,40 +8488,400 @@
           <a:p>
             <a:pPr lvl="0"/>
             <a:r>
-              <a:rPr lang="nl-NL" dirty="0">
-                <a:solidFill>
-                  <a:srgbClr val="00FF00"/>
-                </a:solidFill>
-                <a:latin typeface="Courier New" pitchFamily="49"/>
-                <a:cs typeface="Courier New" pitchFamily="49"/>
-              </a:rPr>
-              <a:t>CONTINUE HERE</a:t>
-            </a:r>
-          </a:p>
-        </p:txBody>
-      </p:sp>
-      <p:sp>
-        <p:nvSpPr>
-          <p:cNvPr id="5" name="Subtitle 4">
-            <a:extLst>
-              <a:ext uri="{FF2B5EF4-FFF2-40B4-BE49-F238E27FC236}">
-                <a16:creationId xmlns:a16="http://schemas.microsoft.com/office/drawing/2014/main" id="{6D5A54D7-7497-4294-9F70-89D29246BBA1}"/>
-              </a:ext>
-            </a:extLst>
-          </p:cNvPr>
-          <p:cNvSpPr>
+              <a:rPr lang="nl-NL">
+                <a:solidFill>
+                  <a:srgbClr val="00FF00"/>
+                </a:solidFill>
+                <a:latin typeface="Courier New" pitchFamily="49"/>
+                <a:cs typeface="Courier New" pitchFamily="49"/>
+              </a:rPr>
+              <a:t>Running WireMock standalone</a:t>
+            </a:r>
+          </a:p>
+        </p:txBody>
+      </p:sp>
+      <p:sp>
+        <p:nvSpPr>
+          <p:cNvPr id="3" name="Content Placeholder 2">
+            <a:extLst>
+              <a:ext uri="{FF2B5EF4-FFF2-40B4-BE49-F238E27FC236}">
+                <a16:creationId xmlns:a16="http://schemas.microsoft.com/office/drawing/2014/main" id="{7632527F-1C16-4F68-AE93-248FF13A1BFF}"/>
+              </a:ext>
+            </a:extLst>
+          </p:cNvPr>
+          <p:cNvSpPr txBox="1">
             <a:spLocks noGrp="1"/>
           </p:cNvSpPr>
           <p:nvPr>
-            <p:ph type="subTitle" idx="1"/>
+            <p:ph idx="1"/>
           </p:nvPr>
         </p:nvSpPr>
-        <p:spPr/>
-        <p:txBody>
-          <a:bodyPr/>
+        <p:spPr>
+          <a:xfrm>
+            <a:off x="838203" y="1825627"/>
+            <a:ext cx="11143893" cy="4351336"/>
+          </a:xfrm>
+        </p:spPr>
+        <p:txBody>
+          <a:bodyPr>
+            <a:normAutofit/>
+          </a:bodyPr>
           <a:lstStyle/>
           <a:p>
-            <a:endParaRPr lang="nl-NL"/>
+            <a:pPr lvl="0">
+              <a:buFont typeface="Courier New" pitchFamily="49"/>
+              <a:buChar char="_"/>
+            </a:pPr>
+            <a:r>
+              <a:rPr lang="nl-NL" dirty="0">
+                <a:solidFill>
+                  <a:srgbClr val="00FF00"/>
+                </a:solidFill>
+                <a:latin typeface="Courier New" pitchFamily="49"/>
+                <a:cs typeface="Courier New" pitchFamily="49"/>
+              </a:rPr>
+              <a:t>Start </a:t>
+            </a:r>
+            <a:r>
+              <a:rPr lang="nl-NL" dirty="0" err="1">
+                <a:solidFill>
+                  <a:srgbClr val="00FF00"/>
+                </a:solidFill>
+                <a:latin typeface="Courier New" pitchFamily="49"/>
+                <a:cs typeface="Courier New" pitchFamily="49"/>
+              </a:rPr>
+              <a:t>WireMock</a:t>
+            </a:r>
+            <a:r>
+              <a:rPr lang="nl-NL" dirty="0">
+                <a:solidFill>
+                  <a:srgbClr val="00FF00"/>
+                </a:solidFill>
+                <a:latin typeface="Courier New" pitchFamily="49"/>
+                <a:cs typeface="Courier New" pitchFamily="49"/>
+              </a:rPr>
+              <a:t> server</a:t>
+            </a:r>
+          </a:p>
+          <a:p>
+            <a:pPr lvl="1">
+              <a:buFont typeface="Courier New" pitchFamily="49"/>
+              <a:buChar char="_"/>
+            </a:pPr>
+            <a:r>
+              <a:rPr lang="nl-NL" dirty="0">
+                <a:solidFill>
+                  <a:srgbClr val="00FF00"/>
+                </a:solidFill>
+                <a:latin typeface="Courier New" pitchFamily="49"/>
+                <a:cs typeface="Courier New" pitchFamily="49"/>
+              </a:rPr>
+              <a:t>Options: port, </a:t>
+            </a:r>
+            <a:r>
+              <a:rPr lang="nl-NL" dirty="0" err="1">
+                <a:solidFill>
+                  <a:srgbClr val="00FF00"/>
+                </a:solidFill>
+                <a:latin typeface="Courier New" pitchFamily="49"/>
+                <a:cs typeface="Courier New" pitchFamily="49"/>
+              </a:rPr>
+              <a:t>keystore</a:t>
+            </a:r>
+            <a:r>
+              <a:rPr lang="nl-NL" dirty="0">
+                <a:solidFill>
+                  <a:srgbClr val="00FF00"/>
+                </a:solidFill>
+                <a:latin typeface="Courier New" pitchFamily="49"/>
+                <a:cs typeface="Courier New" pitchFamily="49"/>
+              </a:rPr>
+              <a:t>, ...</a:t>
+            </a:r>
+          </a:p>
+          <a:p>
+            <a:pPr lvl="0">
+              <a:buFont typeface="Courier New" pitchFamily="49"/>
+              <a:buChar char="_"/>
+            </a:pPr>
+            <a:endParaRPr lang="nl-NL" dirty="0">
+              <a:solidFill>
+                <a:srgbClr val="00FF00"/>
+              </a:solidFill>
+              <a:latin typeface="Courier New" pitchFamily="49"/>
+              <a:cs typeface="Courier New" pitchFamily="49"/>
+            </a:endParaRPr>
+          </a:p>
+          <a:p>
+            <a:pPr lvl="0">
+              <a:buFont typeface="Courier New" pitchFamily="49"/>
+              <a:buChar char="_"/>
+            </a:pPr>
+            <a:r>
+              <a:rPr lang="nl-NL" dirty="0">
+                <a:solidFill>
+                  <a:srgbClr val="00FF00"/>
+                </a:solidFill>
+                <a:latin typeface="Courier New" pitchFamily="49"/>
+                <a:cs typeface="Courier New" pitchFamily="49"/>
+              </a:rPr>
+              <a:t>Make </a:t>
+            </a:r>
+            <a:r>
+              <a:rPr lang="nl-NL" dirty="0" err="1">
+                <a:solidFill>
+                  <a:srgbClr val="00FF00"/>
+                </a:solidFill>
+                <a:latin typeface="Courier New" pitchFamily="49"/>
+                <a:cs typeface="Courier New" pitchFamily="49"/>
+              </a:rPr>
+              <a:t>mocks</a:t>
+            </a:r>
+            <a:r>
+              <a:rPr lang="nl-NL" dirty="0">
+                <a:solidFill>
+                  <a:srgbClr val="00FF00"/>
+                </a:solidFill>
+                <a:latin typeface="Courier New" pitchFamily="49"/>
+                <a:cs typeface="Courier New" pitchFamily="49"/>
+              </a:rPr>
+              <a:t> </a:t>
+            </a:r>
+            <a:r>
+              <a:rPr lang="nl-NL" dirty="0" err="1">
+                <a:solidFill>
+                  <a:srgbClr val="00FF00"/>
+                </a:solidFill>
+                <a:latin typeface="Courier New" pitchFamily="49"/>
+                <a:cs typeface="Courier New" pitchFamily="49"/>
+              </a:rPr>
+              <a:t>permanently</a:t>
+            </a:r>
+            <a:r>
+              <a:rPr lang="nl-NL" dirty="0">
+                <a:solidFill>
+                  <a:srgbClr val="00FF00"/>
+                </a:solidFill>
+                <a:latin typeface="Courier New" pitchFamily="49"/>
+                <a:cs typeface="Courier New" pitchFamily="49"/>
+              </a:rPr>
+              <a:t> </a:t>
+            </a:r>
+            <a:r>
+              <a:rPr lang="nl-NL" dirty="0" err="1">
+                <a:solidFill>
+                  <a:srgbClr val="00FF00"/>
+                </a:solidFill>
+                <a:latin typeface="Courier New" pitchFamily="49"/>
+                <a:cs typeface="Courier New" pitchFamily="49"/>
+              </a:rPr>
+              <a:t>available</a:t>
+            </a:r>
+            <a:endParaRPr lang="nl-NL" dirty="0">
+              <a:solidFill>
+                <a:srgbClr val="00FF00"/>
+              </a:solidFill>
+              <a:latin typeface="Courier New" pitchFamily="49"/>
+              <a:cs typeface="Courier New" pitchFamily="49"/>
+            </a:endParaRPr>
+          </a:p>
+          <a:p>
+            <a:pPr lvl="1">
+              <a:buFont typeface="Courier New" pitchFamily="49"/>
+              <a:buChar char="_"/>
+            </a:pPr>
+            <a:r>
+              <a:rPr lang="nl-NL" dirty="0">
+                <a:solidFill>
+                  <a:srgbClr val="00FF00"/>
+                </a:solidFill>
+                <a:latin typeface="Courier New" pitchFamily="49"/>
+                <a:cs typeface="Courier New" pitchFamily="49"/>
+              </a:rPr>
+              <a:t>For </a:t>
+            </a:r>
+            <a:r>
+              <a:rPr lang="nl-NL" dirty="0" err="1">
+                <a:solidFill>
+                  <a:srgbClr val="00FF00"/>
+                </a:solidFill>
+                <a:latin typeface="Courier New" pitchFamily="49"/>
+                <a:cs typeface="Courier New" pitchFamily="49"/>
+              </a:rPr>
+              <a:t>example</a:t>
+            </a:r>
+            <a:r>
+              <a:rPr lang="nl-NL" dirty="0">
+                <a:solidFill>
+                  <a:srgbClr val="00FF00"/>
+                </a:solidFill>
+                <a:latin typeface="Courier New" pitchFamily="49"/>
+                <a:cs typeface="Courier New" pitchFamily="49"/>
+              </a:rPr>
+              <a:t> </a:t>
+            </a:r>
+            <a:r>
+              <a:rPr lang="nl-NL" dirty="0" err="1">
+                <a:solidFill>
+                  <a:srgbClr val="00FF00"/>
+                </a:solidFill>
+                <a:latin typeface="Courier New" pitchFamily="49"/>
+                <a:cs typeface="Courier New" pitchFamily="49"/>
+              </a:rPr>
+              <a:t>for</a:t>
+            </a:r>
+            <a:r>
+              <a:rPr lang="nl-NL" dirty="0">
+                <a:solidFill>
+                  <a:srgbClr val="00FF00"/>
+                </a:solidFill>
+                <a:latin typeface="Courier New" pitchFamily="49"/>
+                <a:cs typeface="Courier New" pitchFamily="49"/>
+              </a:rPr>
+              <a:t> multiple teams</a:t>
+            </a:r>
+          </a:p>
+          <a:p>
+            <a:pPr lvl="0">
+              <a:buFont typeface="Courier New" pitchFamily="49"/>
+              <a:buChar char="_"/>
+            </a:pPr>
+            <a:endParaRPr lang="nl-NL" dirty="0">
+              <a:solidFill>
+                <a:srgbClr val="00FF00"/>
+              </a:solidFill>
+              <a:latin typeface="Courier New" pitchFamily="49"/>
+              <a:cs typeface="Courier New" pitchFamily="49"/>
+            </a:endParaRPr>
+          </a:p>
+          <a:p>
+            <a:pPr lvl="0">
+              <a:buFont typeface="Courier New" pitchFamily="49"/>
+              <a:buChar char="_"/>
+            </a:pPr>
+            <a:r>
+              <a:rPr lang="nl-NL" dirty="0" err="1">
+                <a:solidFill>
+                  <a:srgbClr val="00FF00"/>
+                </a:solidFill>
+                <a:latin typeface="Courier New" pitchFamily="49"/>
+                <a:cs typeface="Courier New" pitchFamily="49"/>
+              </a:rPr>
+              <a:t>Reconfigure</a:t>
+            </a:r>
+            <a:r>
+              <a:rPr lang="nl-NL" dirty="0">
+                <a:solidFill>
+                  <a:srgbClr val="00FF00"/>
+                </a:solidFill>
+                <a:latin typeface="Courier New" pitchFamily="49"/>
+                <a:cs typeface="Courier New" pitchFamily="49"/>
+              </a:rPr>
+              <a:t> </a:t>
+            </a:r>
+            <a:r>
+              <a:rPr lang="nl-NL" dirty="0" err="1">
+                <a:solidFill>
+                  <a:srgbClr val="00FF00"/>
+                </a:solidFill>
+                <a:latin typeface="Courier New" pitchFamily="49"/>
+                <a:cs typeface="Courier New" pitchFamily="49"/>
+              </a:rPr>
+              <a:t>mocks</a:t>
+            </a:r>
+            <a:r>
+              <a:rPr lang="nl-NL" dirty="0">
+                <a:solidFill>
+                  <a:srgbClr val="00FF00"/>
+                </a:solidFill>
+                <a:latin typeface="Courier New" pitchFamily="49"/>
+                <a:cs typeface="Courier New" pitchFamily="49"/>
+              </a:rPr>
+              <a:t> via JSON</a:t>
+            </a:r>
+          </a:p>
+          <a:p>
+            <a:pPr marL="0" lvl="0" indent="0">
+              <a:buNone/>
+            </a:pPr>
+            <a:endParaRPr lang="nl-NL" dirty="0">
+              <a:solidFill>
+                <a:srgbClr val="00FF00"/>
+              </a:solidFill>
+              <a:latin typeface="Courier New" pitchFamily="49"/>
+              <a:cs typeface="Courier New" pitchFamily="49"/>
+            </a:endParaRPr>
+          </a:p>
+          <a:p>
+            <a:pPr marL="0" lvl="0" indent="0">
+              <a:buNone/>
+            </a:pPr>
+            <a:r>
+              <a:rPr lang="nl-NL" sz="2400" i="1" dirty="0" err="1">
+                <a:solidFill>
+                  <a:srgbClr val="00FF00"/>
+                </a:solidFill>
+                <a:latin typeface="Courier New" pitchFamily="49"/>
+                <a:cs typeface="Courier New" pitchFamily="49"/>
+              </a:rPr>
+              <a:t>java</a:t>
+            </a:r>
+            <a:r>
+              <a:rPr lang="nl-NL" sz="2400" i="1" dirty="0">
+                <a:solidFill>
+                  <a:srgbClr val="00FF00"/>
+                </a:solidFill>
+                <a:latin typeface="Courier New" pitchFamily="49"/>
+                <a:cs typeface="Courier New" pitchFamily="49"/>
+              </a:rPr>
+              <a:t> -</a:t>
+            </a:r>
+            <a:r>
+              <a:rPr lang="nl-NL" sz="2400" i="1" dirty="0" err="1">
+                <a:solidFill>
+                  <a:srgbClr val="00FF00"/>
+                </a:solidFill>
+                <a:latin typeface="Courier New" pitchFamily="49"/>
+                <a:cs typeface="Courier New" pitchFamily="49"/>
+              </a:rPr>
+              <a:t>jar</a:t>
+            </a:r>
+            <a:r>
+              <a:rPr lang="nl-NL" sz="2400" i="1" dirty="0">
+                <a:solidFill>
+                  <a:srgbClr val="00FF00"/>
+                </a:solidFill>
+                <a:latin typeface="Courier New" pitchFamily="49"/>
+                <a:cs typeface="Courier New" pitchFamily="49"/>
+              </a:rPr>
+              <a:t> wiremock-standalone-2.18.0.jar --port 9876</a:t>
+            </a:r>
+          </a:p>
+          <a:p>
+            <a:pPr lvl="0">
+              <a:buFont typeface="Courier New" pitchFamily="49"/>
+              <a:buChar char="_"/>
+            </a:pPr>
+            <a:endParaRPr lang="nl-NL" dirty="0">
+              <a:solidFill>
+                <a:srgbClr val="00FF00"/>
+              </a:solidFill>
+              <a:latin typeface="Courier New" pitchFamily="49"/>
+              <a:cs typeface="Courier New" pitchFamily="49"/>
+            </a:endParaRPr>
+          </a:p>
+          <a:p>
+            <a:pPr lvl="0">
+              <a:buFont typeface="Courier New" pitchFamily="49"/>
+              <a:buChar char="_"/>
+            </a:pPr>
+            <a:endParaRPr lang="nl-NL" dirty="0">
+              <a:solidFill>
+                <a:srgbClr val="00FF00"/>
+              </a:solidFill>
+              <a:latin typeface="Courier New" pitchFamily="49"/>
+              <a:cs typeface="Courier New" pitchFamily="49"/>
+            </a:endParaRPr>
           </a:p>
         </p:txBody>
       </p:sp>
@@ -8694,267 +9059,6 @@
 
 <file path=ppt/slides/slide20.xml><?xml version="1.0" encoding="utf-8"?>
 <p:sld xmlns:a="http://schemas.openxmlformats.org/drawingml/2006/main" xmlns:r="http://schemas.openxmlformats.org/officeDocument/2006/relationships" xmlns:p="http://schemas.openxmlformats.org/presentationml/2006/main">
-  <p:cSld name="Slide49">
-    <p:bg>
-      <p:bgPr>
-        <a:solidFill>
-          <a:srgbClr val="000000"/>
-        </a:solidFill>
-        <a:effectLst/>
-      </p:bgPr>
-    </p:bg>
-    <p:spTree>
-      <p:nvGrpSpPr>
-        <p:cNvPr id="1" name=""/>
-        <p:cNvGrpSpPr/>
-        <p:nvPr/>
-      </p:nvGrpSpPr>
-      <p:grpSpPr>
-        <a:xfrm>
-          <a:off x="0" y="0"/>
-          <a:ext cx="0" cy="0"/>
-          <a:chOff x="0" y="0"/>
-          <a:chExt cx="0" cy="0"/>
-        </a:xfrm>
-      </p:grpSpPr>
-      <p:sp>
-        <p:nvSpPr>
-          <p:cNvPr id="2" name="Title 1">
-            <a:extLst>
-              <a:ext uri="{FF2B5EF4-FFF2-40B4-BE49-F238E27FC236}">
-                <a16:creationId xmlns:a16="http://schemas.microsoft.com/office/drawing/2014/main" id="{450DC844-D34E-4A15-B24A-BD92CE4155B3}"/>
-              </a:ext>
-            </a:extLst>
-          </p:cNvPr>
-          <p:cNvSpPr txBox="1">
-            <a:spLocks noGrp="1"/>
-          </p:cNvSpPr>
-          <p:nvPr>
-            <p:ph type="title"/>
-          </p:nvPr>
-        </p:nvSpPr>
-        <p:spPr/>
-        <p:txBody>
-          <a:bodyPr/>
-          <a:lstStyle/>
-          <a:p>
-            <a:pPr lvl="0"/>
-            <a:r>
-              <a:rPr lang="nl-NL">
-                <a:solidFill>
-                  <a:srgbClr val="00FF00"/>
-                </a:solidFill>
-                <a:latin typeface="Courier New" pitchFamily="49"/>
-                <a:cs typeface="Courier New" pitchFamily="49"/>
-              </a:rPr>
-              <a:t>Running WireMock standalone</a:t>
-            </a:r>
-          </a:p>
-        </p:txBody>
-      </p:sp>
-      <p:sp>
-        <p:nvSpPr>
-          <p:cNvPr id="3" name="Content Placeholder 2">
-            <a:extLst>
-              <a:ext uri="{FF2B5EF4-FFF2-40B4-BE49-F238E27FC236}">
-                <a16:creationId xmlns:a16="http://schemas.microsoft.com/office/drawing/2014/main" id="{7632527F-1C16-4F68-AE93-248FF13A1BFF}"/>
-              </a:ext>
-            </a:extLst>
-          </p:cNvPr>
-          <p:cNvSpPr txBox="1">
-            <a:spLocks noGrp="1"/>
-          </p:cNvSpPr>
-          <p:nvPr>
-            <p:ph idx="1"/>
-          </p:nvPr>
-        </p:nvSpPr>
-        <p:spPr>
-          <a:xfrm>
-            <a:off x="838203" y="1825627"/>
-            <a:ext cx="11143893" cy="4351336"/>
-          </a:xfrm>
-        </p:spPr>
-        <p:txBody>
-          <a:bodyPr/>
-          <a:lstStyle/>
-          <a:p>
-            <a:pPr lvl="0">
-              <a:buFont typeface="Courier New" pitchFamily="49"/>
-              <a:buChar char="_"/>
-            </a:pPr>
-            <a:r>
-              <a:rPr lang="nl-NL">
-                <a:solidFill>
-                  <a:srgbClr val="00FF00"/>
-                </a:solidFill>
-                <a:latin typeface="Courier New" pitchFamily="49"/>
-                <a:cs typeface="Courier New" pitchFamily="49"/>
-              </a:rPr>
-              <a:t>Start WireMock server</a:t>
-            </a:r>
-          </a:p>
-          <a:p>
-            <a:pPr lvl="1">
-              <a:buFont typeface="Courier New" pitchFamily="49"/>
-              <a:buChar char="_"/>
-            </a:pPr>
-            <a:r>
-              <a:rPr lang="nl-NL">
-                <a:solidFill>
-                  <a:srgbClr val="00FF00"/>
-                </a:solidFill>
-                <a:latin typeface="Courier New" pitchFamily="49"/>
-                <a:cs typeface="Courier New" pitchFamily="49"/>
-              </a:rPr>
-              <a:t>Options: port, keystore, ...</a:t>
-            </a:r>
-          </a:p>
-          <a:p>
-            <a:pPr lvl="0">
-              <a:buFont typeface="Courier New" pitchFamily="49"/>
-              <a:buChar char="_"/>
-            </a:pPr>
-            <a:endParaRPr lang="nl-NL">
-              <a:solidFill>
-                <a:srgbClr val="00FF00"/>
-              </a:solidFill>
-              <a:latin typeface="Courier New" pitchFamily="49"/>
-              <a:cs typeface="Courier New" pitchFamily="49"/>
-            </a:endParaRPr>
-          </a:p>
-          <a:p>
-            <a:pPr lvl="0">
-              <a:buFont typeface="Courier New" pitchFamily="49"/>
-              <a:buChar char="_"/>
-            </a:pPr>
-            <a:r>
-              <a:rPr lang="nl-NL">
-                <a:solidFill>
-                  <a:srgbClr val="00FF00"/>
-                </a:solidFill>
-                <a:latin typeface="Courier New" pitchFamily="49"/>
-                <a:cs typeface="Courier New" pitchFamily="49"/>
-              </a:rPr>
-              <a:t>Make mocks permanently available</a:t>
-            </a:r>
-          </a:p>
-          <a:p>
-            <a:pPr lvl="1">
-              <a:buFont typeface="Courier New" pitchFamily="49"/>
-              <a:buChar char="_"/>
-            </a:pPr>
-            <a:r>
-              <a:rPr lang="nl-NL">
-                <a:solidFill>
-                  <a:srgbClr val="00FF00"/>
-                </a:solidFill>
-                <a:latin typeface="Courier New" pitchFamily="49"/>
-                <a:cs typeface="Courier New" pitchFamily="49"/>
-              </a:rPr>
-              <a:t>For example for multiple teams</a:t>
-            </a:r>
-          </a:p>
-          <a:p>
-            <a:pPr lvl="0">
-              <a:buFont typeface="Courier New" pitchFamily="49"/>
-              <a:buChar char="_"/>
-            </a:pPr>
-            <a:endParaRPr lang="nl-NL">
-              <a:solidFill>
-                <a:srgbClr val="00FF00"/>
-              </a:solidFill>
-              <a:latin typeface="Courier New" pitchFamily="49"/>
-              <a:cs typeface="Courier New" pitchFamily="49"/>
-            </a:endParaRPr>
-          </a:p>
-          <a:p>
-            <a:pPr lvl="0">
-              <a:buFont typeface="Courier New" pitchFamily="49"/>
-              <a:buChar char="_"/>
-            </a:pPr>
-            <a:r>
-              <a:rPr lang="nl-NL">
-                <a:solidFill>
-                  <a:srgbClr val="00FF00"/>
-                </a:solidFill>
-                <a:latin typeface="Courier New" pitchFamily="49"/>
-                <a:cs typeface="Courier New" pitchFamily="49"/>
-              </a:rPr>
-              <a:t>Reconfigure mocks via JSON</a:t>
-            </a:r>
-          </a:p>
-          <a:p>
-            <a:pPr lvl="0">
-              <a:buFont typeface="Courier New" pitchFamily="49"/>
-              <a:buChar char="_"/>
-            </a:pPr>
-            <a:endParaRPr lang="nl-NL">
-              <a:solidFill>
-                <a:srgbClr val="00FF00"/>
-              </a:solidFill>
-              <a:latin typeface="Courier New" pitchFamily="49"/>
-              <a:cs typeface="Courier New" pitchFamily="49"/>
-            </a:endParaRPr>
-          </a:p>
-          <a:p>
-            <a:pPr lvl="0">
-              <a:buFont typeface="Courier New" pitchFamily="49"/>
-              <a:buChar char="_"/>
-            </a:pPr>
-            <a:endParaRPr lang="nl-NL">
-              <a:solidFill>
-                <a:srgbClr val="00FF00"/>
-              </a:solidFill>
-              <a:latin typeface="Courier New" pitchFamily="49"/>
-              <a:cs typeface="Courier New" pitchFamily="49"/>
-            </a:endParaRPr>
-          </a:p>
-        </p:txBody>
-      </p:sp>
-      <p:pic>
-        <p:nvPicPr>
-          <p:cNvPr id="4" name="Picture 3">
-            <a:extLst>
-              <a:ext uri="{FF2B5EF4-FFF2-40B4-BE49-F238E27FC236}">
-                <a16:creationId xmlns:a16="http://schemas.microsoft.com/office/drawing/2014/main" id="{62BBA2EA-CE71-4754-99ED-031C71497E91}"/>
-              </a:ext>
-            </a:extLst>
-          </p:cNvPr>
-          <p:cNvPicPr>
-            <a:picLocks noChangeAspect="1"/>
-          </p:cNvPicPr>
-          <p:nvPr/>
-        </p:nvPicPr>
-        <p:blipFill>
-          <a:blip r:embed="rId2"/>
-          <a:stretch>
-            <a:fillRect/>
-          </a:stretch>
-        </p:blipFill>
-        <p:spPr>
-          <a:xfrm>
-            <a:off x="196431" y="5668082"/>
-            <a:ext cx="11785665" cy="508881"/>
-          </a:xfrm>
-          <a:prstGeom prst="rect">
-            <a:avLst/>
-          </a:prstGeom>
-          <a:noFill/>
-          <a:ln cap="flat">
-            <a:noFill/>
-          </a:ln>
-        </p:spPr>
-      </p:pic>
-    </p:spTree>
-  </p:cSld>
-  <p:clrMapOvr>
-    <a:masterClrMapping/>
-  </p:clrMapOvr>
-</p:sld>
-</file>
-
-<file path=ppt/slides/slide21.xml><?xml version="1.0" encoding="utf-8"?>
-<p:sld xmlns:a="http://schemas.openxmlformats.org/drawingml/2006/main" xmlns:r="http://schemas.openxmlformats.org/officeDocument/2006/relationships" xmlns:p="http://schemas.openxmlformats.org/presentationml/2006/main">
   <p:cSld name="Slide50">
     <p:bg>
       <p:bgPr>
@@ -9047,15 +9151,32 @@
               <a:buChar char="_"/>
             </a:pPr>
             <a:r>
-              <a:rPr lang="nl-NL">
-                <a:solidFill>
-                  <a:srgbClr val="00FF00"/>
-                </a:solidFill>
-                <a:latin typeface="Courier New" pitchFamily="49"/>
-                <a:cs typeface="Courier New" pitchFamily="49"/>
-              </a:rPr>
-              <a:t>Integration in test execution</a:t>
-            </a:r>
+              <a:rPr lang="nl-NL" dirty="0">
+                <a:solidFill>
+                  <a:srgbClr val="00FF00"/>
+                </a:solidFill>
+                <a:latin typeface="Courier New" pitchFamily="49"/>
+                <a:cs typeface="Courier New" pitchFamily="49"/>
+              </a:rPr>
+              <a:t>Integration in test </a:t>
+            </a:r>
+            <a:r>
+              <a:rPr lang="nl-NL" dirty="0" err="1">
+                <a:solidFill>
+                  <a:srgbClr val="00FF00"/>
+                </a:solidFill>
+                <a:latin typeface="Courier New" pitchFamily="49"/>
+                <a:cs typeface="Courier New" pitchFamily="49"/>
+              </a:rPr>
+              <a:t>execution</a:t>
+            </a:r>
+            <a:endParaRPr lang="nl-NL" dirty="0">
+              <a:solidFill>
+                <a:srgbClr val="00FF00"/>
+              </a:solidFill>
+              <a:latin typeface="Courier New" pitchFamily="49"/>
+              <a:cs typeface="Courier New" pitchFamily="49"/>
+            </a:endParaRPr>
           </a:p>
           <a:p>
             <a:pPr lvl="0">
@@ -9065,7 +9186,7 @@
               <a:buFont typeface="Courier New" pitchFamily="49"/>
               <a:buChar char="_"/>
             </a:pPr>
-            <a:endParaRPr lang="nl-NL">
+            <a:endParaRPr lang="nl-NL" dirty="0">
               <a:solidFill>
                 <a:srgbClr val="00FF00"/>
               </a:solidFill>
@@ -9082,14 +9203,34 @@
               <a:buChar char="_"/>
             </a:pPr>
             <a:r>
-              <a:rPr lang="nl-NL">
-                <a:solidFill>
-                  <a:srgbClr val="00FF00"/>
-                </a:solidFill>
-                <a:latin typeface="Courier New" pitchFamily="49"/>
-                <a:cs typeface="Courier New" pitchFamily="49"/>
-              </a:rPr>
-              <a:t>Mocks in version control (Git, etc.)</a:t>
+              <a:rPr lang="nl-NL" dirty="0">
+                <a:solidFill>
+                  <a:srgbClr val="00FF00"/>
+                </a:solidFill>
+                <a:latin typeface="Courier New" pitchFamily="49"/>
+                <a:cs typeface="Courier New" pitchFamily="49"/>
+              </a:rPr>
+              <a:t>Mocks in </a:t>
+            </a:r>
+            <a:r>
+              <a:rPr lang="nl-NL" dirty="0" err="1">
+                <a:solidFill>
+                  <a:srgbClr val="00FF00"/>
+                </a:solidFill>
+                <a:latin typeface="Courier New" pitchFamily="49"/>
+                <a:cs typeface="Courier New" pitchFamily="49"/>
+              </a:rPr>
+              <a:t>version</a:t>
+            </a:r>
+            <a:r>
+              <a:rPr lang="nl-NL" dirty="0">
+                <a:solidFill>
+                  <a:srgbClr val="00FF00"/>
+                </a:solidFill>
+                <a:latin typeface="Courier New" pitchFamily="49"/>
+                <a:cs typeface="Courier New" pitchFamily="49"/>
+              </a:rPr>
+              <a:t> control (Git, etc.)</a:t>
             </a:r>
           </a:p>
           <a:p>
@@ -9100,7 +9241,7 @@
               <a:buFont typeface="Courier New" pitchFamily="49"/>
               <a:buChar char="_"/>
             </a:pPr>
-            <a:endParaRPr lang="nl-NL">
+            <a:endParaRPr lang="nl-NL" dirty="0">
               <a:solidFill>
                 <a:srgbClr val="00FF00"/>
               </a:solidFill>
@@ -9117,15 +9258,102 @@
               <a:buChar char="_"/>
             </a:pPr>
             <a:r>
-              <a:rPr lang="nl-NL">
-                <a:solidFill>
-                  <a:srgbClr val="00FF00"/>
-                </a:solidFill>
-                <a:latin typeface="Courier New" pitchFamily="49"/>
-                <a:cs typeface="Courier New" pitchFamily="49"/>
-              </a:rPr>
-              <a:t>JUnit integration</a:t>
-            </a:r>
+              <a:rPr lang="nl-NL" dirty="0" err="1">
+                <a:solidFill>
+                  <a:srgbClr val="00FF00"/>
+                </a:solidFill>
+                <a:latin typeface="Courier New" pitchFamily="49"/>
+                <a:cs typeface="Courier New" pitchFamily="49"/>
+              </a:rPr>
+              <a:t>JUnit</a:t>
+            </a:r>
+            <a:r>
+              <a:rPr lang="nl-NL" dirty="0">
+                <a:solidFill>
+                  <a:srgbClr val="00FF00"/>
+                </a:solidFill>
+                <a:latin typeface="Courier New" pitchFamily="49"/>
+                <a:cs typeface="Courier New" pitchFamily="49"/>
+              </a:rPr>
+              <a:t> </a:t>
+            </a:r>
+            <a:r>
+              <a:rPr lang="nl-NL" dirty="0" err="1">
+                <a:solidFill>
+                  <a:srgbClr val="00FF00"/>
+                </a:solidFill>
+                <a:latin typeface="Courier New" pitchFamily="49"/>
+                <a:cs typeface="Courier New" pitchFamily="49"/>
+              </a:rPr>
+              <a:t>integration</a:t>
+            </a:r>
+            <a:r>
+              <a:rPr lang="nl-NL" dirty="0">
+                <a:solidFill>
+                  <a:srgbClr val="00FF00"/>
+                </a:solidFill>
+                <a:latin typeface="Courier New" pitchFamily="49"/>
+                <a:cs typeface="Courier New" pitchFamily="49"/>
+              </a:rPr>
+              <a:t> </a:t>
+            </a:r>
+            <a:r>
+              <a:rPr lang="nl-NL" dirty="0" err="1">
+                <a:solidFill>
+                  <a:srgbClr val="00FF00"/>
+                </a:solidFill>
+                <a:latin typeface="Courier New" pitchFamily="49"/>
+                <a:cs typeface="Courier New" pitchFamily="49"/>
+              </a:rPr>
+              <a:t>using</a:t>
+            </a:r>
+            <a:r>
+              <a:rPr lang="nl-NL" dirty="0">
+                <a:solidFill>
+                  <a:srgbClr val="00FF00"/>
+                </a:solidFill>
+                <a:latin typeface="Courier New" pitchFamily="49"/>
+                <a:cs typeface="Courier New" pitchFamily="49"/>
+              </a:rPr>
+              <a:t> @</a:t>
+            </a:r>
+            <a:r>
+              <a:rPr lang="nl-NL" dirty="0" err="1">
+                <a:solidFill>
+                  <a:srgbClr val="00FF00"/>
+                </a:solidFill>
+                <a:latin typeface="Courier New" pitchFamily="49"/>
+                <a:cs typeface="Courier New" pitchFamily="49"/>
+              </a:rPr>
+              <a:t>Rule</a:t>
+            </a:r>
+            <a:r>
+              <a:rPr lang="nl-NL" dirty="0">
+                <a:solidFill>
+                  <a:srgbClr val="00FF00"/>
+                </a:solidFill>
+                <a:latin typeface="Courier New" pitchFamily="49"/>
+                <a:cs typeface="Courier New" pitchFamily="49"/>
+              </a:rPr>
+              <a:t> </a:t>
+            </a:r>
+            <a:r>
+              <a:rPr lang="nl-NL" dirty="0" err="1">
+                <a:solidFill>
+                  <a:srgbClr val="00FF00"/>
+                </a:solidFill>
+                <a:latin typeface="Courier New" pitchFamily="49"/>
+                <a:cs typeface="Courier New" pitchFamily="49"/>
+              </a:rPr>
+              <a:t>annotation</a:t>
+            </a:r>
+            <a:endParaRPr lang="nl-NL" dirty="0">
+              <a:solidFill>
+                <a:srgbClr val="00FF00"/>
+              </a:solidFill>
+              <a:latin typeface="Courier New" pitchFamily="49"/>
+              <a:cs typeface="Courier New" pitchFamily="49"/>
+            </a:endParaRPr>
           </a:p>
           <a:p>
             <a:pPr lvl="0">
@@ -9135,7 +9363,7 @@
               <a:buFont typeface="Courier New" pitchFamily="49"/>
               <a:buChar char="_"/>
             </a:pPr>
-            <a:endParaRPr lang="nl-NL">
+            <a:endParaRPr lang="nl-NL" dirty="0">
               <a:solidFill>
                 <a:srgbClr val="00FF00"/>
               </a:solidFill>
@@ -9151,7 +9379,7 @@
               <a:buFont typeface="Courier New" pitchFamily="49"/>
               <a:buChar char="_"/>
             </a:pPr>
-            <a:endParaRPr lang="nl-NL">
+            <a:endParaRPr lang="nl-NL" dirty="0">
               <a:solidFill>
                 <a:srgbClr val="00FF00"/>
               </a:solidFill>
@@ -9167,7 +9395,7 @@
               <a:buFont typeface="Courier New" pitchFamily="49"/>
               <a:buChar char="_"/>
             </a:pPr>
-            <a:endParaRPr lang="nl-NL">
+            <a:endParaRPr lang="nl-NL" dirty="0">
               <a:solidFill>
                 <a:srgbClr val="00FF00"/>
               </a:solidFill>
@@ -9184,14 +9412,144 @@
               <a:buChar char="_"/>
             </a:pPr>
             <a:r>
-              <a:rPr lang="nl-NL">
-                <a:solidFill>
-                  <a:srgbClr val="00FF00"/>
-                </a:solidFill>
-                <a:latin typeface="Courier New" pitchFamily="49"/>
-                <a:cs typeface="Courier New" pitchFamily="49"/>
-              </a:rPr>
-              <a:t>Can be used without having to use JUnit as well</a:t>
+              <a:rPr lang="nl-NL" dirty="0" err="1">
+                <a:solidFill>
+                  <a:srgbClr val="00FF00"/>
+                </a:solidFill>
+                <a:latin typeface="Courier New" pitchFamily="49"/>
+                <a:cs typeface="Courier New" pitchFamily="49"/>
+              </a:rPr>
+              <a:t>Can</a:t>
+            </a:r>
+            <a:r>
+              <a:rPr lang="nl-NL" dirty="0">
+                <a:solidFill>
+                  <a:srgbClr val="00FF00"/>
+                </a:solidFill>
+                <a:latin typeface="Courier New" pitchFamily="49"/>
+                <a:cs typeface="Courier New" pitchFamily="49"/>
+              </a:rPr>
+              <a:t> </a:t>
+            </a:r>
+            <a:r>
+              <a:rPr lang="nl-NL" dirty="0" err="1">
+                <a:solidFill>
+                  <a:srgbClr val="00FF00"/>
+                </a:solidFill>
+                <a:latin typeface="Courier New" pitchFamily="49"/>
+                <a:cs typeface="Courier New" pitchFamily="49"/>
+              </a:rPr>
+              <a:t>be</a:t>
+            </a:r>
+            <a:r>
+              <a:rPr lang="nl-NL" dirty="0">
+                <a:solidFill>
+                  <a:srgbClr val="00FF00"/>
+                </a:solidFill>
+                <a:latin typeface="Courier New" pitchFamily="49"/>
+                <a:cs typeface="Courier New" pitchFamily="49"/>
+              </a:rPr>
+              <a:t> </a:t>
+            </a:r>
+            <a:r>
+              <a:rPr lang="nl-NL" dirty="0" err="1">
+                <a:solidFill>
+                  <a:srgbClr val="00FF00"/>
+                </a:solidFill>
+                <a:latin typeface="Courier New" pitchFamily="49"/>
+                <a:cs typeface="Courier New" pitchFamily="49"/>
+              </a:rPr>
+              <a:t>used</a:t>
+            </a:r>
+            <a:r>
+              <a:rPr lang="nl-NL" dirty="0">
+                <a:solidFill>
+                  <a:srgbClr val="00FF00"/>
+                </a:solidFill>
+                <a:latin typeface="Courier New" pitchFamily="49"/>
+                <a:cs typeface="Courier New" pitchFamily="49"/>
+              </a:rPr>
+              <a:t> without </a:t>
+            </a:r>
+            <a:r>
+              <a:rPr lang="nl-NL" dirty="0" err="1">
+                <a:solidFill>
+                  <a:srgbClr val="00FF00"/>
+                </a:solidFill>
+                <a:latin typeface="Courier New" pitchFamily="49"/>
+                <a:cs typeface="Courier New" pitchFamily="49"/>
+              </a:rPr>
+              <a:t>having</a:t>
+            </a:r>
+            <a:r>
+              <a:rPr lang="nl-NL" dirty="0">
+                <a:solidFill>
+                  <a:srgbClr val="00FF00"/>
+                </a:solidFill>
+                <a:latin typeface="Courier New" pitchFamily="49"/>
+                <a:cs typeface="Courier New" pitchFamily="49"/>
+              </a:rPr>
+              <a:t> </a:t>
+            </a:r>
+            <a:r>
+              <a:rPr lang="nl-NL" dirty="0" err="1">
+                <a:solidFill>
+                  <a:srgbClr val="00FF00"/>
+                </a:solidFill>
+                <a:latin typeface="Courier New" pitchFamily="49"/>
+                <a:cs typeface="Courier New" pitchFamily="49"/>
+              </a:rPr>
+              <a:t>to</a:t>
+            </a:r>
+            <a:r>
+              <a:rPr lang="nl-NL" dirty="0">
+                <a:solidFill>
+                  <a:srgbClr val="00FF00"/>
+                </a:solidFill>
+                <a:latin typeface="Courier New" pitchFamily="49"/>
+                <a:cs typeface="Courier New" pitchFamily="49"/>
+              </a:rPr>
+              <a:t> </a:t>
+            </a:r>
+            <a:r>
+              <a:rPr lang="nl-NL" dirty="0" err="1">
+                <a:solidFill>
+                  <a:srgbClr val="00FF00"/>
+                </a:solidFill>
+                <a:latin typeface="Courier New" pitchFamily="49"/>
+                <a:cs typeface="Courier New" pitchFamily="49"/>
+              </a:rPr>
+              <a:t>use</a:t>
+            </a:r>
+            <a:r>
+              <a:rPr lang="nl-NL" dirty="0">
+                <a:solidFill>
+                  <a:srgbClr val="00FF00"/>
+                </a:solidFill>
+                <a:latin typeface="Courier New" pitchFamily="49"/>
+                <a:cs typeface="Courier New" pitchFamily="49"/>
+              </a:rPr>
+              <a:t> </a:t>
+            </a:r>
+            <a:r>
+              <a:rPr lang="nl-NL" dirty="0" err="1">
+                <a:solidFill>
+                  <a:srgbClr val="00FF00"/>
+                </a:solidFill>
+                <a:latin typeface="Courier New" pitchFamily="49"/>
+                <a:cs typeface="Courier New" pitchFamily="49"/>
+              </a:rPr>
+              <a:t>JUnit</a:t>
+            </a:r>
+            <a:r>
+              <a:rPr lang="nl-NL" dirty="0">
+                <a:solidFill>
+                  <a:srgbClr val="00FF00"/>
+                </a:solidFill>
+                <a:latin typeface="Courier New" pitchFamily="49"/>
+                <a:cs typeface="Courier New" pitchFamily="49"/>
+              </a:rPr>
+              <a:t> as well</a:t>
             </a:r>
           </a:p>
         </p:txBody>
@@ -9238,7 +9596,7 @@
 </p:sld>
 </file>
 
-<file path=ppt/slides/slide22.xml><?xml version="1.0" encoding="utf-8"?>
+<file path=ppt/slides/slide21.xml><?xml version="1.0" encoding="utf-8"?>
 <p:sld xmlns:a="http://schemas.openxmlformats.org/drawingml/2006/main" xmlns:r="http://schemas.openxmlformats.org/officeDocument/2006/relationships" xmlns:p="http://schemas.openxmlformats.org/presentationml/2006/main">
   <p:cSld>
     <p:bg>
@@ -9372,7 +9730,7 @@
 </p:sld>
 </file>
 
-<file path=ppt/slides/slide23.xml><?xml version="1.0" encoding="utf-8"?>
+<file path=ppt/slides/slide22.xml><?xml version="1.0" encoding="utf-8"?>
 <p:sld xmlns:a="http://schemas.openxmlformats.org/drawingml/2006/main" xmlns:r="http://schemas.openxmlformats.org/officeDocument/2006/relationships" xmlns:p="http://schemas.openxmlformats.org/presentationml/2006/main">
   <p:cSld name="Slide39">
     <p:bg>
@@ -9420,14 +9778,24 @@
           <a:p>
             <a:pPr lvl="0"/>
             <a:r>
-              <a:rPr lang="nl-NL">
-                <a:solidFill>
-                  <a:srgbClr val="00FF00"/>
-                </a:solidFill>
-                <a:latin typeface="Courier New" pitchFamily="49"/>
-                <a:cs typeface="Courier New" pitchFamily="49"/>
-              </a:rPr>
-              <a:t>Get your hands dirty!</a:t>
+              <a:rPr lang="nl-NL" dirty="0" err="1">
+                <a:solidFill>
+                  <a:srgbClr val="00FF00"/>
+                </a:solidFill>
+                <a:latin typeface="Courier New" pitchFamily="49"/>
+                <a:cs typeface="Courier New" pitchFamily="49"/>
+              </a:rPr>
+              <a:t>Exercise</a:t>
+            </a:r>
+            <a:r>
+              <a:rPr lang="nl-NL" dirty="0">
+                <a:solidFill>
+                  <a:srgbClr val="00FF00"/>
+                </a:solidFill>
+                <a:latin typeface="Courier New" pitchFamily="49"/>
+                <a:cs typeface="Courier New" pitchFamily="49"/>
+              </a:rPr>
+              <a:t> time!</a:t>
             </a:r>
           </a:p>
         </p:txBody>
@@ -9458,167 +9826,464 @@
               <a:buChar char="_"/>
             </a:pPr>
             <a:r>
-              <a:rPr lang="nl-NL">
-                <a:solidFill>
-                  <a:srgbClr val="00FF00"/>
-                </a:solidFill>
-                <a:latin typeface="Courier New" pitchFamily="49"/>
-                <a:cs typeface="Courier New" pitchFamily="49"/>
-              </a:rPr>
-              <a:t>WireMockExercises1</a:t>
-            </a:r>
-          </a:p>
-          <a:p>
-            <a:pPr lvl="0">
-              <a:buFont typeface="Courier New" pitchFamily="49"/>
-              <a:buChar char="_"/>
-            </a:pPr>
-            <a:endParaRPr lang="nl-NL">
-              <a:solidFill>
-                <a:srgbClr val="00FF00"/>
-              </a:solidFill>
-              <a:latin typeface="Courier New" pitchFamily="49"/>
-              <a:cs typeface="Courier New" pitchFamily="49"/>
-            </a:endParaRPr>
-          </a:p>
-          <a:p>
-            <a:pPr lvl="0">
-              <a:buFont typeface="Courier New" pitchFamily="49"/>
-              <a:buChar char="_"/>
-            </a:pPr>
-            <a:r>
-              <a:rPr lang="nl-NL">
-                <a:solidFill>
-                  <a:srgbClr val="00FF00"/>
-                </a:solidFill>
-                <a:latin typeface="Courier New" pitchFamily="49"/>
-                <a:cs typeface="Courier New" pitchFamily="49"/>
-              </a:rPr>
-              <a:t>Create simple mocks</a:t>
-            </a:r>
-          </a:p>
-          <a:p>
-            <a:pPr lvl="0">
-              <a:buFont typeface="Courier New" pitchFamily="49"/>
-              <a:buChar char="_"/>
-            </a:pPr>
-            <a:endParaRPr lang="nl-NL">
-              <a:solidFill>
-                <a:srgbClr val="00FF00"/>
-              </a:solidFill>
-              <a:latin typeface="Courier New" pitchFamily="49"/>
-              <a:cs typeface="Courier New" pitchFamily="49"/>
-            </a:endParaRPr>
-          </a:p>
-          <a:p>
-            <a:pPr lvl="0">
-              <a:buFont typeface="Courier New" pitchFamily="49"/>
-              <a:buChar char="_"/>
-            </a:pPr>
-            <a:r>
-              <a:rPr lang="nl-NL">
-                <a:solidFill>
-                  <a:srgbClr val="00FF00"/>
-                </a:solidFill>
-                <a:latin typeface="Courier New" pitchFamily="49"/>
-                <a:cs typeface="Courier New" pitchFamily="49"/>
-              </a:rPr>
-              <a:t>Exercises are defined in the comments</a:t>
-            </a:r>
-          </a:p>
-          <a:p>
-            <a:pPr lvl="0">
-              <a:buFont typeface="Courier New" pitchFamily="49"/>
-              <a:buChar char="_"/>
-            </a:pPr>
-            <a:endParaRPr lang="nl-NL">
-              <a:solidFill>
-                <a:srgbClr val="00FF00"/>
-              </a:solidFill>
-              <a:latin typeface="Courier New" pitchFamily="49"/>
-              <a:cs typeface="Courier New" pitchFamily="49"/>
-            </a:endParaRPr>
-          </a:p>
-          <a:p>
-            <a:pPr lvl="0">
-              <a:buFont typeface="Courier New" pitchFamily="49"/>
-              <a:buChar char="_"/>
-            </a:pPr>
-            <a:r>
-              <a:rPr lang="nl-NL">
-                <a:solidFill>
-                  <a:srgbClr val="00FF00"/>
-                </a:solidFill>
-                <a:latin typeface="Courier New" pitchFamily="49"/>
-                <a:cs typeface="Courier New" pitchFamily="49"/>
-              </a:rPr>
-              <a:t>Verify your solution by running the tests</a:t>
-            </a:r>
-          </a:p>
-          <a:p>
-            <a:pPr lvl="0">
-              <a:buFont typeface="Courier New" pitchFamily="49"/>
-              <a:buChar char="_"/>
-            </a:pPr>
-            <a:endParaRPr lang="nl-NL">
-              <a:solidFill>
-                <a:srgbClr val="00FF00"/>
-              </a:solidFill>
-              <a:latin typeface="Courier New" pitchFamily="49"/>
-              <a:cs typeface="Courier New" pitchFamily="49"/>
-            </a:endParaRPr>
-          </a:p>
-          <a:p>
-            <a:pPr lvl="0">
-              <a:buFont typeface="Courier New" pitchFamily="49"/>
-              <a:buChar char="_"/>
-            </a:pPr>
-            <a:endParaRPr lang="nl-NL">
-              <a:solidFill>
-                <a:srgbClr val="00FF00"/>
-              </a:solidFill>
-              <a:latin typeface="Courier New" pitchFamily="49"/>
-              <a:cs typeface="Courier New" pitchFamily="49"/>
-            </a:endParaRPr>
-          </a:p>
-          <a:p>
-            <a:pPr lvl="0">
-              <a:buFont typeface="Courier New" pitchFamily="49"/>
-              <a:buChar char="_"/>
-            </a:pPr>
-            <a:endParaRPr lang="nl-NL">
-              <a:solidFill>
-                <a:srgbClr val="00FF00"/>
-              </a:solidFill>
-              <a:latin typeface="Courier New" pitchFamily="49"/>
-              <a:cs typeface="Courier New" pitchFamily="49"/>
-            </a:endParaRPr>
-          </a:p>
-          <a:p>
-            <a:pPr lvl="0">
-              <a:buFont typeface="Courier New" pitchFamily="49"/>
-              <a:buChar char="_"/>
-            </a:pPr>
-            <a:endParaRPr lang="nl-NL">
-              <a:solidFill>
-                <a:srgbClr val="00FF00"/>
-              </a:solidFill>
-              <a:latin typeface="Courier New" pitchFamily="49"/>
-              <a:cs typeface="Courier New" pitchFamily="49"/>
-            </a:endParaRPr>
-          </a:p>
-          <a:p>
-            <a:pPr lvl="0">
-              <a:buFont typeface="Courier New" pitchFamily="49"/>
-              <a:buChar char="_"/>
-            </a:pPr>
-            <a:endParaRPr lang="nl-NL">
-              <a:solidFill>
-                <a:srgbClr val="00FF00"/>
-              </a:solidFill>
-              <a:latin typeface="Courier New" pitchFamily="49"/>
-              <a:cs typeface="Courier New" pitchFamily="49"/>
-            </a:endParaRPr>
+              <a:rPr lang="nl-NL" dirty="0">
+                <a:solidFill>
+                  <a:srgbClr val="00FF00"/>
+                </a:solidFill>
+                <a:latin typeface="Courier New" pitchFamily="49"/>
+                <a:cs typeface="Courier New" pitchFamily="49"/>
+              </a:rPr>
+              <a:t>WireMockExercises1.java</a:t>
+            </a:r>
+          </a:p>
+          <a:p>
+            <a:pPr lvl="0">
+              <a:buFont typeface="Courier New" pitchFamily="49"/>
+              <a:buChar char="_"/>
+            </a:pPr>
+            <a:endParaRPr lang="nl-NL" dirty="0">
+              <a:solidFill>
+                <a:srgbClr val="00FF00"/>
+              </a:solidFill>
+              <a:latin typeface="Courier New" pitchFamily="49"/>
+              <a:cs typeface="Courier New" pitchFamily="49"/>
+            </a:endParaRPr>
+          </a:p>
+          <a:p>
+            <a:pPr lvl="0">
+              <a:buFont typeface="Courier New" pitchFamily="49"/>
+              <a:buChar char="_"/>
+            </a:pPr>
+            <a:r>
+              <a:rPr lang="nl-NL" dirty="0" err="1">
+                <a:solidFill>
+                  <a:srgbClr val="00FF00"/>
+                </a:solidFill>
+                <a:latin typeface="Courier New" pitchFamily="49"/>
+                <a:cs typeface="Courier New" pitchFamily="49"/>
+              </a:rPr>
+              <a:t>Create</a:t>
+            </a:r>
+            <a:r>
+              <a:rPr lang="nl-NL" dirty="0">
+                <a:solidFill>
+                  <a:srgbClr val="00FF00"/>
+                </a:solidFill>
+                <a:latin typeface="Courier New" pitchFamily="49"/>
+                <a:cs typeface="Courier New" pitchFamily="49"/>
+              </a:rPr>
+              <a:t> a </a:t>
+            </a:r>
+            <a:r>
+              <a:rPr lang="nl-NL" dirty="0" err="1">
+                <a:solidFill>
+                  <a:srgbClr val="00FF00"/>
+                </a:solidFill>
+                <a:latin typeface="Courier New" pitchFamily="49"/>
+                <a:cs typeface="Courier New" pitchFamily="49"/>
+              </a:rPr>
+              <a:t>number</a:t>
+            </a:r>
+            <a:r>
+              <a:rPr lang="nl-NL" dirty="0">
+                <a:solidFill>
+                  <a:srgbClr val="00FF00"/>
+                </a:solidFill>
+                <a:latin typeface="Courier New" pitchFamily="49"/>
+                <a:cs typeface="Courier New" pitchFamily="49"/>
+              </a:rPr>
+              <a:t> of </a:t>
+            </a:r>
+            <a:r>
+              <a:rPr lang="nl-NL" dirty="0" err="1">
+                <a:solidFill>
+                  <a:srgbClr val="00FF00"/>
+                </a:solidFill>
+                <a:latin typeface="Courier New" pitchFamily="49"/>
+                <a:cs typeface="Courier New" pitchFamily="49"/>
+              </a:rPr>
+              <a:t>simple</a:t>
+            </a:r>
+            <a:r>
+              <a:rPr lang="nl-NL" dirty="0">
+                <a:solidFill>
+                  <a:srgbClr val="00FF00"/>
+                </a:solidFill>
+                <a:latin typeface="Courier New" pitchFamily="49"/>
+                <a:cs typeface="Courier New" pitchFamily="49"/>
+              </a:rPr>
+              <a:t> </a:t>
+            </a:r>
+            <a:r>
+              <a:rPr lang="nl-NL" dirty="0" err="1">
+                <a:solidFill>
+                  <a:srgbClr val="00FF00"/>
+                </a:solidFill>
+                <a:latin typeface="Courier New" pitchFamily="49"/>
+                <a:cs typeface="Courier New" pitchFamily="49"/>
+              </a:rPr>
+              <a:t>mocks</a:t>
+            </a:r>
+            <a:endParaRPr lang="nl-NL" dirty="0">
+              <a:solidFill>
+                <a:srgbClr val="00FF00"/>
+              </a:solidFill>
+              <a:latin typeface="Courier New" pitchFamily="49"/>
+              <a:cs typeface="Courier New" pitchFamily="49"/>
+            </a:endParaRPr>
+          </a:p>
+          <a:p>
+            <a:pPr lvl="0">
+              <a:buFont typeface="Courier New" pitchFamily="49"/>
+              <a:buChar char="_"/>
+            </a:pPr>
+            <a:endParaRPr lang="nl-NL" dirty="0">
+              <a:solidFill>
+                <a:srgbClr val="00FF00"/>
+              </a:solidFill>
+              <a:latin typeface="Courier New" pitchFamily="49"/>
+              <a:cs typeface="Courier New" pitchFamily="49"/>
+            </a:endParaRPr>
+          </a:p>
+          <a:p>
+            <a:pPr lvl="0">
+              <a:buFont typeface="Courier New" pitchFamily="49"/>
+              <a:buChar char="_"/>
+            </a:pPr>
+            <a:r>
+              <a:rPr lang="nl-NL" dirty="0" err="1">
+                <a:solidFill>
+                  <a:srgbClr val="00FF00"/>
+                </a:solidFill>
+                <a:latin typeface="Courier New" pitchFamily="49"/>
+                <a:cs typeface="Courier New" pitchFamily="49"/>
+              </a:rPr>
+              <a:t>Exercises</a:t>
+            </a:r>
+            <a:r>
+              <a:rPr lang="nl-NL" dirty="0">
+                <a:solidFill>
+                  <a:srgbClr val="00FF00"/>
+                </a:solidFill>
+                <a:latin typeface="Courier New" pitchFamily="49"/>
+                <a:cs typeface="Courier New" pitchFamily="49"/>
+              </a:rPr>
+              <a:t> are </a:t>
+            </a:r>
+            <a:r>
+              <a:rPr lang="nl-NL" dirty="0" err="1">
+                <a:solidFill>
+                  <a:srgbClr val="00FF00"/>
+                </a:solidFill>
+                <a:latin typeface="Courier New" pitchFamily="49"/>
+                <a:cs typeface="Courier New" pitchFamily="49"/>
+              </a:rPr>
+              <a:t>defined</a:t>
+            </a:r>
+            <a:r>
+              <a:rPr lang="nl-NL" dirty="0">
+                <a:solidFill>
+                  <a:srgbClr val="00FF00"/>
+                </a:solidFill>
+                <a:latin typeface="Courier New" pitchFamily="49"/>
+                <a:cs typeface="Courier New" pitchFamily="49"/>
+              </a:rPr>
+              <a:t> in </a:t>
+            </a:r>
+            <a:r>
+              <a:rPr lang="nl-NL" dirty="0" err="1">
+                <a:solidFill>
+                  <a:srgbClr val="00FF00"/>
+                </a:solidFill>
+                <a:latin typeface="Courier New" pitchFamily="49"/>
+                <a:cs typeface="Courier New" pitchFamily="49"/>
+              </a:rPr>
+              <a:t>the</a:t>
+            </a:r>
+            <a:r>
+              <a:rPr lang="nl-NL" dirty="0">
+                <a:solidFill>
+                  <a:srgbClr val="00FF00"/>
+                </a:solidFill>
+                <a:latin typeface="Courier New" pitchFamily="49"/>
+                <a:cs typeface="Courier New" pitchFamily="49"/>
+              </a:rPr>
+              <a:t> </a:t>
+            </a:r>
+            <a:r>
+              <a:rPr lang="nl-NL" dirty="0" err="1">
+                <a:solidFill>
+                  <a:srgbClr val="00FF00"/>
+                </a:solidFill>
+                <a:latin typeface="Courier New" pitchFamily="49"/>
+                <a:cs typeface="Courier New" pitchFamily="49"/>
+              </a:rPr>
+              <a:t>comments</a:t>
+            </a:r>
+            <a:endParaRPr lang="nl-NL" dirty="0">
+              <a:solidFill>
+                <a:srgbClr val="00FF00"/>
+              </a:solidFill>
+              <a:latin typeface="Courier New" pitchFamily="49"/>
+              <a:cs typeface="Courier New" pitchFamily="49"/>
+            </a:endParaRPr>
+          </a:p>
+          <a:p>
+            <a:pPr lvl="0">
+              <a:buFont typeface="Courier New" pitchFamily="49"/>
+              <a:buChar char="_"/>
+            </a:pPr>
+            <a:endParaRPr lang="nl-NL" dirty="0">
+              <a:solidFill>
+                <a:srgbClr val="00FF00"/>
+              </a:solidFill>
+              <a:latin typeface="Courier New" pitchFamily="49"/>
+              <a:cs typeface="Courier New" pitchFamily="49"/>
+            </a:endParaRPr>
+          </a:p>
+          <a:p>
+            <a:pPr lvl="0">
+              <a:buFont typeface="Courier New" pitchFamily="49"/>
+              <a:buChar char="_"/>
+            </a:pPr>
+            <a:r>
+              <a:rPr lang="nl-NL" dirty="0" err="1">
+                <a:solidFill>
+                  <a:srgbClr val="00FF00"/>
+                </a:solidFill>
+                <a:latin typeface="Courier New" pitchFamily="49"/>
+                <a:cs typeface="Courier New" pitchFamily="49"/>
+              </a:rPr>
+              <a:t>Verify</a:t>
+            </a:r>
+            <a:r>
+              <a:rPr lang="nl-NL" dirty="0">
+                <a:solidFill>
+                  <a:srgbClr val="00FF00"/>
+                </a:solidFill>
+                <a:latin typeface="Courier New" pitchFamily="49"/>
+                <a:cs typeface="Courier New" pitchFamily="49"/>
+              </a:rPr>
+              <a:t> </a:t>
+            </a:r>
+            <a:r>
+              <a:rPr lang="nl-NL" dirty="0" err="1">
+                <a:solidFill>
+                  <a:srgbClr val="00FF00"/>
+                </a:solidFill>
+                <a:latin typeface="Courier New" pitchFamily="49"/>
+                <a:cs typeface="Courier New" pitchFamily="49"/>
+              </a:rPr>
+              <a:t>your</a:t>
+            </a:r>
+            <a:r>
+              <a:rPr lang="nl-NL" dirty="0">
+                <a:solidFill>
+                  <a:srgbClr val="00FF00"/>
+                </a:solidFill>
+                <a:latin typeface="Courier New" pitchFamily="49"/>
+                <a:cs typeface="Courier New" pitchFamily="49"/>
+              </a:rPr>
+              <a:t> solution </a:t>
+            </a:r>
+            <a:r>
+              <a:rPr lang="nl-NL" dirty="0" err="1">
+                <a:solidFill>
+                  <a:srgbClr val="00FF00"/>
+                </a:solidFill>
+                <a:latin typeface="Courier New" pitchFamily="49"/>
+                <a:cs typeface="Courier New" pitchFamily="49"/>
+              </a:rPr>
+              <a:t>by</a:t>
+            </a:r>
+            <a:r>
+              <a:rPr lang="nl-NL" dirty="0">
+                <a:solidFill>
+                  <a:srgbClr val="00FF00"/>
+                </a:solidFill>
+                <a:latin typeface="Courier New" pitchFamily="49"/>
+                <a:cs typeface="Courier New" pitchFamily="49"/>
+              </a:rPr>
+              <a:t> running </a:t>
+            </a:r>
+            <a:r>
+              <a:rPr lang="nl-NL" dirty="0" err="1">
+                <a:solidFill>
+                  <a:srgbClr val="00FF00"/>
+                </a:solidFill>
+                <a:latin typeface="Courier New" pitchFamily="49"/>
+                <a:cs typeface="Courier New" pitchFamily="49"/>
+              </a:rPr>
+              <a:t>the</a:t>
+            </a:r>
+            <a:r>
+              <a:rPr lang="nl-NL" dirty="0">
+                <a:solidFill>
+                  <a:srgbClr val="00FF00"/>
+                </a:solidFill>
+                <a:latin typeface="Courier New" pitchFamily="49"/>
+                <a:cs typeface="Courier New" pitchFamily="49"/>
+              </a:rPr>
+              <a:t> tests</a:t>
+            </a:r>
+          </a:p>
+          <a:p>
+            <a:pPr lvl="0">
+              <a:buFont typeface="Courier New" pitchFamily="49"/>
+              <a:buChar char="_"/>
+            </a:pPr>
+            <a:endParaRPr lang="nl-NL" dirty="0">
+              <a:solidFill>
+                <a:srgbClr val="00FF00"/>
+              </a:solidFill>
+              <a:latin typeface="Courier New" pitchFamily="49"/>
+              <a:cs typeface="Courier New" pitchFamily="49"/>
+            </a:endParaRPr>
+          </a:p>
+          <a:p>
+            <a:pPr lvl="0">
+              <a:buFont typeface="Courier New" pitchFamily="49"/>
+              <a:buChar char="_"/>
+            </a:pPr>
+            <a:endParaRPr lang="nl-NL" dirty="0">
+              <a:solidFill>
+                <a:srgbClr val="00FF00"/>
+              </a:solidFill>
+              <a:latin typeface="Courier New" pitchFamily="49"/>
+              <a:cs typeface="Courier New" pitchFamily="49"/>
+            </a:endParaRPr>
+          </a:p>
+          <a:p>
+            <a:pPr lvl="0">
+              <a:buFont typeface="Courier New" pitchFamily="49"/>
+              <a:buChar char="_"/>
+            </a:pPr>
+            <a:endParaRPr lang="nl-NL" dirty="0">
+              <a:solidFill>
+                <a:srgbClr val="00FF00"/>
+              </a:solidFill>
+              <a:latin typeface="Courier New" pitchFamily="49"/>
+              <a:cs typeface="Courier New" pitchFamily="49"/>
+            </a:endParaRPr>
+          </a:p>
+          <a:p>
+            <a:pPr lvl="0">
+              <a:buFont typeface="Courier New" pitchFamily="49"/>
+              <a:buChar char="_"/>
+            </a:pPr>
+            <a:endParaRPr lang="nl-NL" dirty="0">
+              <a:solidFill>
+                <a:srgbClr val="00FF00"/>
+              </a:solidFill>
+              <a:latin typeface="Courier New" pitchFamily="49"/>
+              <a:cs typeface="Courier New" pitchFamily="49"/>
+            </a:endParaRPr>
+          </a:p>
+          <a:p>
+            <a:pPr lvl="0">
+              <a:buFont typeface="Courier New" pitchFamily="49"/>
+              <a:buChar char="_"/>
+            </a:pPr>
+            <a:endParaRPr lang="nl-NL" dirty="0">
+              <a:solidFill>
+                <a:srgbClr val="00FF00"/>
+              </a:solidFill>
+              <a:latin typeface="Courier New" pitchFamily="49"/>
+              <a:cs typeface="Courier New" pitchFamily="49"/>
+            </a:endParaRPr>
+          </a:p>
+        </p:txBody>
+      </p:sp>
+    </p:spTree>
+  </p:cSld>
+  <p:clrMapOvr>
+    <a:masterClrMapping/>
+  </p:clrMapOvr>
+</p:sld>
+</file>
+
+<file path=ppt/slides/slide23.xml><?xml version="1.0" encoding="utf-8"?>
+<p:sld xmlns:a="http://schemas.openxmlformats.org/drawingml/2006/main" xmlns:r="http://schemas.openxmlformats.org/officeDocument/2006/relationships" xmlns:p="http://schemas.openxmlformats.org/presentationml/2006/main">
+  <p:cSld name="Slide51">
+    <p:bg>
+      <p:bgPr>
+        <a:solidFill>
+          <a:srgbClr val="000000"/>
+        </a:solidFill>
+        <a:effectLst/>
+      </p:bgPr>
+    </p:bg>
+    <p:spTree>
+      <p:nvGrpSpPr>
+        <p:cNvPr id="1" name=""/>
+        <p:cNvGrpSpPr/>
+        <p:nvPr/>
+      </p:nvGrpSpPr>
+      <p:grpSpPr>
+        <a:xfrm>
+          <a:off x="0" y="0"/>
+          <a:ext cx="0" cy="0"/>
+          <a:chOff x="0" y="0"/>
+          <a:chExt cx="0" cy="0"/>
+        </a:xfrm>
+      </p:grpSpPr>
+      <p:sp>
+        <p:nvSpPr>
+          <p:cNvPr id="2" name="Title 1">
+            <a:extLst>
+              <a:ext uri="{FF2B5EF4-FFF2-40B4-BE49-F238E27FC236}">
+                <a16:creationId xmlns:a16="http://schemas.microsoft.com/office/drawing/2014/main" id="{0508229A-D2A9-434E-8091-D7A818FB6F25}"/>
+              </a:ext>
+            </a:extLst>
+          </p:cNvPr>
+          <p:cNvSpPr txBox="1">
+            <a:spLocks noGrp="1"/>
+          </p:cNvSpPr>
+          <p:nvPr>
+            <p:ph type="ctrTitle"/>
+          </p:nvPr>
+        </p:nvSpPr>
+        <p:spPr/>
+        <p:txBody>
+          <a:bodyPr/>
+          <a:lstStyle/>
+          <a:p>
+            <a:pPr lvl="0"/>
+            <a:r>
+              <a:rPr lang="nl-NL" dirty="0">
+                <a:solidFill>
+                  <a:srgbClr val="00FF00"/>
+                </a:solidFill>
+                <a:latin typeface="Courier New" pitchFamily="49"/>
+                <a:cs typeface="Courier New" pitchFamily="49"/>
+              </a:rPr>
+              <a:t>CONTINUE HERE</a:t>
+            </a:r>
+          </a:p>
+        </p:txBody>
+      </p:sp>
+      <p:sp>
+        <p:nvSpPr>
+          <p:cNvPr id="5" name="Subtitle 4">
+            <a:extLst>
+              <a:ext uri="{FF2B5EF4-FFF2-40B4-BE49-F238E27FC236}">
+                <a16:creationId xmlns:a16="http://schemas.microsoft.com/office/drawing/2014/main" id="{6D5A54D7-7497-4294-9F70-89D29246BBA1}"/>
+              </a:ext>
+            </a:extLst>
+          </p:cNvPr>
+          <p:cNvSpPr>
+            <a:spLocks noGrp="1"/>
+          </p:cNvSpPr>
+          <p:nvPr>
+            <p:ph type="subTitle" idx="1"/>
+          </p:nvPr>
+        </p:nvSpPr>
+        <p:spPr/>
+        <p:txBody>
+          <a:bodyPr/>
+          <a:lstStyle/>
+          <a:p>
+            <a:endParaRPr lang="nl-NL"/>
           </a:p>
         </p:txBody>
       </p:sp>

</xml_diff>

<commit_message>
Reviewed exercises 2 (no changes), updated slides, included compiler version in pom.xml
</commit_message>
<xml_diff>
--- a/wiremock_workshop.pptx
+++ b/wiremock_workshop.pptx
@@ -30,13 +30,13 @@
     <p:sldId id="305" r:id="rId21"/>
     <p:sldId id="338" r:id="rId22"/>
     <p:sldId id="294" r:id="rId23"/>
-    <p:sldId id="306" r:id="rId24"/>
-    <p:sldId id="311" r:id="rId25"/>
-    <p:sldId id="312" r:id="rId26"/>
-    <p:sldId id="313" r:id="rId27"/>
-    <p:sldId id="331" r:id="rId28"/>
-    <p:sldId id="314" r:id="rId29"/>
-    <p:sldId id="315" r:id="rId30"/>
+    <p:sldId id="311" r:id="rId24"/>
+    <p:sldId id="312" r:id="rId25"/>
+    <p:sldId id="313" r:id="rId26"/>
+    <p:sldId id="331" r:id="rId27"/>
+    <p:sldId id="314" r:id="rId28"/>
+    <p:sldId id="315" r:id="rId29"/>
+    <p:sldId id="306" r:id="rId30"/>
     <p:sldId id="316" r:id="rId31"/>
     <p:sldId id="317" r:id="rId32"/>
     <p:sldId id="318" r:id="rId33"/>
@@ -304,7 +304,7 @@
             <a:fld id="{933C1985-CC60-4502-8ECC-8A39609F1E28}" type="datetime1">
               <a:rPr lang="nl-NL"/>
               <a:pPr lvl="0"/>
-              <a:t>24-8-2018</a:t>
+              <a:t>30-8-2018</a:t>
             </a:fld>
             <a:endParaRPr lang="nl-NL"/>
           </a:p>
@@ -1236,7 +1236,7 @@
             <a:fld id="{19D221E3-8E68-4F1C-A103-A0B6C8B9662E}" type="datetime1">
               <a:rPr lang="nl-NL"/>
               <a:pPr lvl="0"/>
-              <a:t>24-8-2018</a:t>
+              <a:t>30-8-2018</a:t>
             </a:fld>
             <a:endParaRPr lang="nl-NL"/>
           </a:p>
@@ -1473,7 +1473,7 @@
             <a:fld id="{822E0BF5-BE88-44A4-BA94-982271F97C3D}" type="datetime1">
               <a:rPr lang="nl-NL"/>
               <a:pPr lvl="0"/>
-              <a:t>24-8-2018</a:t>
+              <a:t>30-8-2018</a:t>
             </a:fld>
             <a:endParaRPr lang="nl-NL"/>
           </a:p>
@@ -1719,7 +1719,7 @@
             <a:fld id="{B9232680-D045-46AA-BEF7-C3F631B40446}" type="datetime1">
               <a:rPr lang="nl-NL"/>
               <a:pPr lvl="0"/>
-              <a:t>24-8-2018</a:t>
+              <a:t>30-8-2018</a:t>
             </a:fld>
             <a:endParaRPr lang="nl-NL"/>
           </a:p>
@@ -1955,7 +1955,7 @@
             <a:fld id="{74E63D54-33BC-47E5-ADB1-BB0B7298DA8F}" type="datetime1">
               <a:rPr lang="nl-NL"/>
               <a:pPr lvl="0"/>
-              <a:t>24-8-2018</a:t>
+              <a:t>30-8-2018</a:t>
             </a:fld>
             <a:endParaRPr lang="nl-NL"/>
           </a:p>
@@ -2166,7 +2166,7 @@
             <a:fld id="{30925ABE-D3D0-404A-A142-4AD3A33711F1}" type="datetime1">
               <a:rPr lang="nl-NL"/>
               <a:pPr lvl="0"/>
-              <a:t>24-8-2018</a:t>
+              <a:t>30-8-2018</a:t>
             </a:fld>
             <a:endParaRPr lang="nl-NL"/>
           </a:p>
@@ -2486,7 +2486,7 @@
             <a:fld id="{CF7C870A-C5CE-4B9C-8879-AA59D721C7B0}" type="datetime1">
               <a:rPr lang="nl-NL"/>
               <a:pPr lvl="0"/>
-              <a:t>24-8-2018</a:t>
+              <a:t>30-8-2018</a:t>
             </a:fld>
             <a:endParaRPr lang="nl-NL"/>
           </a:p>
@@ -2890,7 +2890,7 @@
             <a:fld id="{9B8CBA01-D750-4027-AD4F-F8BBD96EFE00}" type="datetime1">
               <a:rPr lang="nl-NL"/>
               <a:pPr lvl="0"/>
-              <a:t>24-8-2018</a:t>
+              <a:t>30-8-2018</a:t>
             </a:fld>
             <a:endParaRPr lang="nl-NL"/>
           </a:p>
@@ -3053,7 +3053,7 @@
             <a:fld id="{F094EFB8-CC71-4E7E-9D6F-4AF06728B1E2}" type="datetime1">
               <a:rPr lang="nl-NL"/>
               <a:pPr lvl="0"/>
-              <a:t>24-8-2018</a:t>
+              <a:t>30-8-2018</a:t>
             </a:fld>
             <a:endParaRPr lang="nl-NL"/>
           </a:p>
@@ -3181,7 +3181,7 @@
             <a:fld id="{8B2D0485-9F03-42A6-AEAF-640E1E801316}" type="datetime1">
               <a:rPr lang="nl-NL"/>
               <a:pPr lvl="0"/>
-              <a:t>24-8-2018</a:t>
+              <a:t>30-8-2018</a:t>
             </a:fld>
             <a:endParaRPr lang="nl-NL"/>
           </a:p>
@@ -3466,7 +3466,7 @@
             <a:fld id="{7E16F5C2-4DDC-41E9-9E83-12B283FFD3EC}" type="datetime1">
               <a:rPr lang="nl-NL"/>
               <a:pPr lvl="0"/>
-              <a:t>24-8-2018</a:t>
+              <a:t>30-8-2018</a:t>
             </a:fld>
             <a:endParaRPr lang="nl-NL"/>
           </a:p>
@@ -3708,7 +3708,7 @@
             <a:fld id="{787BCDFB-3AD3-4B04-8CEB-D3DE0C540ABF}" type="datetime1">
               <a:rPr lang="nl-NL"/>
               <a:pPr lvl="0"/>
-              <a:t>24-8-2018</a:t>
+              <a:t>30-8-2018</a:t>
             </a:fld>
             <a:endParaRPr lang="nl-NL"/>
           </a:p>
@@ -3991,7 +3991,7 @@
             <a:fld id="{DE0E4D8D-E244-449F-9212-68A908B9804D}" type="datetime1">
               <a:rPr lang="nl-NL"/>
               <a:pPr lvl="0"/>
-              <a:t>24-8-2018</a:t>
+              <a:t>30-8-2018</a:t>
             </a:fld>
             <a:endParaRPr lang="nl-NL"/>
           </a:p>
@@ -10204,99 +10204,6 @@
 
 <file path=ppt/slides/slide23.xml><?xml version="1.0" encoding="utf-8"?>
 <p:sld xmlns:a="http://schemas.openxmlformats.org/drawingml/2006/main" xmlns:r="http://schemas.openxmlformats.org/officeDocument/2006/relationships" xmlns:p="http://schemas.openxmlformats.org/presentationml/2006/main">
-  <p:cSld name="Slide51">
-    <p:bg>
-      <p:bgPr>
-        <a:solidFill>
-          <a:srgbClr val="000000"/>
-        </a:solidFill>
-        <a:effectLst/>
-      </p:bgPr>
-    </p:bg>
-    <p:spTree>
-      <p:nvGrpSpPr>
-        <p:cNvPr id="1" name=""/>
-        <p:cNvGrpSpPr/>
-        <p:nvPr/>
-      </p:nvGrpSpPr>
-      <p:grpSpPr>
-        <a:xfrm>
-          <a:off x="0" y="0"/>
-          <a:ext cx="0" cy="0"/>
-          <a:chOff x="0" y="0"/>
-          <a:chExt cx="0" cy="0"/>
-        </a:xfrm>
-      </p:grpSpPr>
-      <p:sp>
-        <p:nvSpPr>
-          <p:cNvPr id="2" name="Title 1">
-            <a:extLst>
-              <a:ext uri="{FF2B5EF4-FFF2-40B4-BE49-F238E27FC236}">
-                <a16:creationId xmlns:a16="http://schemas.microsoft.com/office/drawing/2014/main" id="{0508229A-D2A9-434E-8091-D7A818FB6F25}"/>
-              </a:ext>
-            </a:extLst>
-          </p:cNvPr>
-          <p:cNvSpPr txBox="1">
-            <a:spLocks noGrp="1"/>
-          </p:cNvSpPr>
-          <p:nvPr>
-            <p:ph type="ctrTitle"/>
-          </p:nvPr>
-        </p:nvSpPr>
-        <p:spPr/>
-        <p:txBody>
-          <a:bodyPr/>
-          <a:lstStyle/>
-          <a:p>
-            <a:pPr lvl="0"/>
-            <a:r>
-              <a:rPr lang="nl-NL" dirty="0">
-                <a:solidFill>
-                  <a:srgbClr val="00FF00"/>
-                </a:solidFill>
-                <a:latin typeface="Courier New" pitchFamily="49"/>
-                <a:cs typeface="Courier New" pitchFamily="49"/>
-              </a:rPr>
-              <a:t>CONTINUE HERE</a:t>
-            </a:r>
-          </a:p>
-        </p:txBody>
-      </p:sp>
-      <p:sp>
-        <p:nvSpPr>
-          <p:cNvPr id="5" name="Subtitle 4">
-            <a:extLst>
-              <a:ext uri="{FF2B5EF4-FFF2-40B4-BE49-F238E27FC236}">
-                <a16:creationId xmlns:a16="http://schemas.microsoft.com/office/drawing/2014/main" id="{6D5A54D7-7497-4294-9F70-89D29246BBA1}"/>
-              </a:ext>
-            </a:extLst>
-          </p:cNvPr>
-          <p:cNvSpPr>
-            <a:spLocks noGrp="1"/>
-          </p:cNvSpPr>
-          <p:nvPr>
-            <p:ph type="subTitle" idx="1"/>
-          </p:nvPr>
-        </p:nvSpPr>
-        <p:spPr/>
-        <p:txBody>
-          <a:bodyPr/>
-          <a:lstStyle/>
-          <a:p>
-            <a:endParaRPr lang="nl-NL"/>
-          </a:p>
-        </p:txBody>
-      </p:sp>
-    </p:spTree>
-  </p:cSld>
-  <p:clrMapOvr>
-    <a:masterClrMapping/>
-  </p:clrMapOvr>
-</p:sld>
-</file>
-
-<file path=ppt/slides/slide24.xml><?xml version="1.0" encoding="utf-8"?>
-<p:sld xmlns:a="http://schemas.openxmlformats.org/drawingml/2006/main" xmlns:r="http://schemas.openxmlformats.org/officeDocument/2006/relationships" xmlns:p="http://schemas.openxmlformats.org/presentationml/2006/main">
   <p:cSld name="Slide56">
     <p:bg>
       <p:bgPr>
@@ -10386,43 +10293,230 @@
               <a:buChar char="_"/>
             </a:pPr>
             <a:r>
-              <a:rPr lang="nl-NL">
-                <a:solidFill>
-                  <a:srgbClr val="00FF00"/>
-                </a:solidFill>
-                <a:latin typeface="Courier New" pitchFamily="49"/>
-                <a:cs typeface="Courier New" pitchFamily="49"/>
-              </a:rPr>
-              <a:t>Determine response to be sent based on specific request characteristics</a:t>
-            </a:r>
-          </a:p>
-          <a:p>
-            <a:pPr lvl="0">
-              <a:buFont typeface="Courier New" pitchFamily="49"/>
-              <a:buChar char="_"/>
-            </a:pPr>
-            <a:endParaRPr lang="nl-NL">
-              <a:solidFill>
-                <a:srgbClr val="00FF00"/>
-              </a:solidFill>
-              <a:latin typeface="Courier New" pitchFamily="49"/>
-              <a:cs typeface="Courier New" pitchFamily="49"/>
-            </a:endParaRPr>
-          </a:p>
-          <a:p>
-            <a:pPr lvl="0">
-              <a:buFont typeface="Courier New" pitchFamily="49"/>
-              <a:buChar char="_"/>
-            </a:pPr>
-            <a:r>
-              <a:rPr lang="nl-NL">
-                <a:solidFill>
-                  <a:srgbClr val="00FF00"/>
-                </a:solidFill>
-                <a:latin typeface="Courier New" pitchFamily="49"/>
-                <a:cs typeface="Courier New" pitchFamily="49"/>
-              </a:rPr>
-              <a:t>Options:</a:t>
+              <a:rPr lang="nl-NL" dirty="0" err="1">
+                <a:solidFill>
+                  <a:srgbClr val="00FF00"/>
+                </a:solidFill>
+                <a:latin typeface="Courier New" pitchFamily="49"/>
+                <a:cs typeface="Courier New" pitchFamily="49"/>
+              </a:rPr>
+              <a:t>Send</a:t>
+            </a:r>
+            <a:r>
+              <a:rPr lang="nl-NL" dirty="0">
+                <a:solidFill>
+                  <a:srgbClr val="00FF00"/>
+                </a:solidFill>
+                <a:latin typeface="Courier New" pitchFamily="49"/>
+                <a:cs typeface="Courier New" pitchFamily="49"/>
+              </a:rPr>
+              <a:t> a response </a:t>
+            </a:r>
+            <a:r>
+              <a:rPr lang="nl-NL" dirty="0" err="1">
+                <a:solidFill>
+                  <a:srgbClr val="00FF00"/>
+                </a:solidFill>
+                <a:latin typeface="Courier New" pitchFamily="49"/>
+                <a:cs typeface="Courier New" pitchFamily="49"/>
+              </a:rPr>
+              <a:t>only</a:t>
+            </a:r>
+            <a:r>
+              <a:rPr lang="nl-NL" dirty="0">
+                <a:solidFill>
+                  <a:srgbClr val="00FF00"/>
+                </a:solidFill>
+                <a:latin typeface="Courier New" pitchFamily="49"/>
+                <a:cs typeface="Courier New" pitchFamily="49"/>
+              </a:rPr>
+              <a:t> </a:t>
+            </a:r>
+            <a:r>
+              <a:rPr lang="nl-NL" dirty="0" err="1">
+                <a:solidFill>
+                  <a:srgbClr val="00FF00"/>
+                </a:solidFill>
+                <a:latin typeface="Courier New" pitchFamily="49"/>
+                <a:cs typeface="Courier New" pitchFamily="49"/>
+              </a:rPr>
+              <a:t>when</a:t>
+            </a:r>
+            <a:r>
+              <a:rPr lang="nl-NL" dirty="0">
+                <a:solidFill>
+                  <a:srgbClr val="00FF00"/>
+                </a:solidFill>
+                <a:latin typeface="Courier New" pitchFamily="49"/>
+                <a:cs typeface="Courier New" pitchFamily="49"/>
+              </a:rPr>
+              <a:t> </a:t>
+            </a:r>
+            <a:r>
+              <a:rPr lang="nl-NL" dirty="0" err="1">
+                <a:solidFill>
+                  <a:srgbClr val="00FF00"/>
+                </a:solidFill>
+                <a:latin typeface="Courier New" pitchFamily="49"/>
+                <a:cs typeface="Courier New" pitchFamily="49"/>
+              </a:rPr>
+              <a:t>certain</a:t>
+            </a:r>
+            <a:r>
+              <a:rPr lang="nl-NL" dirty="0">
+                <a:solidFill>
+                  <a:srgbClr val="00FF00"/>
+                </a:solidFill>
+                <a:latin typeface="Courier New" pitchFamily="49"/>
+                <a:cs typeface="Courier New" pitchFamily="49"/>
+              </a:rPr>
+              <a:t> </a:t>
+            </a:r>
+            <a:r>
+              <a:rPr lang="nl-NL" dirty="0" err="1">
+                <a:solidFill>
+                  <a:srgbClr val="00FF00"/>
+                </a:solidFill>
+                <a:latin typeface="Courier New" pitchFamily="49"/>
+                <a:cs typeface="Courier New" pitchFamily="49"/>
+              </a:rPr>
+              <a:t>properties</a:t>
+            </a:r>
+            <a:r>
+              <a:rPr lang="nl-NL" dirty="0">
+                <a:solidFill>
+                  <a:srgbClr val="00FF00"/>
+                </a:solidFill>
+                <a:latin typeface="Courier New" pitchFamily="49"/>
+                <a:cs typeface="Courier New" pitchFamily="49"/>
+              </a:rPr>
+              <a:t> in </a:t>
+            </a:r>
+            <a:r>
+              <a:rPr lang="nl-NL" dirty="0" err="1">
+                <a:solidFill>
+                  <a:srgbClr val="00FF00"/>
+                </a:solidFill>
+                <a:latin typeface="Courier New" pitchFamily="49"/>
+                <a:cs typeface="Courier New" pitchFamily="49"/>
+              </a:rPr>
+              <a:t>the</a:t>
+            </a:r>
+            <a:r>
+              <a:rPr lang="nl-NL" dirty="0">
+                <a:solidFill>
+                  <a:srgbClr val="00FF00"/>
+                </a:solidFill>
+                <a:latin typeface="Courier New" pitchFamily="49"/>
+                <a:cs typeface="Courier New" pitchFamily="49"/>
+              </a:rPr>
+              <a:t> </a:t>
+            </a:r>
+            <a:r>
+              <a:rPr lang="nl-NL" dirty="0" err="1">
+                <a:solidFill>
+                  <a:srgbClr val="00FF00"/>
+                </a:solidFill>
+                <a:latin typeface="Courier New" pitchFamily="49"/>
+                <a:cs typeface="Courier New" pitchFamily="49"/>
+              </a:rPr>
+              <a:t>request</a:t>
+            </a:r>
+            <a:r>
+              <a:rPr lang="nl-NL" dirty="0">
+                <a:solidFill>
+                  <a:srgbClr val="00FF00"/>
+                </a:solidFill>
+                <a:latin typeface="Courier New" pitchFamily="49"/>
+                <a:cs typeface="Courier New" pitchFamily="49"/>
+              </a:rPr>
+              <a:t> are </a:t>
+            </a:r>
+            <a:r>
+              <a:rPr lang="nl-NL" dirty="0" err="1">
+                <a:solidFill>
+                  <a:srgbClr val="00FF00"/>
+                </a:solidFill>
+                <a:latin typeface="Courier New" pitchFamily="49"/>
+                <a:cs typeface="Courier New" pitchFamily="49"/>
+              </a:rPr>
+              <a:t>matched</a:t>
+            </a:r>
+            <a:endParaRPr lang="nl-NL" dirty="0">
+              <a:solidFill>
+                <a:srgbClr val="00FF00"/>
+              </a:solidFill>
+              <a:latin typeface="Courier New" pitchFamily="49"/>
+              <a:cs typeface="Courier New" pitchFamily="49"/>
+            </a:endParaRPr>
+          </a:p>
+          <a:p>
+            <a:pPr lvl="0">
+              <a:buFont typeface="Courier New" pitchFamily="49"/>
+              <a:buChar char="_"/>
+            </a:pPr>
+            <a:endParaRPr lang="nl-NL" dirty="0">
+              <a:solidFill>
+                <a:srgbClr val="00FF00"/>
+              </a:solidFill>
+              <a:latin typeface="Courier New" pitchFamily="49"/>
+              <a:cs typeface="Courier New" pitchFamily="49"/>
+            </a:endParaRPr>
+          </a:p>
+          <a:p>
+            <a:pPr lvl="0">
+              <a:buFont typeface="Courier New" pitchFamily="49"/>
+              <a:buChar char="_"/>
+            </a:pPr>
+            <a:r>
+              <a:rPr lang="nl-NL" dirty="0">
+                <a:solidFill>
+                  <a:srgbClr val="00FF00"/>
+                </a:solidFill>
+                <a:latin typeface="Courier New" pitchFamily="49"/>
+                <a:cs typeface="Courier New" pitchFamily="49"/>
+              </a:rPr>
+              <a:t>Options </a:t>
+            </a:r>
+            <a:r>
+              <a:rPr lang="nl-NL" dirty="0" err="1">
+                <a:solidFill>
+                  <a:srgbClr val="00FF00"/>
+                </a:solidFill>
+                <a:latin typeface="Courier New" pitchFamily="49"/>
+                <a:cs typeface="Courier New" pitchFamily="49"/>
+              </a:rPr>
+              <a:t>for</a:t>
+            </a:r>
+            <a:r>
+              <a:rPr lang="nl-NL" dirty="0">
+                <a:solidFill>
+                  <a:srgbClr val="00FF00"/>
+                </a:solidFill>
+                <a:latin typeface="Courier New" pitchFamily="49"/>
+                <a:cs typeface="Courier New" pitchFamily="49"/>
+              </a:rPr>
+              <a:t> </a:t>
+            </a:r>
+            <a:r>
+              <a:rPr lang="nl-NL" dirty="0" err="1">
+                <a:solidFill>
+                  <a:srgbClr val="00FF00"/>
+                </a:solidFill>
+                <a:latin typeface="Courier New" pitchFamily="49"/>
+                <a:cs typeface="Courier New" pitchFamily="49"/>
+              </a:rPr>
+              <a:t>request</a:t>
+            </a:r>
+            <a:r>
+              <a:rPr lang="nl-NL" dirty="0">
+                <a:solidFill>
+                  <a:srgbClr val="00FF00"/>
+                </a:solidFill>
+                <a:latin typeface="Courier New" pitchFamily="49"/>
+                <a:cs typeface="Courier New" pitchFamily="49"/>
+              </a:rPr>
+              <a:t> matching:</a:t>
             </a:r>
           </a:p>
           <a:p>
@@ -10431,7 +10525,7 @@
               <a:buChar char="_"/>
             </a:pPr>
             <a:r>
-              <a:rPr lang="nl-NL">
+              <a:rPr lang="nl-NL" dirty="0">
                 <a:solidFill>
                   <a:srgbClr val="00FF00"/>
                 </a:solidFill>
@@ -10447,15 +10541,32 @@
               <a:buChar char="_"/>
             </a:pPr>
             <a:r>
-              <a:rPr lang="nl-NL">
-                <a:solidFill>
-                  <a:srgbClr val="00FF00"/>
-                </a:solidFill>
-                <a:latin typeface="Courier New" pitchFamily="49"/>
-                <a:cs typeface="Courier New" pitchFamily="49"/>
-              </a:rPr>
-              <a:t>HTTP method</a:t>
-            </a:r>
+              <a:rPr lang="nl-NL" dirty="0">
+                <a:solidFill>
+                  <a:srgbClr val="00FF00"/>
+                </a:solidFill>
+                <a:latin typeface="Courier New" pitchFamily="49"/>
+                <a:cs typeface="Courier New" pitchFamily="49"/>
+              </a:rPr>
+              <a:t>HTTP </a:t>
+            </a:r>
+            <a:r>
+              <a:rPr lang="nl-NL" dirty="0" err="1">
+                <a:solidFill>
+                  <a:srgbClr val="00FF00"/>
+                </a:solidFill>
+                <a:latin typeface="Courier New" pitchFamily="49"/>
+                <a:cs typeface="Courier New" pitchFamily="49"/>
+              </a:rPr>
+              <a:t>method</a:t>
+            </a:r>
+            <a:endParaRPr lang="nl-NL" dirty="0">
+              <a:solidFill>
+                <a:srgbClr val="00FF00"/>
+              </a:solidFill>
+              <a:latin typeface="Courier New" pitchFamily="49"/>
+              <a:cs typeface="Courier New" pitchFamily="49"/>
+            </a:endParaRPr>
           </a:p>
           <a:p>
             <a:pPr lvl="1">
@@ -10463,7 +10574,7 @@
               <a:buChar char="_"/>
             </a:pPr>
             <a:r>
-              <a:rPr lang="nl-NL">
+              <a:rPr lang="nl-NL" dirty="0">
                 <a:solidFill>
                   <a:srgbClr val="00FF00"/>
                 </a:solidFill>
@@ -10479,7 +10590,7 @@
               <a:buChar char="_"/>
             </a:pPr>
             <a:r>
-              <a:rPr lang="nl-NL">
+              <a:rPr lang="nl-NL" dirty="0">
                 <a:solidFill>
                   <a:srgbClr val="00FF00"/>
                 </a:solidFill>
@@ -10495,15 +10606,42 @@
               <a:buChar char="_"/>
             </a:pPr>
             <a:r>
-              <a:rPr lang="nl-NL">
-                <a:solidFill>
-                  <a:srgbClr val="00FF00"/>
-                </a:solidFill>
-                <a:latin typeface="Courier New" pitchFamily="49"/>
-                <a:cs typeface="Courier New" pitchFamily="49"/>
-              </a:rPr>
-              <a:t>Request body elements</a:t>
-            </a:r>
+              <a:rPr lang="nl-NL" dirty="0" err="1">
+                <a:solidFill>
+                  <a:srgbClr val="00FF00"/>
+                </a:solidFill>
+                <a:latin typeface="Courier New" pitchFamily="49"/>
+                <a:cs typeface="Courier New" pitchFamily="49"/>
+              </a:rPr>
+              <a:t>Request</a:t>
+            </a:r>
+            <a:r>
+              <a:rPr lang="nl-NL" dirty="0">
+                <a:solidFill>
+                  <a:srgbClr val="00FF00"/>
+                </a:solidFill>
+                <a:latin typeface="Courier New" pitchFamily="49"/>
+                <a:cs typeface="Courier New" pitchFamily="49"/>
+              </a:rPr>
+              <a:t> body </a:t>
+            </a:r>
+            <a:r>
+              <a:rPr lang="nl-NL" dirty="0" err="1">
+                <a:solidFill>
+                  <a:srgbClr val="00FF00"/>
+                </a:solidFill>
+                <a:latin typeface="Courier New" pitchFamily="49"/>
+                <a:cs typeface="Courier New" pitchFamily="49"/>
+              </a:rPr>
+              <a:t>elements</a:t>
+            </a:r>
+            <a:endParaRPr lang="nl-NL" dirty="0">
+              <a:solidFill>
+                <a:srgbClr val="00FF00"/>
+              </a:solidFill>
+              <a:latin typeface="Courier New" pitchFamily="49"/>
+              <a:cs typeface="Courier New" pitchFamily="49"/>
+            </a:endParaRPr>
           </a:p>
           <a:p>
             <a:pPr lvl="1">
@@ -10511,7 +10649,7 @@
               <a:buChar char="_"/>
             </a:pPr>
             <a:r>
-              <a:rPr lang="nl-NL">
+              <a:rPr lang="nl-NL" dirty="0">
                 <a:solidFill>
                   <a:srgbClr val="00FF00"/>
                 </a:solidFill>
@@ -10531,7 +10669,7 @@
 </p:sld>
 </file>
 
-<file path=ppt/slides/slide25.xml><?xml version="1.0" encoding="utf-8"?>
+<file path=ppt/slides/slide24.xml><?xml version="1.0" encoding="utf-8"?>
 <p:sld xmlns:a="http://schemas.openxmlformats.org/drawingml/2006/main" xmlns:r="http://schemas.openxmlformats.org/officeDocument/2006/relationships" xmlns:p="http://schemas.openxmlformats.org/presentationml/2006/main">
   <p:cSld name="Slide57">
     <p:bg>
@@ -10621,80 +10759,90 @@
               <a:buFont typeface="Courier New" pitchFamily="49"/>
               <a:buChar char="_"/>
             </a:pPr>
-            <a:endParaRPr lang="nl-NL">
-              <a:solidFill>
-                <a:srgbClr val="00FF00"/>
-              </a:solidFill>
-              <a:latin typeface="Courier New" pitchFamily="49"/>
-              <a:cs typeface="Courier New" pitchFamily="49"/>
-            </a:endParaRPr>
-          </a:p>
-          <a:p>
-            <a:pPr lvl="0">
-              <a:buFont typeface="Courier New" pitchFamily="49"/>
-              <a:buChar char="_"/>
-            </a:pPr>
-            <a:endParaRPr lang="nl-NL">
-              <a:solidFill>
-                <a:srgbClr val="00FF00"/>
-              </a:solidFill>
-              <a:latin typeface="Courier New" pitchFamily="49"/>
-              <a:cs typeface="Courier New" pitchFamily="49"/>
-            </a:endParaRPr>
-          </a:p>
-          <a:p>
-            <a:pPr lvl="0">
-              <a:buFont typeface="Courier New" pitchFamily="49"/>
-              <a:buChar char="_"/>
-            </a:pPr>
-            <a:endParaRPr lang="nl-NL">
-              <a:solidFill>
-                <a:srgbClr val="00FF00"/>
-              </a:solidFill>
-              <a:latin typeface="Courier New" pitchFamily="49"/>
-              <a:cs typeface="Courier New" pitchFamily="49"/>
-            </a:endParaRPr>
-          </a:p>
-          <a:p>
-            <a:pPr lvl="0">
-              <a:buFont typeface="Courier New" pitchFamily="49"/>
-              <a:buChar char="_"/>
-            </a:pPr>
-            <a:endParaRPr lang="nl-NL">
-              <a:solidFill>
-                <a:srgbClr val="00FF00"/>
-              </a:solidFill>
-              <a:latin typeface="Courier New" pitchFamily="49"/>
-              <a:cs typeface="Courier New" pitchFamily="49"/>
-            </a:endParaRPr>
-          </a:p>
-          <a:p>
-            <a:pPr lvl="0">
-              <a:buFont typeface="Courier New" pitchFamily="49"/>
-              <a:buChar char="_"/>
-            </a:pPr>
-            <a:endParaRPr lang="nl-NL">
-              <a:solidFill>
-                <a:srgbClr val="00FF00"/>
-              </a:solidFill>
-              <a:latin typeface="Courier New" pitchFamily="49"/>
-              <a:cs typeface="Courier New" pitchFamily="49"/>
-            </a:endParaRPr>
-          </a:p>
-          <a:p>
-            <a:pPr lvl="0">
-              <a:buFont typeface="Courier New" pitchFamily="49"/>
-              <a:buChar char="_"/>
-            </a:pPr>
-            <a:r>
-              <a:rPr lang="nl-NL">
-                <a:solidFill>
-                  <a:srgbClr val="00FF00"/>
-                </a:solidFill>
-                <a:latin typeface="Courier New" pitchFamily="49"/>
-                <a:cs typeface="Courier New" pitchFamily="49"/>
-              </a:rPr>
-              <a:t>Other URL options:</a:t>
+            <a:endParaRPr lang="nl-NL" dirty="0">
+              <a:solidFill>
+                <a:srgbClr val="00FF00"/>
+              </a:solidFill>
+              <a:latin typeface="Courier New" pitchFamily="49"/>
+              <a:cs typeface="Courier New" pitchFamily="49"/>
+            </a:endParaRPr>
+          </a:p>
+          <a:p>
+            <a:pPr lvl="0">
+              <a:buFont typeface="Courier New" pitchFamily="49"/>
+              <a:buChar char="_"/>
+            </a:pPr>
+            <a:endParaRPr lang="nl-NL" dirty="0">
+              <a:solidFill>
+                <a:srgbClr val="00FF00"/>
+              </a:solidFill>
+              <a:latin typeface="Courier New" pitchFamily="49"/>
+              <a:cs typeface="Courier New" pitchFamily="49"/>
+            </a:endParaRPr>
+          </a:p>
+          <a:p>
+            <a:pPr lvl="0">
+              <a:buFont typeface="Courier New" pitchFamily="49"/>
+              <a:buChar char="_"/>
+            </a:pPr>
+            <a:endParaRPr lang="nl-NL" dirty="0">
+              <a:solidFill>
+                <a:srgbClr val="00FF00"/>
+              </a:solidFill>
+              <a:latin typeface="Courier New" pitchFamily="49"/>
+              <a:cs typeface="Courier New" pitchFamily="49"/>
+            </a:endParaRPr>
+          </a:p>
+          <a:p>
+            <a:pPr lvl="0">
+              <a:buFont typeface="Courier New" pitchFamily="49"/>
+              <a:buChar char="_"/>
+            </a:pPr>
+            <a:endParaRPr lang="nl-NL" dirty="0">
+              <a:solidFill>
+                <a:srgbClr val="00FF00"/>
+              </a:solidFill>
+              <a:latin typeface="Courier New" pitchFamily="49"/>
+              <a:cs typeface="Courier New" pitchFamily="49"/>
+            </a:endParaRPr>
+          </a:p>
+          <a:p>
+            <a:pPr lvl="0">
+              <a:buFont typeface="Courier New" pitchFamily="49"/>
+              <a:buChar char="_"/>
+            </a:pPr>
+            <a:endParaRPr lang="nl-NL" dirty="0">
+              <a:solidFill>
+                <a:srgbClr val="00FF00"/>
+              </a:solidFill>
+              <a:latin typeface="Courier New" pitchFamily="49"/>
+              <a:cs typeface="Courier New" pitchFamily="49"/>
+            </a:endParaRPr>
+          </a:p>
+          <a:p>
+            <a:pPr lvl="0">
+              <a:buFont typeface="Courier New" pitchFamily="49"/>
+              <a:buChar char="_"/>
+            </a:pPr>
+            <a:r>
+              <a:rPr lang="nl-NL" dirty="0" err="1">
+                <a:solidFill>
+                  <a:srgbClr val="00FF00"/>
+                </a:solidFill>
+                <a:latin typeface="Courier New" pitchFamily="49"/>
+                <a:cs typeface="Courier New" pitchFamily="49"/>
+              </a:rPr>
+              <a:t>Other</a:t>
+            </a:r>
+            <a:r>
+              <a:rPr lang="nl-NL" dirty="0">
+                <a:solidFill>
+                  <a:srgbClr val="00FF00"/>
+                </a:solidFill>
+                <a:latin typeface="Courier New" pitchFamily="49"/>
+                <a:cs typeface="Courier New" pitchFamily="49"/>
+              </a:rPr>
+              <a:t> URL options:</a:t>
             </a:r>
           </a:p>
           <a:p>
@@ -10703,7 +10851,7 @@
               <a:buChar char="_"/>
             </a:pPr>
             <a:r>
-              <a:rPr lang="nl-NL">
+              <a:rPr lang="nl-NL" dirty="0" err="1">
                 <a:solidFill>
                   <a:srgbClr val="00FF00"/>
                 </a:solidFill>
@@ -10712,6 +10860,56 @@
               </a:rPr>
               <a:t>urlPathEqualTo</a:t>
             </a:r>
+            <a:r>
+              <a:rPr lang="nl-NL" dirty="0">
+                <a:solidFill>
+                  <a:srgbClr val="00FF00"/>
+                </a:solidFill>
+                <a:latin typeface="Courier New" pitchFamily="49"/>
+                <a:cs typeface="Courier New" pitchFamily="49"/>
+              </a:rPr>
+              <a:t> (</a:t>
+            </a:r>
+            <a:r>
+              <a:rPr lang="nl-NL" dirty="0" err="1">
+                <a:solidFill>
+                  <a:srgbClr val="00FF00"/>
+                </a:solidFill>
+                <a:latin typeface="Courier New" pitchFamily="49"/>
+                <a:cs typeface="Courier New" pitchFamily="49"/>
+              </a:rPr>
+              <a:t>using</a:t>
+            </a:r>
+            <a:r>
+              <a:rPr lang="nl-NL" dirty="0">
+                <a:solidFill>
+                  <a:srgbClr val="00FF00"/>
+                </a:solidFill>
+                <a:latin typeface="Courier New" pitchFamily="49"/>
+                <a:cs typeface="Courier New" pitchFamily="49"/>
+              </a:rPr>
+              <a:t> exact </a:t>
+            </a:r>
+            <a:r>
+              <a:rPr lang="nl-NL" dirty="0" err="1">
+                <a:solidFill>
+                  <a:srgbClr val="00FF00"/>
+                </a:solidFill>
+                <a:latin typeface="Courier New" pitchFamily="49"/>
+                <a:cs typeface="Courier New" pitchFamily="49"/>
+              </a:rPr>
+              <a:t>values</a:t>
+            </a:r>
+            <a:r>
+              <a:rPr lang="nl-NL" dirty="0">
+                <a:solidFill>
+                  <a:srgbClr val="00FF00"/>
+                </a:solidFill>
+                <a:latin typeface="Courier New" pitchFamily="49"/>
+                <a:cs typeface="Courier New" pitchFamily="49"/>
+              </a:rPr>
+              <a:t>)</a:t>
+            </a:r>
           </a:p>
           <a:p>
             <a:pPr lvl="1">
@@ -10719,7 +10917,7 @@
               <a:buChar char="_"/>
             </a:pPr>
             <a:r>
-              <a:rPr lang="nl-NL">
+              <a:rPr lang="nl-NL" dirty="0" err="1">
                 <a:solidFill>
                   <a:srgbClr val="00FF00"/>
                 </a:solidFill>
@@ -10728,6 +10926,76 @@
               </a:rPr>
               <a:t>urlMatching</a:t>
             </a:r>
+            <a:r>
+              <a:rPr lang="nl-NL" dirty="0">
+                <a:solidFill>
+                  <a:srgbClr val="00FF00"/>
+                </a:solidFill>
+                <a:latin typeface="Courier New" pitchFamily="49"/>
+                <a:cs typeface="Courier New" pitchFamily="49"/>
+              </a:rPr>
+              <a:t> (</a:t>
+            </a:r>
+            <a:r>
+              <a:rPr lang="nl-NL" dirty="0" err="1">
+                <a:solidFill>
+                  <a:srgbClr val="00FF00"/>
+                </a:solidFill>
+                <a:latin typeface="Courier New" pitchFamily="49"/>
+                <a:cs typeface="Courier New" pitchFamily="49"/>
+              </a:rPr>
+              <a:t>using</a:t>
+            </a:r>
+            <a:r>
+              <a:rPr lang="nl-NL" dirty="0">
+                <a:solidFill>
+                  <a:srgbClr val="00FF00"/>
+                </a:solidFill>
+                <a:latin typeface="Courier New" pitchFamily="49"/>
+                <a:cs typeface="Courier New" pitchFamily="49"/>
+              </a:rPr>
+              <a:t> </a:t>
+            </a:r>
+            <a:r>
+              <a:rPr lang="nl-NL" dirty="0" err="1">
+                <a:solidFill>
+                  <a:srgbClr val="00FF00"/>
+                </a:solidFill>
+                <a:latin typeface="Courier New" pitchFamily="49"/>
+                <a:cs typeface="Courier New" pitchFamily="49"/>
+              </a:rPr>
+              <a:t>regular</a:t>
+            </a:r>
+            <a:r>
+              <a:rPr lang="nl-NL" dirty="0">
+                <a:solidFill>
+                  <a:srgbClr val="00FF00"/>
+                </a:solidFill>
+                <a:latin typeface="Courier New" pitchFamily="49"/>
+                <a:cs typeface="Courier New" pitchFamily="49"/>
+              </a:rPr>
+              <a:t> </a:t>
+            </a:r>
+            <a:r>
+              <a:rPr lang="nl-NL" dirty="0" err="1">
+                <a:solidFill>
+                  <a:srgbClr val="00FF00"/>
+                </a:solidFill>
+                <a:latin typeface="Courier New" pitchFamily="49"/>
+                <a:cs typeface="Courier New" pitchFamily="49"/>
+              </a:rPr>
+              <a:t>expressions</a:t>
+            </a:r>
+            <a:r>
+              <a:rPr lang="nl-NL" dirty="0">
+                <a:solidFill>
+                  <a:srgbClr val="00FF00"/>
+                </a:solidFill>
+                <a:latin typeface="Courier New" pitchFamily="49"/>
+                <a:cs typeface="Courier New" pitchFamily="49"/>
+              </a:rPr>
+              <a:t>)</a:t>
+            </a:r>
           </a:p>
           <a:p>
             <a:pPr lvl="1">
@@ -10735,7 +11003,7 @@
               <a:buChar char="_"/>
             </a:pPr>
             <a:r>
-              <a:rPr lang="nl-NL">
+              <a:rPr lang="nl-NL" dirty="0" err="1">
                 <a:solidFill>
                   <a:srgbClr val="00FF00"/>
                 </a:solidFill>
@@ -10743,6 +11011,76 @@
                 <a:cs typeface="Courier New" pitchFamily="49"/>
               </a:rPr>
               <a:t>urlPathMatching</a:t>
+            </a:r>
+            <a:r>
+              <a:rPr lang="nl-NL" dirty="0">
+                <a:solidFill>
+                  <a:srgbClr val="00FF00"/>
+                </a:solidFill>
+                <a:latin typeface="Courier New" pitchFamily="49"/>
+                <a:cs typeface="Courier New" pitchFamily="49"/>
+              </a:rPr>
+              <a:t> (</a:t>
+            </a:r>
+            <a:r>
+              <a:rPr lang="nl-NL" dirty="0" err="1">
+                <a:solidFill>
+                  <a:srgbClr val="00FF00"/>
+                </a:solidFill>
+                <a:latin typeface="Courier New" pitchFamily="49"/>
+                <a:cs typeface="Courier New" pitchFamily="49"/>
+              </a:rPr>
+              <a:t>using</a:t>
+            </a:r>
+            <a:r>
+              <a:rPr lang="nl-NL" dirty="0">
+                <a:solidFill>
+                  <a:srgbClr val="00FF00"/>
+                </a:solidFill>
+                <a:latin typeface="Courier New" pitchFamily="49"/>
+                <a:cs typeface="Courier New" pitchFamily="49"/>
+              </a:rPr>
+              <a:t> </a:t>
+            </a:r>
+            <a:r>
+              <a:rPr lang="nl-NL" dirty="0" err="1">
+                <a:solidFill>
+                  <a:srgbClr val="00FF00"/>
+                </a:solidFill>
+                <a:latin typeface="Courier New" pitchFamily="49"/>
+                <a:cs typeface="Courier New" pitchFamily="49"/>
+              </a:rPr>
+              <a:t>regular</a:t>
+            </a:r>
+            <a:r>
+              <a:rPr lang="nl-NL" dirty="0">
+                <a:solidFill>
+                  <a:srgbClr val="00FF00"/>
+                </a:solidFill>
+                <a:latin typeface="Courier New" pitchFamily="49"/>
+                <a:cs typeface="Courier New" pitchFamily="49"/>
+              </a:rPr>
+              <a:t> </a:t>
+            </a:r>
+            <a:r>
+              <a:rPr lang="nl-NL" dirty="0" err="1">
+                <a:solidFill>
+                  <a:srgbClr val="00FF00"/>
+                </a:solidFill>
+                <a:latin typeface="Courier New" pitchFamily="49"/>
+                <a:cs typeface="Courier New" pitchFamily="49"/>
+              </a:rPr>
+              <a:t>expressions</a:t>
+            </a:r>
+            <a:r>
+              <a:rPr lang="nl-NL" dirty="0">
+                <a:solidFill>
+                  <a:srgbClr val="00FF00"/>
+                </a:solidFill>
+                <a:latin typeface="Courier New" pitchFamily="49"/>
+                <a:cs typeface="Courier New" pitchFamily="49"/>
+              </a:rPr>
+              <a:t>)</a:t>
             </a:r>
           </a:p>
         </p:txBody>
@@ -10789,7 +11127,7 @@
 </p:sld>
 </file>
 
-<file path=ppt/slides/slide26.xml><?xml version="1.0" encoding="utf-8"?>
+<file path=ppt/slides/slide25.xml><?xml version="1.0" encoding="utf-8"?>
 <p:sld xmlns:a="http://schemas.openxmlformats.org/drawingml/2006/main" xmlns:r="http://schemas.openxmlformats.org/officeDocument/2006/relationships" xmlns:p="http://schemas.openxmlformats.org/presentationml/2006/main">
   <p:cSld name="Slide58">
     <p:bg>
@@ -10879,80 +11217,110 @@
               <a:buFont typeface="Courier New" pitchFamily="49"/>
               <a:buChar char="_"/>
             </a:pPr>
-            <a:endParaRPr lang="nl-NL">
-              <a:solidFill>
-                <a:srgbClr val="00FF00"/>
-              </a:solidFill>
-              <a:latin typeface="Courier New" pitchFamily="49"/>
-              <a:cs typeface="Courier New" pitchFamily="49"/>
-            </a:endParaRPr>
-          </a:p>
-          <a:p>
-            <a:pPr lvl="0">
-              <a:buFont typeface="Courier New" pitchFamily="49"/>
-              <a:buChar char="_"/>
-            </a:pPr>
-            <a:endParaRPr lang="nl-NL">
-              <a:solidFill>
-                <a:srgbClr val="00FF00"/>
-              </a:solidFill>
-              <a:latin typeface="Courier New" pitchFamily="49"/>
-              <a:cs typeface="Courier New" pitchFamily="49"/>
-            </a:endParaRPr>
-          </a:p>
-          <a:p>
-            <a:pPr lvl="0">
-              <a:buFont typeface="Courier New" pitchFamily="49"/>
-              <a:buChar char="_"/>
-            </a:pPr>
-            <a:endParaRPr lang="nl-NL">
-              <a:solidFill>
-                <a:srgbClr val="00FF00"/>
-              </a:solidFill>
-              <a:latin typeface="Courier New" pitchFamily="49"/>
-              <a:cs typeface="Courier New" pitchFamily="49"/>
-            </a:endParaRPr>
-          </a:p>
-          <a:p>
-            <a:pPr lvl="0">
-              <a:buFont typeface="Courier New" pitchFamily="49"/>
-              <a:buChar char="_"/>
-            </a:pPr>
-            <a:endParaRPr lang="nl-NL">
-              <a:solidFill>
-                <a:srgbClr val="00FF00"/>
-              </a:solidFill>
-              <a:latin typeface="Courier New" pitchFamily="49"/>
-              <a:cs typeface="Courier New" pitchFamily="49"/>
-            </a:endParaRPr>
-          </a:p>
-          <a:p>
-            <a:pPr lvl="0">
-              <a:buFont typeface="Courier New" pitchFamily="49"/>
-              <a:buChar char="_"/>
-            </a:pPr>
-            <a:endParaRPr lang="nl-NL">
-              <a:solidFill>
-                <a:srgbClr val="00FF00"/>
-              </a:solidFill>
-              <a:latin typeface="Courier New" pitchFamily="49"/>
-              <a:cs typeface="Courier New" pitchFamily="49"/>
-            </a:endParaRPr>
-          </a:p>
-          <a:p>
-            <a:pPr lvl="0">
-              <a:buFont typeface="Courier New" pitchFamily="49"/>
-              <a:buChar char="_"/>
-            </a:pPr>
-            <a:r>
-              <a:rPr lang="nl-NL">
-                <a:solidFill>
-                  <a:srgbClr val="00FF00"/>
-                </a:solidFill>
-                <a:latin typeface="Courier New" pitchFamily="49"/>
-                <a:cs typeface="Courier New" pitchFamily="49"/>
-              </a:rPr>
-              <a:t>Other request body matching options:</a:t>
+            <a:endParaRPr lang="nl-NL" dirty="0">
+              <a:solidFill>
+                <a:srgbClr val="00FF00"/>
+              </a:solidFill>
+              <a:latin typeface="Courier New" pitchFamily="49"/>
+              <a:cs typeface="Courier New" pitchFamily="49"/>
+            </a:endParaRPr>
+          </a:p>
+          <a:p>
+            <a:pPr lvl="0">
+              <a:buFont typeface="Courier New" pitchFamily="49"/>
+              <a:buChar char="_"/>
+            </a:pPr>
+            <a:endParaRPr lang="nl-NL" dirty="0">
+              <a:solidFill>
+                <a:srgbClr val="00FF00"/>
+              </a:solidFill>
+              <a:latin typeface="Courier New" pitchFamily="49"/>
+              <a:cs typeface="Courier New" pitchFamily="49"/>
+            </a:endParaRPr>
+          </a:p>
+          <a:p>
+            <a:pPr lvl="0">
+              <a:buFont typeface="Courier New" pitchFamily="49"/>
+              <a:buChar char="_"/>
+            </a:pPr>
+            <a:endParaRPr lang="nl-NL" dirty="0">
+              <a:solidFill>
+                <a:srgbClr val="00FF00"/>
+              </a:solidFill>
+              <a:latin typeface="Courier New" pitchFamily="49"/>
+              <a:cs typeface="Courier New" pitchFamily="49"/>
+            </a:endParaRPr>
+          </a:p>
+          <a:p>
+            <a:pPr lvl="0">
+              <a:buFont typeface="Courier New" pitchFamily="49"/>
+              <a:buChar char="_"/>
+            </a:pPr>
+            <a:endParaRPr lang="nl-NL" dirty="0">
+              <a:solidFill>
+                <a:srgbClr val="00FF00"/>
+              </a:solidFill>
+              <a:latin typeface="Courier New" pitchFamily="49"/>
+              <a:cs typeface="Courier New" pitchFamily="49"/>
+            </a:endParaRPr>
+          </a:p>
+          <a:p>
+            <a:pPr lvl="0">
+              <a:buFont typeface="Courier New" pitchFamily="49"/>
+              <a:buChar char="_"/>
+            </a:pPr>
+            <a:endParaRPr lang="nl-NL" dirty="0">
+              <a:solidFill>
+                <a:srgbClr val="00FF00"/>
+              </a:solidFill>
+              <a:latin typeface="Courier New" pitchFamily="49"/>
+              <a:cs typeface="Courier New" pitchFamily="49"/>
+            </a:endParaRPr>
+          </a:p>
+          <a:p>
+            <a:pPr lvl="0">
+              <a:buFont typeface="Courier New" pitchFamily="49"/>
+              <a:buChar char="_"/>
+            </a:pPr>
+            <a:r>
+              <a:rPr lang="nl-NL" dirty="0" err="1">
+                <a:solidFill>
+                  <a:srgbClr val="00FF00"/>
+                </a:solidFill>
+                <a:latin typeface="Courier New" pitchFamily="49"/>
+                <a:cs typeface="Courier New" pitchFamily="49"/>
+              </a:rPr>
+              <a:t>Other</a:t>
+            </a:r>
+            <a:r>
+              <a:rPr lang="nl-NL" dirty="0">
+                <a:solidFill>
+                  <a:srgbClr val="00FF00"/>
+                </a:solidFill>
+                <a:latin typeface="Courier New" pitchFamily="49"/>
+                <a:cs typeface="Courier New" pitchFamily="49"/>
+              </a:rPr>
+              <a:t> </a:t>
+            </a:r>
+            <a:r>
+              <a:rPr lang="nl-NL" dirty="0" err="1">
+                <a:solidFill>
+                  <a:srgbClr val="00FF00"/>
+                </a:solidFill>
+                <a:latin typeface="Courier New" pitchFamily="49"/>
+                <a:cs typeface="Courier New" pitchFamily="49"/>
+              </a:rPr>
+              <a:t>request</a:t>
+            </a:r>
+            <a:r>
+              <a:rPr lang="nl-NL" dirty="0">
+                <a:solidFill>
+                  <a:srgbClr val="00FF00"/>
+                </a:solidFill>
+                <a:latin typeface="Courier New" pitchFamily="49"/>
+                <a:cs typeface="Courier New" pitchFamily="49"/>
+              </a:rPr>
+              <a:t> body matching options:</a:t>
             </a:r>
           </a:p>
           <a:p>
@@ -10961,7 +11329,7 @@
               <a:buChar char="_"/>
             </a:pPr>
             <a:r>
-              <a:rPr lang="nl-NL">
+              <a:rPr lang="nl-NL" dirty="0" err="1">
                 <a:solidFill>
                   <a:srgbClr val="00FF00"/>
                 </a:solidFill>
@@ -10970,6 +11338,56 @@
               </a:rPr>
               <a:t>equalTo</a:t>
             </a:r>
+            <a:r>
+              <a:rPr lang="nl-NL" dirty="0">
+                <a:solidFill>
+                  <a:srgbClr val="00FF00"/>
+                </a:solidFill>
+                <a:latin typeface="Courier New" pitchFamily="49"/>
+                <a:cs typeface="Courier New" pitchFamily="49"/>
+              </a:rPr>
+              <a:t> (</a:t>
+            </a:r>
+            <a:r>
+              <a:rPr lang="nl-NL" dirty="0" err="1">
+                <a:solidFill>
+                  <a:srgbClr val="00FF00"/>
+                </a:solidFill>
+                <a:latin typeface="Courier New" pitchFamily="49"/>
+                <a:cs typeface="Courier New" pitchFamily="49"/>
+              </a:rPr>
+              <a:t>using</a:t>
+            </a:r>
+            <a:r>
+              <a:rPr lang="nl-NL" dirty="0">
+                <a:solidFill>
+                  <a:srgbClr val="00FF00"/>
+                </a:solidFill>
+                <a:latin typeface="Courier New" pitchFamily="49"/>
+                <a:cs typeface="Courier New" pitchFamily="49"/>
+              </a:rPr>
+              <a:t> exact </a:t>
+            </a:r>
+            <a:r>
+              <a:rPr lang="nl-NL" dirty="0" err="1">
+                <a:solidFill>
+                  <a:srgbClr val="00FF00"/>
+                </a:solidFill>
+                <a:latin typeface="Courier New" pitchFamily="49"/>
+                <a:cs typeface="Courier New" pitchFamily="49"/>
+              </a:rPr>
+              <a:t>values</a:t>
+            </a:r>
+            <a:r>
+              <a:rPr lang="nl-NL" dirty="0">
+                <a:solidFill>
+                  <a:srgbClr val="00FF00"/>
+                </a:solidFill>
+                <a:latin typeface="Courier New" pitchFamily="49"/>
+                <a:cs typeface="Courier New" pitchFamily="49"/>
+              </a:rPr>
+              <a:t>)</a:t>
+            </a:r>
           </a:p>
           <a:p>
             <a:pPr lvl="1">
@@ -10977,22 +11395,102 @@
               <a:buChar char="_"/>
             </a:pPr>
             <a:r>
-              <a:rPr lang="nl-NL">
-                <a:solidFill>
-                  <a:srgbClr val="00FF00"/>
-                </a:solidFill>
-                <a:latin typeface="Courier New" pitchFamily="49"/>
-                <a:cs typeface="Courier New" pitchFamily="49"/>
-              </a:rPr>
-              <a:t>matching, notMatching (using regular expressions)</a:t>
-            </a:r>
-          </a:p>
-          <a:p>
-            <a:pPr lvl="0">
-              <a:buFont typeface="Courier New" pitchFamily="49"/>
-              <a:buChar char="_"/>
-            </a:pPr>
-            <a:endParaRPr lang="nl-NL">
+              <a:rPr lang="nl-NL" dirty="0">
+                <a:solidFill>
+                  <a:srgbClr val="00FF00"/>
+                </a:solidFill>
+                <a:latin typeface="Courier New" pitchFamily="49"/>
+                <a:cs typeface="Courier New" pitchFamily="49"/>
+              </a:rPr>
+              <a:t>matching, </a:t>
+            </a:r>
+            <a:r>
+              <a:rPr lang="nl-NL" dirty="0" err="1">
+                <a:solidFill>
+                  <a:srgbClr val="00FF00"/>
+                </a:solidFill>
+                <a:latin typeface="Courier New" pitchFamily="49"/>
+                <a:cs typeface="Courier New" pitchFamily="49"/>
+              </a:rPr>
+              <a:t>notMatching</a:t>
+            </a:r>
+            <a:r>
+              <a:rPr lang="nl-NL" dirty="0">
+                <a:solidFill>
+                  <a:srgbClr val="00FF00"/>
+                </a:solidFill>
+                <a:latin typeface="Courier New" pitchFamily="49"/>
+                <a:cs typeface="Courier New" pitchFamily="49"/>
+              </a:rPr>
+              <a:t> (</a:t>
+            </a:r>
+            <a:r>
+              <a:rPr lang="nl-NL" dirty="0" err="1">
+                <a:solidFill>
+                  <a:srgbClr val="00FF00"/>
+                </a:solidFill>
+                <a:latin typeface="Courier New" pitchFamily="49"/>
+                <a:cs typeface="Courier New" pitchFamily="49"/>
+              </a:rPr>
+              <a:t>using</a:t>
+            </a:r>
+            <a:r>
+              <a:rPr lang="nl-NL" dirty="0">
+                <a:solidFill>
+                  <a:srgbClr val="00FF00"/>
+                </a:solidFill>
+                <a:latin typeface="Courier New" pitchFamily="49"/>
+                <a:cs typeface="Courier New" pitchFamily="49"/>
+              </a:rPr>
+              <a:t> </a:t>
+            </a:r>
+            <a:r>
+              <a:rPr lang="nl-NL" dirty="0" err="1">
+                <a:solidFill>
+                  <a:srgbClr val="00FF00"/>
+                </a:solidFill>
+                <a:latin typeface="Courier New" pitchFamily="49"/>
+                <a:cs typeface="Courier New" pitchFamily="49"/>
+              </a:rPr>
+              <a:t>regular</a:t>
+            </a:r>
+            <a:r>
+              <a:rPr lang="nl-NL" dirty="0">
+                <a:solidFill>
+                  <a:srgbClr val="00FF00"/>
+                </a:solidFill>
+                <a:latin typeface="Courier New" pitchFamily="49"/>
+                <a:cs typeface="Courier New" pitchFamily="49"/>
+              </a:rPr>
+              <a:t> </a:t>
+            </a:r>
+            <a:r>
+              <a:rPr lang="nl-NL" dirty="0" err="1">
+                <a:solidFill>
+                  <a:srgbClr val="00FF00"/>
+                </a:solidFill>
+                <a:latin typeface="Courier New" pitchFamily="49"/>
+                <a:cs typeface="Courier New" pitchFamily="49"/>
+              </a:rPr>
+              <a:t>expressions</a:t>
+            </a:r>
+            <a:r>
+              <a:rPr lang="nl-NL" dirty="0">
+                <a:solidFill>
+                  <a:srgbClr val="00FF00"/>
+                </a:solidFill>
+                <a:latin typeface="Courier New" pitchFamily="49"/>
+                <a:cs typeface="Courier New" pitchFamily="49"/>
+              </a:rPr>
+              <a:t>)</a:t>
+            </a:r>
+          </a:p>
+          <a:p>
+            <a:pPr lvl="0">
+              <a:buFont typeface="Courier New" pitchFamily="49"/>
+              <a:buChar char="_"/>
+            </a:pPr>
+            <a:endParaRPr lang="nl-NL" dirty="0">
               <a:solidFill>
                 <a:srgbClr val="00FF00"/>
               </a:solidFill>
@@ -11044,7 +11542,7 @@
 </p:sld>
 </file>
 
-<file path=ppt/slides/slide27.xml><?xml version="1.0" encoding="utf-8"?>
+<file path=ppt/slides/slide26.xml><?xml version="1.0" encoding="utf-8"?>
 <p:sld xmlns:a="http://schemas.openxmlformats.org/drawingml/2006/main" xmlns:r="http://schemas.openxmlformats.org/officeDocument/2006/relationships" xmlns:p="http://schemas.openxmlformats.org/presentationml/2006/main">
   <p:cSld name="Slide76">
     <p:bg>
@@ -11134,81 +11632,138 @@
               <a:buFont typeface="Courier New" pitchFamily="49"/>
               <a:buChar char="_"/>
             </a:pPr>
-            <a:endParaRPr lang="nl-NL">
-              <a:solidFill>
-                <a:srgbClr val="00FF00"/>
-              </a:solidFill>
-              <a:latin typeface="Courier New" pitchFamily="49"/>
-              <a:cs typeface="Courier New" pitchFamily="49"/>
-            </a:endParaRPr>
-          </a:p>
-          <a:p>
-            <a:pPr lvl="0">
-              <a:buFont typeface="Courier New" pitchFamily="49"/>
-              <a:buChar char="_"/>
-            </a:pPr>
-            <a:endParaRPr lang="nl-NL">
-              <a:solidFill>
-                <a:srgbClr val="00FF00"/>
-              </a:solidFill>
-              <a:latin typeface="Courier New" pitchFamily="49"/>
-              <a:cs typeface="Courier New" pitchFamily="49"/>
-            </a:endParaRPr>
-          </a:p>
-          <a:p>
-            <a:pPr lvl="0">
-              <a:buFont typeface="Courier New" pitchFamily="49"/>
-              <a:buChar char="_"/>
-            </a:pPr>
-            <a:endParaRPr lang="nl-NL">
-              <a:solidFill>
-                <a:srgbClr val="00FF00"/>
-              </a:solidFill>
-              <a:latin typeface="Courier New" pitchFamily="49"/>
-              <a:cs typeface="Courier New" pitchFamily="49"/>
-            </a:endParaRPr>
-          </a:p>
-          <a:p>
-            <a:pPr lvl="0">
-              <a:buFont typeface="Courier New" pitchFamily="49"/>
-              <a:buChar char="_"/>
-            </a:pPr>
-            <a:endParaRPr lang="nl-NL">
-              <a:solidFill>
-                <a:srgbClr val="00FF00"/>
-              </a:solidFill>
-              <a:latin typeface="Courier New" pitchFamily="49"/>
-              <a:cs typeface="Courier New" pitchFamily="49"/>
-            </a:endParaRPr>
-          </a:p>
-          <a:p>
-            <a:pPr lvl="0">
-              <a:buFont typeface="Courier New" pitchFamily="49"/>
-              <a:buChar char="_"/>
-            </a:pPr>
-            <a:endParaRPr lang="nl-NL">
-              <a:solidFill>
-                <a:srgbClr val="00FF00"/>
-              </a:solidFill>
-              <a:latin typeface="Courier New" pitchFamily="49"/>
-              <a:cs typeface="Courier New" pitchFamily="49"/>
-            </a:endParaRPr>
-          </a:p>
-          <a:p>
-            <a:pPr lvl="0">
-              <a:buFont typeface="Courier New" pitchFamily="49"/>
-              <a:buChar char="_"/>
-            </a:pPr>
-            <a:r>
-              <a:rPr lang="nl-NL">
-                <a:solidFill>
-                  <a:srgbClr val="00FF00"/>
-                </a:solidFill>
-                <a:latin typeface="Courier New" pitchFamily="49"/>
-                <a:cs typeface="Courier New" pitchFamily="49"/>
-              </a:rPr>
-              <a:t>absent(): check parameter is not in request</a:t>
-            </a:r>
+            <a:endParaRPr lang="nl-NL" dirty="0">
+              <a:solidFill>
+                <a:srgbClr val="00FF00"/>
+              </a:solidFill>
+              <a:latin typeface="Courier New" pitchFamily="49"/>
+              <a:cs typeface="Courier New" pitchFamily="49"/>
+            </a:endParaRPr>
+          </a:p>
+          <a:p>
+            <a:pPr lvl="0">
+              <a:buFont typeface="Courier New" pitchFamily="49"/>
+              <a:buChar char="_"/>
+            </a:pPr>
+            <a:endParaRPr lang="nl-NL" dirty="0">
+              <a:solidFill>
+                <a:srgbClr val="00FF00"/>
+              </a:solidFill>
+              <a:latin typeface="Courier New" pitchFamily="49"/>
+              <a:cs typeface="Courier New" pitchFamily="49"/>
+            </a:endParaRPr>
+          </a:p>
+          <a:p>
+            <a:pPr lvl="0">
+              <a:buFont typeface="Courier New" pitchFamily="49"/>
+              <a:buChar char="_"/>
+            </a:pPr>
+            <a:endParaRPr lang="nl-NL" dirty="0">
+              <a:solidFill>
+                <a:srgbClr val="00FF00"/>
+              </a:solidFill>
+              <a:latin typeface="Courier New" pitchFamily="49"/>
+              <a:cs typeface="Courier New" pitchFamily="49"/>
+            </a:endParaRPr>
+          </a:p>
+          <a:p>
+            <a:pPr lvl="0">
+              <a:buFont typeface="Courier New" pitchFamily="49"/>
+              <a:buChar char="_"/>
+            </a:pPr>
+            <a:endParaRPr lang="nl-NL" dirty="0">
+              <a:solidFill>
+                <a:srgbClr val="00FF00"/>
+              </a:solidFill>
+              <a:latin typeface="Courier New" pitchFamily="49"/>
+              <a:cs typeface="Courier New" pitchFamily="49"/>
+            </a:endParaRPr>
+          </a:p>
+          <a:p>
+            <a:pPr lvl="0">
+              <a:buFont typeface="Courier New" pitchFamily="49"/>
+              <a:buChar char="_"/>
+            </a:pPr>
+            <a:endParaRPr lang="nl-NL" dirty="0">
+              <a:solidFill>
+                <a:srgbClr val="00FF00"/>
+              </a:solidFill>
+              <a:latin typeface="Courier New" pitchFamily="49"/>
+              <a:cs typeface="Courier New" pitchFamily="49"/>
+            </a:endParaRPr>
+          </a:p>
+          <a:p>
+            <a:pPr lvl="0">
+              <a:buFont typeface="Courier New" pitchFamily="49"/>
+              <a:buChar char="_"/>
+            </a:pPr>
+            <a:r>
+              <a:rPr lang="nl-NL" dirty="0">
+                <a:solidFill>
+                  <a:srgbClr val="00FF00"/>
+                </a:solidFill>
+                <a:latin typeface="Courier New" pitchFamily="49"/>
+                <a:cs typeface="Courier New" pitchFamily="49"/>
+              </a:rPr>
+              <a:t>absent(): check </a:t>
+            </a:r>
+            <a:r>
+              <a:rPr lang="nl-NL" dirty="0" err="1">
+                <a:solidFill>
+                  <a:srgbClr val="00FF00"/>
+                </a:solidFill>
+                <a:latin typeface="Courier New" pitchFamily="49"/>
+                <a:cs typeface="Courier New" pitchFamily="49"/>
+              </a:rPr>
+              <a:t>that</a:t>
+            </a:r>
+            <a:r>
+              <a:rPr lang="nl-NL" dirty="0">
+                <a:solidFill>
+                  <a:srgbClr val="00FF00"/>
+                </a:solidFill>
+                <a:latin typeface="Courier New" pitchFamily="49"/>
+                <a:cs typeface="Courier New" pitchFamily="49"/>
+              </a:rPr>
+              <a:t> parameter is </a:t>
+            </a:r>
+            <a:r>
+              <a:rPr lang="nl-NL" dirty="0" err="1">
+                <a:solidFill>
+                  <a:srgbClr val="00FF00"/>
+                </a:solidFill>
+                <a:latin typeface="Courier New" pitchFamily="49"/>
+                <a:cs typeface="Courier New" pitchFamily="49"/>
+              </a:rPr>
+              <a:t>not</a:t>
+            </a:r>
+            <a:r>
+              <a:rPr lang="nl-NL" dirty="0">
+                <a:solidFill>
+                  <a:srgbClr val="00FF00"/>
+                </a:solidFill>
+                <a:latin typeface="Courier New" pitchFamily="49"/>
+                <a:cs typeface="Courier New" pitchFamily="49"/>
+              </a:rPr>
+              <a:t> in </a:t>
+            </a:r>
+            <a:r>
+              <a:rPr lang="nl-NL" dirty="0" err="1">
+                <a:solidFill>
+                  <a:srgbClr val="00FF00"/>
+                </a:solidFill>
+                <a:latin typeface="Courier New" pitchFamily="49"/>
+                <a:cs typeface="Courier New" pitchFamily="49"/>
+              </a:rPr>
+              <a:t>request</a:t>
+            </a:r>
+            <a:endParaRPr lang="nl-NL" dirty="0">
+              <a:solidFill>
+                <a:srgbClr val="00FF00"/>
+              </a:solidFill>
+              <a:latin typeface="Courier New" pitchFamily="49"/>
+              <a:cs typeface="Courier New" pitchFamily="49"/>
+            </a:endParaRPr>
           </a:p>
         </p:txBody>
       </p:sp>
@@ -11254,7 +11809,7 @@
 </p:sld>
 </file>
 
-<file path=ppt/slides/slide28.xml><?xml version="1.0" encoding="utf-8"?>
+<file path=ppt/slides/slide27.xml><?xml version="1.0" encoding="utf-8"?>
 <p:sld xmlns:a="http://schemas.openxmlformats.org/drawingml/2006/main" xmlns:r="http://schemas.openxmlformats.org/officeDocument/2006/relationships" xmlns:p="http://schemas.openxmlformats.org/presentationml/2006/main">
   <p:cSld name="Slide59">
     <p:bg>
@@ -11344,112 +11899,216 @@
               <a:buFont typeface="Courier New" pitchFamily="49"/>
               <a:buChar char="_"/>
             </a:pPr>
-            <a:endParaRPr lang="nl-NL">
-              <a:solidFill>
-                <a:srgbClr val="00FF00"/>
-              </a:solidFill>
-              <a:latin typeface="Courier New" pitchFamily="49"/>
-              <a:cs typeface="Courier New" pitchFamily="49"/>
-            </a:endParaRPr>
-          </a:p>
-          <a:p>
-            <a:pPr lvl="0">
-              <a:buFont typeface="Courier New" pitchFamily="49"/>
-              <a:buChar char="_"/>
-            </a:pPr>
-            <a:endParaRPr lang="nl-NL">
-              <a:solidFill>
-                <a:srgbClr val="00FF00"/>
-              </a:solidFill>
-              <a:latin typeface="Courier New" pitchFamily="49"/>
-              <a:cs typeface="Courier New" pitchFamily="49"/>
-            </a:endParaRPr>
-          </a:p>
-          <a:p>
-            <a:pPr lvl="0">
-              <a:buFont typeface="Courier New" pitchFamily="49"/>
-              <a:buChar char="_"/>
-            </a:pPr>
-            <a:endParaRPr lang="nl-NL">
-              <a:solidFill>
-                <a:srgbClr val="00FF00"/>
-              </a:solidFill>
-              <a:latin typeface="Courier New" pitchFamily="49"/>
-              <a:cs typeface="Courier New" pitchFamily="49"/>
-            </a:endParaRPr>
-          </a:p>
-          <a:p>
-            <a:pPr lvl="0">
-              <a:buFont typeface="Courier New" pitchFamily="49"/>
-              <a:buChar char="_"/>
-            </a:pPr>
-            <a:endParaRPr lang="nl-NL">
-              <a:solidFill>
-                <a:srgbClr val="00FF00"/>
-              </a:solidFill>
-              <a:latin typeface="Courier New" pitchFamily="49"/>
-              <a:cs typeface="Courier New" pitchFamily="49"/>
-            </a:endParaRPr>
-          </a:p>
-          <a:p>
-            <a:pPr lvl="0">
-              <a:buFont typeface="Courier New" pitchFamily="49"/>
-              <a:buChar char="_"/>
-            </a:pPr>
-            <a:endParaRPr lang="nl-NL">
-              <a:solidFill>
-                <a:srgbClr val="00FF00"/>
-              </a:solidFill>
-              <a:latin typeface="Courier New" pitchFamily="49"/>
-              <a:cs typeface="Courier New" pitchFamily="49"/>
-            </a:endParaRPr>
-          </a:p>
-          <a:p>
-            <a:pPr lvl="0">
-              <a:buFont typeface="Courier New" pitchFamily="49"/>
-              <a:buChar char="_"/>
-            </a:pPr>
-            <a:r>
-              <a:rPr lang="nl-NL">
-                <a:solidFill>
-                  <a:srgbClr val="00FF00"/>
-                </a:solidFill>
-                <a:latin typeface="Courier New" pitchFamily="49"/>
-                <a:cs typeface="Courier New" pitchFamily="49"/>
-              </a:rPr>
-              <a:t>No support (yet) for other authentication mechanisms</a:t>
-            </a:r>
-          </a:p>
-          <a:p>
-            <a:pPr lvl="1">
-              <a:buFont typeface="Courier New" pitchFamily="49"/>
-              <a:buChar char="_"/>
-            </a:pPr>
-            <a:r>
-              <a:rPr lang="nl-NL">
-                <a:solidFill>
-                  <a:srgbClr val="00FF00"/>
-                </a:solidFill>
-                <a:latin typeface="Courier New" pitchFamily="49"/>
-                <a:cs typeface="Courier New" pitchFamily="49"/>
-              </a:rPr>
-              <a:t>Like OAuth2</a:t>
-            </a:r>
-          </a:p>
-          <a:p>
-            <a:pPr lvl="0">
-              <a:buFont typeface="Courier New" pitchFamily="49"/>
-              <a:buChar char="_"/>
-            </a:pPr>
-            <a:r>
-              <a:rPr lang="nl-NL">
-                <a:solidFill>
-                  <a:srgbClr val="00FF00"/>
-                </a:solidFill>
-                <a:latin typeface="Courier New" pitchFamily="49"/>
-                <a:cs typeface="Courier New" pitchFamily="49"/>
-              </a:rPr>
-              <a:t>HTTPS is supported</a:t>
+            <a:endParaRPr lang="nl-NL" dirty="0">
+              <a:solidFill>
+                <a:srgbClr val="00FF00"/>
+              </a:solidFill>
+              <a:latin typeface="Courier New" pitchFamily="49"/>
+              <a:cs typeface="Courier New" pitchFamily="49"/>
+            </a:endParaRPr>
+          </a:p>
+          <a:p>
+            <a:pPr lvl="0">
+              <a:buFont typeface="Courier New" pitchFamily="49"/>
+              <a:buChar char="_"/>
+            </a:pPr>
+            <a:endParaRPr lang="nl-NL" dirty="0">
+              <a:solidFill>
+                <a:srgbClr val="00FF00"/>
+              </a:solidFill>
+              <a:latin typeface="Courier New" pitchFamily="49"/>
+              <a:cs typeface="Courier New" pitchFamily="49"/>
+            </a:endParaRPr>
+          </a:p>
+          <a:p>
+            <a:pPr lvl="0">
+              <a:buFont typeface="Courier New" pitchFamily="49"/>
+              <a:buChar char="_"/>
+            </a:pPr>
+            <a:endParaRPr lang="nl-NL" dirty="0">
+              <a:solidFill>
+                <a:srgbClr val="00FF00"/>
+              </a:solidFill>
+              <a:latin typeface="Courier New" pitchFamily="49"/>
+              <a:cs typeface="Courier New" pitchFamily="49"/>
+            </a:endParaRPr>
+          </a:p>
+          <a:p>
+            <a:pPr lvl="0">
+              <a:buFont typeface="Courier New" pitchFamily="49"/>
+              <a:buChar char="_"/>
+            </a:pPr>
+            <a:endParaRPr lang="nl-NL" dirty="0">
+              <a:solidFill>
+                <a:srgbClr val="00FF00"/>
+              </a:solidFill>
+              <a:latin typeface="Courier New" pitchFamily="49"/>
+              <a:cs typeface="Courier New" pitchFamily="49"/>
+            </a:endParaRPr>
+          </a:p>
+          <a:p>
+            <a:pPr lvl="0">
+              <a:buFont typeface="Courier New" pitchFamily="49"/>
+              <a:buChar char="_"/>
+            </a:pPr>
+            <a:endParaRPr lang="nl-NL" dirty="0">
+              <a:solidFill>
+                <a:srgbClr val="00FF00"/>
+              </a:solidFill>
+              <a:latin typeface="Courier New" pitchFamily="49"/>
+              <a:cs typeface="Courier New" pitchFamily="49"/>
+            </a:endParaRPr>
+          </a:p>
+          <a:p>
+            <a:pPr lvl="0">
+              <a:buFont typeface="Courier New" pitchFamily="49"/>
+              <a:buChar char="_"/>
+            </a:pPr>
+            <a:endParaRPr lang="nl-NL" dirty="0">
+              <a:solidFill>
+                <a:srgbClr val="00FF00"/>
+              </a:solidFill>
+              <a:latin typeface="Courier New" pitchFamily="49"/>
+              <a:cs typeface="Courier New" pitchFamily="49"/>
+            </a:endParaRPr>
+          </a:p>
+          <a:p>
+            <a:pPr lvl="0">
+              <a:buFont typeface="Courier New" pitchFamily="49"/>
+              <a:buChar char="_"/>
+            </a:pPr>
+            <a:r>
+              <a:rPr lang="nl-NL" dirty="0">
+                <a:solidFill>
+                  <a:srgbClr val="00FF00"/>
+                </a:solidFill>
+                <a:latin typeface="Courier New" pitchFamily="49"/>
+                <a:cs typeface="Courier New" pitchFamily="49"/>
+              </a:rPr>
+              <a:t>HTTPS is </a:t>
+            </a:r>
+            <a:r>
+              <a:rPr lang="nl-NL" dirty="0" err="1">
+                <a:solidFill>
+                  <a:srgbClr val="00FF00"/>
+                </a:solidFill>
+                <a:latin typeface="Courier New" pitchFamily="49"/>
+                <a:cs typeface="Courier New" pitchFamily="49"/>
+              </a:rPr>
+              <a:t>supported</a:t>
+            </a:r>
+            <a:endParaRPr lang="nl-NL" dirty="0">
+              <a:solidFill>
+                <a:srgbClr val="00FF00"/>
+              </a:solidFill>
+              <a:latin typeface="Courier New" pitchFamily="49"/>
+              <a:cs typeface="Courier New" pitchFamily="49"/>
+            </a:endParaRPr>
+          </a:p>
+          <a:p>
+            <a:pPr lvl="0">
+              <a:buFont typeface="Courier New" pitchFamily="49"/>
+              <a:buChar char="_"/>
+            </a:pPr>
+            <a:r>
+              <a:rPr lang="nl-NL" dirty="0" err="1">
+                <a:solidFill>
+                  <a:srgbClr val="00FF00"/>
+                </a:solidFill>
+                <a:latin typeface="Courier New" pitchFamily="49"/>
+                <a:cs typeface="Courier New" pitchFamily="49"/>
+              </a:rPr>
+              <a:t>Oauth</a:t>
+            </a:r>
+            <a:r>
+              <a:rPr lang="nl-NL" dirty="0">
+                <a:solidFill>
+                  <a:srgbClr val="00FF00"/>
+                </a:solidFill>
+                <a:latin typeface="Courier New" pitchFamily="49"/>
+                <a:cs typeface="Courier New" pitchFamily="49"/>
+              </a:rPr>
+              <a:t>(2) </a:t>
+            </a:r>
+            <a:r>
+              <a:rPr lang="nl-NL" dirty="0" err="1">
+                <a:solidFill>
+                  <a:srgbClr val="00FF00"/>
+                </a:solidFill>
+                <a:latin typeface="Courier New" pitchFamily="49"/>
+                <a:cs typeface="Courier New" pitchFamily="49"/>
+              </a:rPr>
+              <a:t>can</a:t>
+            </a:r>
+            <a:r>
+              <a:rPr lang="nl-NL" dirty="0">
+                <a:solidFill>
+                  <a:srgbClr val="00FF00"/>
+                </a:solidFill>
+                <a:latin typeface="Courier New" pitchFamily="49"/>
+                <a:cs typeface="Courier New" pitchFamily="49"/>
+              </a:rPr>
+              <a:t> </a:t>
+            </a:r>
+            <a:r>
+              <a:rPr lang="nl-NL" dirty="0" err="1">
+                <a:solidFill>
+                  <a:srgbClr val="00FF00"/>
+                </a:solidFill>
+                <a:latin typeface="Courier New" pitchFamily="49"/>
+                <a:cs typeface="Courier New" pitchFamily="49"/>
+              </a:rPr>
+              <a:t>be</a:t>
+            </a:r>
+            <a:r>
+              <a:rPr lang="nl-NL" dirty="0">
+                <a:solidFill>
+                  <a:srgbClr val="00FF00"/>
+                </a:solidFill>
+                <a:latin typeface="Courier New" pitchFamily="49"/>
+                <a:cs typeface="Courier New" pitchFamily="49"/>
+              </a:rPr>
+              <a:t> </a:t>
+            </a:r>
+            <a:r>
+              <a:rPr lang="nl-NL" dirty="0" err="1">
+                <a:solidFill>
+                  <a:srgbClr val="00FF00"/>
+                </a:solidFill>
+                <a:latin typeface="Courier New" pitchFamily="49"/>
+                <a:cs typeface="Courier New" pitchFamily="49"/>
+              </a:rPr>
+              <a:t>simulated</a:t>
+            </a:r>
+            <a:r>
+              <a:rPr lang="nl-NL" dirty="0">
+                <a:solidFill>
+                  <a:srgbClr val="00FF00"/>
+                </a:solidFill>
+                <a:latin typeface="Courier New" pitchFamily="49"/>
+                <a:cs typeface="Courier New" pitchFamily="49"/>
+              </a:rPr>
+              <a:t> </a:t>
+            </a:r>
+            <a:r>
+              <a:rPr lang="nl-NL" dirty="0" err="1">
+                <a:solidFill>
+                  <a:srgbClr val="00FF00"/>
+                </a:solidFill>
+                <a:latin typeface="Courier New" pitchFamily="49"/>
+                <a:cs typeface="Courier New" pitchFamily="49"/>
+              </a:rPr>
+              <a:t>using</a:t>
+            </a:r>
+            <a:r>
+              <a:rPr lang="nl-NL" dirty="0">
+                <a:solidFill>
+                  <a:srgbClr val="00FF00"/>
+                </a:solidFill>
+                <a:latin typeface="Courier New" pitchFamily="49"/>
+                <a:cs typeface="Courier New" pitchFamily="49"/>
+              </a:rPr>
+              <a:t> header matching</a:t>
             </a:r>
           </a:p>
         </p:txBody>
@@ -11496,7 +12155,7 @@
 </p:sld>
 </file>
 
-<file path=ppt/slides/slide29.xml><?xml version="1.0" encoding="utf-8"?>
+<file path=ppt/slides/slide28.xml><?xml version="1.0" encoding="utf-8"?>
 <p:sld xmlns:a="http://schemas.openxmlformats.org/drawingml/2006/main" xmlns:r="http://schemas.openxmlformats.org/officeDocument/2006/relationships" xmlns:p="http://schemas.openxmlformats.org/presentationml/2006/main">
   <p:cSld name="Slide60">
     <p:bg>
@@ -11544,14 +12203,24 @@
           <a:p>
             <a:pPr lvl="0"/>
             <a:r>
-              <a:rPr lang="nl-NL">
-                <a:solidFill>
-                  <a:srgbClr val="00FF00"/>
-                </a:solidFill>
-                <a:latin typeface="Courier New" pitchFamily="49"/>
-                <a:cs typeface="Courier New" pitchFamily="49"/>
-              </a:rPr>
-              <a:t>Get your hands dirty!</a:t>
+              <a:rPr lang="nl-NL" dirty="0" err="1">
+                <a:solidFill>
+                  <a:srgbClr val="00FF00"/>
+                </a:solidFill>
+                <a:latin typeface="Courier New" pitchFamily="49"/>
+                <a:cs typeface="Courier New" pitchFamily="49"/>
+              </a:rPr>
+              <a:t>Exercise</a:t>
+            </a:r>
+            <a:r>
+              <a:rPr lang="nl-NL" dirty="0">
+                <a:solidFill>
+                  <a:srgbClr val="00FF00"/>
+                </a:solidFill>
+                <a:latin typeface="Courier New" pitchFamily="49"/>
+                <a:cs typeface="Courier New" pitchFamily="49"/>
+              </a:rPr>
+              <a:t> time!</a:t>
             </a:r>
           </a:p>
         </p:txBody>
@@ -11743,6 +12412,99 @@
               <a:latin typeface="Courier New" pitchFamily="49"/>
               <a:cs typeface="Courier New" pitchFamily="49"/>
             </a:endParaRPr>
+          </a:p>
+        </p:txBody>
+      </p:sp>
+    </p:spTree>
+  </p:cSld>
+  <p:clrMapOvr>
+    <a:masterClrMapping/>
+  </p:clrMapOvr>
+</p:sld>
+</file>
+
+<file path=ppt/slides/slide29.xml><?xml version="1.0" encoding="utf-8"?>
+<p:sld xmlns:a="http://schemas.openxmlformats.org/drawingml/2006/main" xmlns:r="http://schemas.openxmlformats.org/officeDocument/2006/relationships" xmlns:p="http://schemas.openxmlformats.org/presentationml/2006/main">
+  <p:cSld name="Slide51">
+    <p:bg>
+      <p:bgPr>
+        <a:solidFill>
+          <a:srgbClr val="000000"/>
+        </a:solidFill>
+        <a:effectLst/>
+      </p:bgPr>
+    </p:bg>
+    <p:spTree>
+      <p:nvGrpSpPr>
+        <p:cNvPr id="1" name=""/>
+        <p:cNvGrpSpPr/>
+        <p:nvPr/>
+      </p:nvGrpSpPr>
+      <p:grpSpPr>
+        <a:xfrm>
+          <a:off x="0" y="0"/>
+          <a:ext cx="0" cy="0"/>
+          <a:chOff x="0" y="0"/>
+          <a:chExt cx="0" cy="0"/>
+        </a:xfrm>
+      </p:grpSpPr>
+      <p:sp>
+        <p:nvSpPr>
+          <p:cNvPr id="2" name="Title 1">
+            <a:extLst>
+              <a:ext uri="{FF2B5EF4-FFF2-40B4-BE49-F238E27FC236}">
+                <a16:creationId xmlns:a16="http://schemas.microsoft.com/office/drawing/2014/main" id="{0508229A-D2A9-434E-8091-D7A818FB6F25}"/>
+              </a:ext>
+            </a:extLst>
+          </p:cNvPr>
+          <p:cNvSpPr txBox="1">
+            <a:spLocks noGrp="1"/>
+          </p:cNvSpPr>
+          <p:nvPr>
+            <p:ph type="ctrTitle"/>
+          </p:nvPr>
+        </p:nvSpPr>
+        <p:spPr/>
+        <p:txBody>
+          <a:bodyPr/>
+          <a:lstStyle/>
+          <a:p>
+            <a:pPr lvl="0"/>
+            <a:r>
+              <a:rPr lang="nl-NL" dirty="0">
+                <a:solidFill>
+                  <a:srgbClr val="00FF00"/>
+                </a:solidFill>
+                <a:latin typeface="Courier New" pitchFamily="49"/>
+                <a:cs typeface="Courier New" pitchFamily="49"/>
+              </a:rPr>
+              <a:t>CONTINUE HERE</a:t>
+            </a:r>
+          </a:p>
+        </p:txBody>
+      </p:sp>
+      <p:sp>
+        <p:nvSpPr>
+          <p:cNvPr id="5" name="Subtitle 4">
+            <a:extLst>
+              <a:ext uri="{FF2B5EF4-FFF2-40B4-BE49-F238E27FC236}">
+                <a16:creationId xmlns:a16="http://schemas.microsoft.com/office/drawing/2014/main" id="{6D5A54D7-7497-4294-9F70-89D29246BBA1}"/>
+              </a:ext>
+            </a:extLst>
+          </p:cNvPr>
+          <p:cNvSpPr>
+            <a:spLocks noGrp="1"/>
+          </p:cNvSpPr>
+          <p:nvPr>
+            <p:ph type="subTitle" idx="1"/>
+          </p:nvPr>
+        </p:nvSpPr>
+        <p:spPr/>
+        <p:txBody>
+          <a:bodyPr/>
+          <a:lstStyle/>
+          <a:p>
+            <a:endParaRPr lang="nl-NL"/>
           </a:p>
         </p:txBody>
       </p:sp>

</xml_diff>

<commit_message>
Reviewed slides and exercises section 3
</commit_message>
<xml_diff>
--- a/wiremock_workshop.pptx
+++ b/wiremock_workshop.pptx
@@ -12876,161 +12876,485 @@
               <a:buChar char="_"/>
             </a:pPr>
             <a:r>
-              <a:rPr lang="nl-NL">
-                <a:solidFill>
-                  <a:srgbClr val="00FF00"/>
-                </a:solidFill>
-                <a:latin typeface="Courier New" pitchFamily="49"/>
-                <a:cs typeface="Courier New" pitchFamily="49"/>
-              </a:rPr>
-              <a:t>Extend test coverage by simulating faults</a:t>
-            </a:r>
-          </a:p>
-          <a:p>
-            <a:pPr lvl="0">
-              <a:buFont typeface="Courier New" pitchFamily="49"/>
-              <a:buChar char="_"/>
-            </a:pPr>
-            <a:endParaRPr lang="nl-NL">
-              <a:solidFill>
-                <a:srgbClr val="00FF00"/>
-              </a:solidFill>
-              <a:latin typeface="Courier New" pitchFamily="49"/>
-              <a:cs typeface="Courier New" pitchFamily="49"/>
-            </a:endParaRPr>
-          </a:p>
-          <a:p>
-            <a:pPr lvl="0">
-              <a:buFont typeface="Courier New" pitchFamily="49"/>
-              <a:buChar char="_"/>
-            </a:pPr>
-            <a:r>
-              <a:rPr lang="nl-NL">
-                <a:solidFill>
-                  <a:srgbClr val="00FF00"/>
-                </a:solidFill>
-                <a:latin typeface="Courier New" pitchFamily="49"/>
-                <a:cs typeface="Courier New" pitchFamily="49"/>
-              </a:rPr>
-              <a:t>Often hard to do in real systems</a:t>
-            </a:r>
-          </a:p>
-          <a:p>
-            <a:pPr lvl="0">
-              <a:buFont typeface="Courier New" pitchFamily="49"/>
-              <a:buChar char="_"/>
-            </a:pPr>
-            <a:endParaRPr lang="nl-NL">
-              <a:solidFill>
-                <a:srgbClr val="00FF00"/>
-              </a:solidFill>
-              <a:latin typeface="Courier New" pitchFamily="49"/>
-              <a:cs typeface="Courier New" pitchFamily="49"/>
-            </a:endParaRPr>
-          </a:p>
-          <a:p>
-            <a:pPr lvl="0">
-              <a:buFont typeface="Courier New" pitchFamily="49"/>
-              <a:buChar char="_"/>
-            </a:pPr>
-            <a:r>
-              <a:rPr lang="nl-NL">
-                <a:solidFill>
-                  <a:srgbClr val="00FF00"/>
-                </a:solidFill>
-                <a:latin typeface="Courier New" pitchFamily="49"/>
-                <a:cs typeface="Courier New" pitchFamily="49"/>
-              </a:rPr>
-              <a:t>Easy to do using stubs or mocks</a:t>
-            </a:r>
-          </a:p>
-          <a:p>
-            <a:pPr lvl="0">
-              <a:buFont typeface="Courier New" pitchFamily="49"/>
-              <a:buChar char="_"/>
-            </a:pPr>
-            <a:endParaRPr lang="nl-NL">
-              <a:solidFill>
-                <a:srgbClr val="00FF00"/>
-              </a:solidFill>
-              <a:latin typeface="Courier New" pitchFamily="49"/>
-              <a:cs typeface="Courier New" pitchFamily="49"/>
-            </a:endParaRPr>
-          </a:p>
-          <a:p>
-            <a:pPr lvl="0">
-              <a:buFont typeface="Courier New" pitchFamily="49"/>
-              <a:buChar char="_"/>
-            </a:pPr>
-            <a:r>
-              <a:rPr lang="nl-NL">
-                <a:solidFill>
-                  <a:srgbClr val="00FF00"/>
-                </a:solidFill>
-                <a:latin typeface="Courier New" pitchFamily="49"/>
-                <a:cs typeface="Courier New" pitchFamily="49"/>
-              </a:rPr>
-              <a:t>Test exception handling application under test</a:t>
-            </a:r>
-          </a:p>
-          <a:p>
-            <a:pPr lvl="0">
-              <a:buFont typeface="Courier New" pitchFamily="49"/>
-              <a:buChar char="_"/>
-            </a:pPr>
-            <a:endParaRPr lang="nl-NL">
-              <a:solidFill>
-                <a:srgbClr val="00FF00"/>
-              </a:solidFill>
-              <a:latin typeface="Courier New" pitchFamily="49"/>
-              <a:cs typeface="Courier New" pitchFamily="49"/>
-            </a:endParaRPr>
-          </a:p>
-          <a:p>
-            <a:pPr lvl="0">
-              <a:buFont typeface="Courier New" pitchFamily="49"/>
-              <a:buChar char="_"/>
-            </a:pPr>
-            <a:endParaRPr lang="nl-NL">
-              <a:solidFill>
-                <a:srgbClr val="00FF00"/>
-              </a:solidFill>
-              <a:latin typeface="Courier New" pitchFamily="49"/>
-              <a:cs typeface="Courier New" pitchFamily="49"/>
-            </a:endParaRPr>
-          </a:p>
-          <a:p>
-            <a:pPr lvl="0">
-              <a:buFont typeface="Courier New" pitchFamily="49"/>
-              <a:buChar char="_"/>
-            </a:pPr>
-            <a:endParaRPr lang="nl-NL">
-              <a:solidFill>
-                <a:srgbClr val="00FF00"/>
-              </a:solidFill>
-              <a:latin typeface="Courier New" pitchFamily="49"/>
-              <a:cs typeface="Courier New" pitchFamily="49"/>
-            </a:endParaRPr>
-          </a:p>
-          <a:p>
-            <a:pPr lvl="0">
-              <a:buFont typeface="Courier New" pitchFamily="49"/>
-              <a:buChar char="_"/>
-            </a:pPr>
-            <a:endParaRPr lang="nl-NL">
-              <a:solidFill>
-                <a:srgbClr val="00FF00"/>
-              </a:solidFill>
-              <a:latin typeface="Courier New" pitchFamily="49"/>
-              <a:cs typeface="Courier New" pitchFamily="49"/>
-            </a:endParaRPr>
-          </a:p>
-          <a:p>
-            <a:pPr lvl="0">
-              <a:buFont typeface="Courier New" pitchFamily="49"/>
-              <a:buChar char="_"/>
-            </a:pPr>
-            <a:endParaRPr lang="nl-NL">
+              <a:rPr lang="nl-NL" dirty="0" err="1">
+                <a:solidFill>
+                  <a:srgbClr val="00FF00"/>
+                </a:solidFill>
+                <a:latin typeface="Courier New" pitchFamily="49"/>
+                <a:cs typeface="Courier New" pitchFamily="49"/>
+              </a:rPr>
+              <a:t>Extend</a:t>
+            </a:r>
+            <a:r>
+              <a:rPr lang="nl-NL" dirty="0">
+                <a:solidFill>
+                  <a:srgbClr val="00FF00"/>
+                </a:solidFill>
+                <a:latin typeface="Courier New" pitchFamily="49"/>
+                <a:cs typeface="Courier New" pitchFamily="49"/>
+              </a:rPr>
+              <a:t> test </a:t>
+            </a:r>
+            <a:r>
+              <a:rPr lang="nl-NL" dirty="0" err="1">
+                <a:solidFill>
+                  <a:srgbClr val="00FF00"/>
+                </a:solidFill>
+                <a:latin typeface="Courier New" pitchFamily="49"/>
+                <a:cs typeface="Courier New" pitchFamily="49"/>
+              </a:rPr>
+              <a:t>coverage</a:t>
+            </a:r>
+            <a:r>
+              <a:rPr lang="nl-NL" dirty="0">
+                <a:solidFill>
+                  <a:srgbClr val="00FF00"/>
+                </a:solidFill>
+                <a:latin typeface="Courier New" pitchFamily="49"/>
+                <a:cs typeface="Courier New" pitchFamily="49"/>
+              </a:rPr>
+              <a:t> </a:t>
+            </a:r>
+            <a:r>
+              <a:rPr lang="nl-NL" dirty="0" err="1">
+                <a:solidFill>
+                  <a:srgbClr val="00FF00"/>
+                </a:solidFill>
+                <a:latin typeface="Courier New" pitchFamily="49"/>
+                <a:cs typeface="Courier New" pitchFamily="49"/>
+              </a:rPr>
+              <a:t>by</a:t>
+            </a:r>
+            <a:r>
+              <a:rPr lang="nl-NL" dirty="0">
+                <a:solidFill>
+                  <a:srgbClr val="00FF00"/>
+                </a:solidFill>
+                <a:latin typeface="Courier New" pitchFamily="49"/>
+                <a:cs typeface="Courier New" pitchFamily="49"/>
+              </a:rPr>
+              <a:t> </a:t>
+            </a:r>
+            <a:r>
+              <a:rPr lang="nl-NL" dirty="0" err="1">
+                <a:solidFill>
+                  <a:srgbClr val="00FF00"/>
+                </a:solidFill>
+                <a:latin typeface="Courier New" pitchFamily="49"/>
+                <a:cs typeface="Courier New" pitchFamily="49"/>
+              </a:rPr>
+              <a:t>simulating</a:t>
+            </a:r>
+            <a:r>
+              <a:rPr lang="nl-NL" dirty="0">
+                <a:solidFill>
+                  <a:srgbClr val="00FF00"/>
+                </a:solidFill>
+                <a:latin typeface="Courier New" pitchFamily="49"/>
+                <a:cs typeface="Courier New" pitchFamily="49"/>
+              </a:rPr>
+              <a:t> </a:t>
+            </a:r>
+            <a:r>
+              <a:rPr lang="nl-NL" dirty="0" err="1">
+                <a:solidFill>
+                  <a:srgbClr val="00FF00"/>
+                </a:solidFill>
+                <a:latin typeface="Courier New" pitchFamily="49"/>
+                <a:cs typeface="Courier New" pitchFamily="49"/>
+              </a:rPr>
+              <a:t>faults</a:t>
+            </a:r>
+            <a:endParaRPr lang="nl-NL" dirty="0">
+              <a:solidFill>
+                <a:srgbClr val="00FF00"/>
+              </a:solidFill>
+              <a:latin typeface="Courier New" pitchFamily="49"/>
+              <a:cs typeface="Courier New" pitchFamily="49"/>
+            </a:endParaRPr>
+          </a:p>
+          <a:p>
+            <a:pPr lvl="0">
+              <a:buFont typeface="Courier New" pitchFamily="49"/>
+              <a:buChar char="_"/>
+            </a:pPr>
+            <a:endParaRPr lang="nl-NL" dirty="0">
+              <a:solidFill>
+                <a:srgbClr val="00FF00"/>
+              </a:solidFill>
+              <a:latin typeface="Courier New" pitchFamily="49"/>
+              <a:cs typeface="Courier New" pitchFamily="49"/>
+            </a:endParaRPr>
+          </a:p>
+          <a:p>
+            <a:pPr lvl="0">
+              <a:buFont typeface="Courier New" pitchFamily="49"/>
+              <a:buChar char="_"/>
+            </a:pPr>
+            <a:r>
+              <a:rPr lang="nl-NL" dirty="0" err="1">
+                <a:solidFill>
+                  <a:srgbClr val="00FF00"/>
+                </a:solidFill>
+                <a:latin typeface="Courier New" pitchFamily="49"/>
+                <a:cs typeface="Courier New" pitchFamily="49"/>
+              </a:rPr>
+              <a:t>Often</a:t>
+            </a:r>
+            <a:r>
+              <a:rPr lang="nl-NL" dirty="0">
+                <a:solidFill>
+                  <a:srgbClr val="00FF00"/>
+                </a:solidFill>
+                <a:latin typeface="Courier New" pitchFamily="49"/>
+                <a:cs typeface="Courier New" pitchFamily="49"/>
+              </a:rPr>
+              <a:t> hard </a:t>
+            </a:r>
+            <a:r>
+              <a:rPr lang="nl-NL" dirty="0" err="1">
+                <a:solidFill>
+                  <a:srgbClr val="00FF00"/>
+                </a:solidFill>
+                <a:latin typeface="Courier New" pitchFamily="49"/>
+                <a:cs typeface="Courier New" pitchFamily="49"/>
+              </a:rPr>
+              <a:t>to</a:t>
+            </a:r>
+            <a:r>
+              <a:rPr lang="nl-NL" dirty="0">
+                <a:solidFill>
+                  <a:srgbClr val="00FF00"/>
+                </a:solidFill>
+                <a:latin typeface="Courier New" pitchFamily="49"/>
+                <a:cs typeface="Courier New" pitchFamily="49"/>
+              </a:rPr>
+              <a:t> do in real systems</a:t>
+            </a:r>
+          </a:p>
+          <a:p>
+            <a:pPr lvl="0">
+              <a:buFont typeface="Courier New" pitchFamily="49"/>
+              <a:buChar char="_"/>
+            </a:pPr>
+            <a:endParaRPr lang="nl-NL" dirty="0">
+              <a:solidFill>
+                <a:srgbClr val="00FF00"/>
+              </a:solidFill>
+              <a:latin typeface="Courier New" pitchFamily="49"/>
+              <a:cs typeface="Courier New" pitchFamily="49"/>
+            </a:endParaRPr>
+          </a:p>
+          <a:p>
+            <a:pPr lvl="0">
+              <a:buFont typeface="Courier New" pitchFamily="49"/>
+              <a:buChar char="_"/>
+            </a:pPr>
+            <a:r>
+              <a:rPr lang="nl-NL" dirty="0">
+                <a:solidFill>
+                  <a:srgbClr val="00FF00"/>
+                </a:solidFill>
+                <a:latin typeface="Courier New" pitchFamily="49"/>
+                <a:cs typeface="Courier New" pitchFamily="49"/>
+              </a:rPr>
+              <a:t>Easy </a:t>
+            </a:r>
+            <a:r>
+              <a:rPr lang="nl-NL" dirty="0" err="1">
+                <a:solidFill>
+                  <a:srgbClr val="00FF00"/>
+                </a:solidFill>
+                <a:latin typeface="Courier New" pitchFamily="49"/>
+                <a:cs typeface="Courier New" pitchFamily="49"/>
+              </a:rPr>
+              <a:t>to</a:t>
+            </a:r>
+            <a:r>
+              <a:rPr lang="nl-NL" dirty="0">
+                <a:solidFill>
+                  <a:srgbClr val="00FF00"/>
+                </a:solidFill>
+                <a:latin typeface="Courier New" pitchFamily="49"/>
+                <a:cs typeface="Courier New" pitchFamily="49"/>
+              </a:rPr>
+              <a:t> do </a:t>
+            </a:r>
+            <a:r>
+              <a:rPr lang="nl-NL" dirty="0" err="1">
+                <a:solidFill>
+                  <a:srgbClr val="00FF00"/>
+                </a:solidFill>
+                <a:latin typeface="Courier New" pitchFamily="49"/>
+                <a:cs typeface="Courier New" pitchFamily="49"/>
+              </a:rPr>
+              <a:t>using</a:t>
+            </a:r>
+            <a:r>
+              <a:rPr lang="nl-NL" dirty="0">
+                <a:solidFill>
+                  <a:srgbClr val="00FF00"/>
+                </a:solidFill>
+                <a:latin typeface="Courier New" pitchFamily="49"/>
+                <a:cs typeface="Courier New" pitchFamily="49"/>
+              </a:rPr>
+              <a:t> </a:t>
+            </a:r>
+            <a:r>
+              <a:rPr lang="nl-NL" dirty="0" err="1">
+                <a:solidFill>
+                  <a:srgbClr val="00FF00"/>
+                </a:solidFill>
+                <a:latin typeface="Courier New" pitchFamily="49"/>
+                <a:cs typeface="Courier New" pitchFamily="49"/>
+              </a:rPr>
+              <a:t>stubs</a:t>
+            </a:r>
+            <a:r>
+              <a:rPr lang="nl-NL" dirty="0">
+                <a:solidFill>
+                  <a:srgbClr val="00FF00"/>
+                </a:solidFill>
+                <a:latin typeface="Courier New" pitchFamily="49"/>
+                <a:cs typeface="Courier New" pitchFamily="49"/>
+              </a:rPr>
+              <a:t> or </a:t>
+            </a:r>
+            <a:r>
+              <a:rPr lang="nl-NL" dirty="0" err="1">
+                <a:solidFill>
+                  <a:srgbClr val="00FF00"/>
+                </a:solidFill>
+                <a:latin typeface="Courier New" pitchFamily="49"/>
+                <a:cs typeface="Courier New" pitchFamily="49"/>
+              </a:rPr>
+              <a:t>mocks</a:t>
+            </a:r>
+            <a:endParaRPr lang="nl-NL" dirty="0">
+              <a:solidFill>
+                <a:srgbClr val="00FF00"/>
+              </a:solidFill>
+              <a:latin typeface="Courier New" pitchFamily="49"/>
+              <a:cs typeface="Courier New" pitchFamily="49"/>
+            </a:endParaRPr>
+          </a:p>
+          <a:p>
+            <a:pPr lvl="0">
+              <a:buFont typeface="Courier New" pitchFamily="49"/>
+              <a:buChar char="_"/>
+            </a:pPr>
+            <a:endParaRPr lang="nl-NL" dirty="0">
+              <a:solidFill>
+                <a:srgbClr val="00FF00"/>
+              </a:solidFill>
+              <a:latin typeface="Courier New" pitchFamily="49"/>
+              <a:cs typeface="Courier New" pitchFamily="49"/>
+            </a:endParaRPr>
+          </a:p>
+          <a:p>
+            <a:pPr lvl="0">
+              <a:buFont typeface="Courier New" pitchFamily="49"/>
+              <a:buChar char="_"/>
+            </a:pPr>
+            <a:r>
+              <a:rPr lang="nl-NL" dirty="0" err="1">
+                <a:solidFill>
+                  <a:srgbClr val="00FF00"/>
+                </a:solidFill>
+                <a:latin typeface="Courier New" pitchFamily="49"/>
+                <a:cs typeface="Courier New" pitchFamily="49"/>
+              </a:rPr>
+              <a:t>Used</a:t>
+            </a:r>
+            <a:r>
+              <a:rPr lang="nl-NL" dirty="0">
+                <a:solidFill>
+                  <a:srgbClr val="00FF00"/>
+                </a:solidFill>
+                <a:latin typeface="Courier New" pitchFamily="49"/>
+                <a:cs typeface="Courier New" pitchFamily="49"/>
+              </a:rPr>
+              <a:t> </a:t>
+            </a:r>
+            <a:r>
+              <a:rPr lang="nl-NL" dirty="0" err="1">
+                <a:solidFill>
+                  <a:srgbClr val="00FF00"/>
+                </a:solidFill>
+                <a:latin typeface="Courier New" pitchFamily="49"/>
+                <a:cs typeface="Courier New" pitchFamily="49"/>
+              </a:rPr>
+              <a:t>to</a:t>
+            </a:r>
+            <a:r>
+              <a:rPr lang="nl-NL" dirty="0">
+                <a:solidFill>
+                  <a:srgbClr val="00FF00"/>
+                </a:solidFill>
+                <a:latin typeface="Courier New" pitchFamily="49"/>
+                <a:cs typeface="Courier New" pitchFamily="49"/>
+              </a:rPr>
+              <a:t> test </a:t>
+            </a:r>
+            <a:r>
+              <a:rPr lang="nl-NL" dirty="0" err="1">
+                <a:solidFill>
+                  <a:srgbClr val="00FF00"/>
+                </a:solidFill>
+                <a:latin typeface="Courier New" pitchFamily="49"/>
+                <a:cs typeface="Courier New" pitchFamily="49"/>
+              </a:rPr>
+              <a:t>the</a:t>
+            </a:r>
+            <a:r>
+              <a:rPr lang="nl-NL" dirty="0">
+                <a:solidFill>
+                  <a:srgbClr val="00FF00"/>
+                </a:solidFill>
+                <a:latin typeface="Courier New" pitchFamily="49"/>
+                <a:cs typeface="Courier New" pitchFamily="49"/>
+              </a:rPr>
+              <a:t> </a:t>
+            </a:r>
+            <a:r>
+              <a:rPr lang="nl-NL" dirty="0" err="1">
+                <a:solidFill>
+                  <a:srgbClr val="00FF00"/>
+                </a:solidFill>
+                <a:latin typeface="Courier New" pitchFamily="49"/>
+                <a:cs typeface="Courier New" pitchFamily="49"/>
+              </a:rPr>
+              <a:t>exception</a:t>
+            </a:r>
+            <a:r>
+              <a:rPr lang="nl-NL" dirty="0">
+                <a:solidFill>
+                  <a:srgbClr val="00FF00"/>
+                </a:solidFill>
+                <a:latin typeface="Courier New" pitchFamily="49"/>
+                <a:cs typeface="Courier New" pitchFamily="49"/>
+              </a:rPr>
+              <a:t> handling of </a:t>
+            </a:r>
+            <a:r>
+              <a:rPr lang="nl-NL" dirty="0" err="1">
+                <a:solidFill>
+                  <a:srgbClr val="00FF00"/>
+                </a:solidFill>
+                <a:latin typeface="Courier New" pitchFamily="49"/>
+                <a:cs typeface="Courier New" pitchFamily="49"/>
+              </a:rPr>
+              <a:t>your</a:t>
+            </a:r>
+            <a:r>
+              <a:rPr lang="nl-NL" dirty="0">
+                <a:solidFill>
+                  <a:srgbClr val="00FF00"/>
+                </a:solidFill>
+                <a:latin typeface="Courier New" pitchFamily="49"/>
+                <a:cs typeface="Courier New" pitchFamily="49"/>
+              </a:rPr>
+              <a:t> </a:t>
+            </a:r>
+            <a:r>
+              <a:rPr lang="nl-NL" dirty="0" err="1">
+                <a:solidFill>
+                  <a:srgbClr val="00FF00"/>
+                </a:solidFill>
+                <a:latin typeface="Courier New" pitchFamily="49"/>
+                <a:cs typeface="Courier New" pitchFamily="49"/>
+              </a:rPr>
+              <a:t>application</a:t>
+            </a:r>
+            <a:r>
+              <a:rPr lang="nl-NL" dirty="0">
+                <a:solidFill>
+                  <a:srgbClr val="00FF00"/>
+                </a:solidFill>
+                <a:latin typeface="Courier New" pitchFamily="49"/>
+                <a:cs typeface="Courier New" pitchFamily="49"/>
+              </a:rPr>
+              <a:t> </a:t>
+            </a:r>
+            <a:r>
+              <a:rPr lang="nl-NL" dirty="0" err="1">
+                <a:solidFill>
+                  <a:srgbClr val="00FF00"/>
+                </a:solidFill>
+                <a:latin typeface="Courier New" pitchFamily="49"/>
+                <a:cs typeface="Courier New" pitchFamily="49"/>
+              </a:rPr>
+              <a:t>under</a:t>
+            </a:r>
+            <a:r>
+              <a:rPr lang="nl-NL" dirty="0">
+                <a:solidFill>
+                  <a:srgbClr val="00FF00"/>
+                </a:solidFill>
+                <a:latin typeface="Courier New" pitchFamily="49"/>
+                <a:cs typeface="Courier New" pitchFamily="49"/>
+              </a:rPr>
+              <a:t> test</a:t>
+            </a:r>
+          </a:p>
+          <a:p>
+            <a:pPr lvl="0">
+              <a:buFont typeface="Courier New" pitchFamily="49"/>
+              <a:buChar char="_"/>
+            </a:pPr>
+            <a:endParaRPr lang="nl-NL" dirty="0">
+              <a:solidFill>
+                <a:srgbClr val="00FF00"/>
+              </a:solidFill>
+              <a:latin typeface="Courier New" pitchFamily="49"/>
+              <a:cs typeface="Courier New" pitchFamily="49"/>
+            </a:endParaRPr>
+          </a:p>
+          <a:p>
+            <a:pPr lvl="0">
+              <a:buFont typeface="Courier New" pitchFamily="49"/>
+              <a:buChar char="_"/>
+            </a:pPr>
+            <a:endParaRPr lang="nl-NL" dirty="0">
+              <a:solidFill>
+                <a:srgbClr val="00FF00"/>
+              </a:solidFill>
+              <a:latin typeface="Courier New" pitchFamily="49"/>
+              <a:cs typeface="Courier New" pitchFamily="49"/>
+            </a:endParaRPr>
+          </a:p>
+          <a:p>
+            <a:pPr lvl="0">
+              <a:buFont typeface="Courier New" pitchFamily="49"/>
+              <a:buChar char="_"/>
+            </a:pPr>
+            <a:endParaRPr lang="nl-NL" dirty="0">
+              <a:solidFill>
+                <a:srgbClr val="00FF00"/>
+              </a:solidFill>
+              <a:latin typeface="Courier New" pitchFamily="49"/>
+              <a:cs typeface="Courier New" pitchFamily="49"/>
+            </a:endParaRPr>
+          </a:p>
+          <a:p>
+            <a:pPr lvl="0">
+              <a:buFont typeface="Courier New" pitchFamily="49"/>
+              <a:buChar char="_"/>
+            </a:pPr>
+            <a:endParaRPr lang="nl-NL" dirty="0">
+              <a:solidFill>
+                <a:srgbClr val="00FF00"/>
+              </a:solidFill>
+              <a:latin typeface="Courier New" pitchFamily="49"/>
+              <a:cs typeface="Courier New" pitchFamily="49"/>
+            </a:endParaRPr>
+          </a:p>
+          <a:p>
+            <a:pPr lvl="0">
+              <a:buFont typeface="Courier New" pitchFamily="49"/>
+              <a:buChar char="_"/>
+            </a:pPr>
+            <a:endParaRPr lang="nl-NL" dirty="0">
               <a:solidFill>
                 <a:srgbClr val="00FF00"/>
               </a:solidFill>
@@ -13138,67 +13462,97 @@
               <a:buFont typeface="Courier New" pitchFamily="49"/>
               <a:buChar char="_"/>
             </a:pPr>
-            <a:endParaRPr lang="nl-NL">
-              <a:solidFill>
-                <a:srgbClr val="00FF00"/>
-              </a:solidFill>
-              <a:latin typeface="Courier New" pitchFamily="49"/>
-              <a:cs typeface="Courier New" pitchFamily="49"/>
-            </a:endParaRPr>
-          </a:p>
-          <a:p>
-            <a:pPr lvl="0">
-              <a:buFont typeface="Courier New" pitchFamily="49"/>
-              <a:buChar char="_"/>
-            </a:pPr>
-            <a:endParaRPr lang="nl-NL">
-              <a:solidFill>
-                <a:srgbClr val="00FF00"/>
-              </a:solidFill>
-              <a:latin typeface="Courier New" pitchFamily="49"/>
-              <a:cs typeface="Courier New" pitchFamily="49"/>
-            </a:endParaRPr>
-          </a:p>
-          <a:p>
-            <a:pPr lvl="0">
-              <a:buFont typeface="Courier New" pitchFamily="49"/>
-              <a:buChar char="_"/>
-            </a:pPr>
-            <a:endParaRPr lang="nl-NL">
-              <a:solidFill>
-                <a:srgbClr val="00FF00"/>
-              </a:solidFill>
-              <a:latin typeface="Courier New" pitchFamily="49"/>
-              <a:cs typeface="Courier New" pitchFamily="49"/>
-            </a:endParaRPr>
-          </a:p>
-          <a:p>
-            <a:pPr lvl="0">
-              <a:buFont typeface="Courier New" pitchFamily="49"/>
-              <a:buChar char="_"/>
-            </a:pPr>
-            <a:endParaRPr lang="nl-NL">
-              <a:solidFill>
-                <a:srgbClr val="00FF00"/>
-              </a:solidFill>
-              <a:latin typeface="Courier New" pitchFamily="49"/>
-              <a:cs typeface="Courier New" pitchFamily="49"/>
-            </a:endParaRPr>
-          </a:p>
-          <a:p>
-            <a:pPr lvl="0">
-              <a:buFont typeface="Courier New" pitchFamily="49"/>
-              <a:buChar char="_"/>
-            </a:pPr>
-            <a:r>
-              <a:rPr lang="nl-NL">
-                <a:solidFill>
-                  <a:srgbClr val="00FF00"/>
-                </a:solidFill>
-                <a:latin typeface="Courier New" pitchFamily="49"/>
-                <a:cs typeface="Courier New" pitchFamily="49"/>
-              </a:rPr>
-              <a:t>Often used status codes:</a:t>
+            <a:endParaRPr lang="nl-NL" dirty="0">
+              <a:solidFill>
+                <a:srgbClr val="00FF00"/>
+              </a:solidFill>
+              <a:latin typeface="Courier New" pitchFamily="49"/>
+              <a:cs typeface="Courier New" pitchFamily="49"/>
+            </a:endParaRPr>
+          </a:p>
+          <a:p>
+            <a:pPr lvl="0">
+              <a:buFont typeface="Courier New" pitchFamily="49"/>
+              <a:buChar char="_"/>
+            </a:pPr>
+            <a:endParaRPr lang="nl-NL" dirty="0">
+              <a:solidFill>
+                <a:srgbClr val="00FF00"/>
+              </a:solidFill>
+              <a:latin typeface="Courier New" pitchFamily="49"/>
+              <a:cs typeface="Courier New" pitchFamily="49"/>
+            </a:endParaRPr>
+          </a:p>
+          <a:p>
+            <a:pPr lvl="0">
+              <a:buFont typeface="Courier New" pitchFamily="49"/>
+              <a:buChar char="_"/>
+            </a:pPr>
+            <a:endParaRPr lang="nl-NL" dirty="0">
+              <a:solidFill>
+                <a:srgbClr val="00FF00"/>
+              </a:solidFill>
+              <a:latin typeface="Courier New" pitchFamily="49"/>
+              <a:cs typeface="Courier New" pitchFamily="49"/>
+            </a:endParaRPr>
+          </a:p>
+          <a:p>
+            <a:pPr lvl="0">
+              <a:buFont typeface="Courier New" pitchFamily="49"/>
+              <a:buChar char="_"/>
+            </a:pPr>
+            <a:endParaRPr lang="nl-NL" dirty="0">
+              <a:solidFill>
+                <a:srgbClr val="00FF00"/>
+              </a:solidFill>
+              <a:latin typeface="Courier New" pitchFamily="49"/>
+              <a:cs typeface="Courier New" pitchFamily="49"/>
+            </a:endParaRPr>
+          </a:p>
+          <a:p>
+            <a:pPr lvl="0">
+              <a:buFont typeface="Courier New" pitchFamily="49"/>
+              <a:buChar char="_"/>
+            </a:pPr>
+            <a:r>
+              <a:rPr lang="nl-NL" dirty="0" err="1">
+                <a:solidFill>
+                  <a:srgbClr val="00FF00"/>
+                </a:solidFill>
+                <a:latin typeface="Courier New" pitchFamily="49"/>
+                <a:cs typeface="Courier New" pitchFamily="49"/>
+              </a:rPr>
+              <a:t>Often</a:t>
+            </a:r>
+            <a:r>
+              <a:rPr lang="nl-NL" dirty="0">
+                <a:solidFill>
+                  <a:srgbClr val="00FF00"/>
+                </a:solidFill>
+                <a:latin typeface="Courier New" pitchFamily="49"/>
+                <a:cs typeface="Courier New" pitchFamily="49"/>
+              </a:rPr>
+              <a:t> </a:t>
+            </a:r>
+            <a:r>
+              <a:rPr lang="nl-NL" dirty="0" err="1">
+                <a:solidFill>
+                  <a:srgbClr val="00FF00"/>
+                </a:solidFill>
+                <a:latin typeface="Courier New" pitchFamily="49"/>
+                <a:cs typeface="Courier New" pitchFamily="49"/>
+              </a:rPr>
+              <a:t>used</a:t>
+            </a:r>
+            <a:r>
+              <a:rPr lang="nl-NL" dirty="0">
+                <a:solidFill>
+                  <a:srgbClr val="00FF00"/>
+                </a:solidFill>
+                <a:latin typeface="Courier New" pitchFamily="49"/>
+                <a:cs typeface="Courier New" pitchFamily="49"/>
+              </a:rPr>
+              <a:t> HTTP status codes:</a:t>
             </a:r>
           </a:p>
           <a:p>
@@ -13206,7 +13560,7 @@
               <a:buNone/>
             </a:pPr>
             <a:r>
-              <a:rPr lang="nl-NL" sz="2400">
+              <a:rPr lang="nl-NL" sz="2400" dirty="0">
                 <a:solidFill>
                   <a:srgbClr val="00FF00"/>
                 </a:solidFill>
@@ -13216,7 +13570,7 @@
               <a:t>	</a:t>
             </a:r>
             <a:r>
-              <a:rPr lang="nl-NL" sz="2400" b="1">
+              <a:rPr lang="nl-NL" sz="2400" b="1" dirty="0">
                 <a:solidFill>
                   <a:srgbClr val="00FF00"/>
                 </a:solidFill>
@@ -13231,14 +13585,54 @@
               <a:buNone/>
             </a:pPr>
             <a:r>
-              <a:rPr lang="nl-NL" sz="2400">
-                <a:solidFill>
-                  <a:srgbClr val="00FF00"/>
-                </a:solidFill>
-                <a:latin typeface="Courier New" pitchFamily="49"/>
-                <a:cs typeface="Courier New" pitchFamily="49"/>
-              </a:rPr>
-              <a:t>	403 (Forbidden)		500 (Internal server error)</a:t>
+              <a:rPr lang="nl-NL" sz="2400" dirty="0">
+                <a:solidFill>
+                  <a:srgbClr val="00FF00"/>
+                </a:solidFill>
+                <a:latin typeface="Courier New" pitchFamily="49"/>
+                <a:cs typeface="Courier New" pitchFamily="49"/>
+              </a:rPr>
+              <a:t>	403 (</a:t>
+            </a:r>
+            <a:r>
+              <a:rPr lang="nl-NL" sz="2400" dirty="0" err="1">
+                <a:solidFill>
+                  <a:srgbClr val="00FF00"/>
+                </a:solidFill>
+                <a:latin typeface="Courier New" pitchFamily="49"/>
+                <a:cs typeface="Courier New" pitchFamily="49"/>
+              </a:rPr>
+              <a:t>Forbidden</a:t>
+            </a:r>
+            <a:r>
+              <a:rPr lang="nl-NL" sz="2400" dirty="0">
+                <a:solidFill>
+                  <a:srgbClr val="00FF00"/>
+                </a:solidFill>
+                <a:latin typeface="Courier New" pitchFamily="49"/>
+                <a:cs typeface="Courier New" pitchFamily="49"/>
+              </a:rPr>
+              <a:t>)		500 (</a:t>
+            </a:r>
+            <a:r>
+              <a:rPr lang="nl-NL" sz="2400" dirty="0" err="1">
+                <a:solidFill>
+                  <a:srgbClr val="00FF00"/>
+                </a:solidFill>
+                <a:latin typeface="Courier New" pitchFamily="49"/>
+                <a:cs typeface="Courier New" pitchFamily="49"/>
+              </a:rPr>
+              <a:t>Internal</a:t>
+            </a:r>
+            <a:r>
+              <a:rPr lang="nl-NL" sz="2400" dirty="0">
+                <a:solidFill>
+                  <a:srgbClr val="00FF00"/>
+                </a:solidFill>
+                <a:latin typeface="Courier New" pitchFamily="49"/>
+                <a:cs typeface="Courier New" pitchFamily="49"/>
+              </a:rPr>
+              <a:t> server error)</a:t>
             </a:r>
           </a:p>
           <a:p>
@@ -13246,74 +13640,114 @@
               <a:buNone/>
             </a:pPr>
             <a:r>
-              <a:rPr lang="nl-NL" sz="2400">
-                <a:solidFill>
-                  <a:srgbClr val="00FF00"/>
-                </a:solidFill>
-                <a:latin typeface="Courier New" pitchFamily="49"/>
-                <a:cs typeface="Courier New" pitchFamily="49"/>
-              </a:rPr>
-              <a:t>	404 (Not found)		503 (Service unavailable)</a:t>
-            </a:r>
-          </a:p>
-          <a:p>
-            <a:pPr lvl="0">
-              <a:buFont typeface="Courier New" pitchFamily="49"/>
-              <a:buChar char="_"/>
-            </a:pPr>
-            <a:endParaRPr lang="nl-NL">
-              <a:solidFill>
-                <a:srgbClr val="00FF00"/>
-              </a:solidFill>
-              <a:latin typeface="Courier New" pitchFamily="49"/>
-              <a:cs typeface="Courier New" pitchFamily="49"/>
-            </a:endParaRPr>
-          </a:p>
-          <a:p>
-            <a:pPr lvl="0">
-              <a:buFont typeface="Courier New" pitchFamily="49"/>
-              <a:buChar char="_"/>
-            </a:pPr>
-            <a:endParaRPr lang="nl-NL">
-              <a:solidFill>
-                <a:srgbClr val="00FF00"/>
-              </a:solidFill>
-              <a:latin typeface="Courier New" pitchFamily="49"/>
-              <a:cs typeface="Courier New" pitchFamily="49"/>
-            </a:endParaRPr>
-          </a:p>
-          <a:p>
-            <a:pPr lvl="0">
-              <a:buFont typeface="Courier New" pitchFamily="49"/>
-              <a:buChar char="_"/>
-            </a:pPr>
-            <a:endParaRPr lang="nl-NL">
-              <a:solidFill>
-                <a:srgbClr val="00FF00"/>
-              </a:solidFill>
-              <a:latin typeface="Courier New" pitchFamily="49"/>
-              <a:cs typeface="Courier New" pitchFamily="49"/>
-            </a:endParaRPr>
-          </a:p>
-          <a:p>
-            <a:pPr lvl="0">
-              <a:buFont typeface="Courier New" pitchFamily="49"/>
-              <a:buChar char="_"/>
-            </a:pPr>
-            <a:endParaRPr lang="nl-NL">
-              <a:solidFill>
-                <a:srgbClr val="00FF00"/>
-              </a:solidFill>
-              <a:latin typeface="Courier New" pitchFamily="49"/>
-              <a:cs typeface="Courier New" pitchFamily="49"/>
-            </a:endParaRPr>
-          </a:p>
-          <a:p>
-            <a:pPr lvl="0">
-              <a:buFont typeface="Courier New" pitchFamily="49"/>
-              <a:buChar char="_"/>
-            </a:pPr>
-            <a:endParaRPr lang="nl-NL">
+              <a:rPr lang="nl-NL" sz="2400" dirty="0">
+                <a:solidFill>
+                  <a:srgbClr val="00FF00"/>
+                </a:solidFill>
+                <a:latin typeface="Courier New" pitchFamily="49"/>
+                <a:cs typeface="Courier New" pitchFamily="49"/>
+              </a:rPr>
+              <a:t>	404 (</a:t>
+            </a:r>
+            <a:r>
+              <a:rPr lang="nl-NL" sz="2400" dirty="0" err="1">
+                <a:solidFill>
+                  <a:srgbClr val="00FF00"/>
+                </a:solidFill>
+                <a:latin typeface="Courier New" pitchFamily="49"/>
+                <a:cs typeface="Courier New" pitchFamily="49"/>
+              </a:rPr>
+              <a:t>Not</a:t>
+            </a:r>
+            <a:r>
+              <a:rPr lang="nl-NL" sz="2400" dirty="0">
+                <a:solidFill>
+                  <a:srgbClr val="00FF00"/>
+                </a:solidFill>
+                <a:latin typeface="Courier New" pitchFamily="49"/>
+                <a:cs typeface="Courier New" pitchFamily="49"/>
+              </a:rPr>
+              <a:t> found)		503 (Service </a:t>
+            </a:r>
+            <a:r>
+              <a:rPr lang="nl-NL" sz="2400" dirty="0" err="1">
+                <a:solidFill>
+                  <a:srgbClr val="00FF00"/>
+                </a:solidFill>
+                <a:latin typeface="Courier New" pitchFamily="49"/>
+                <a:cs typeface="Courier New" pitchFamily="49"/>
+              </a:rPr>
+              <a:t>unavailable</a:t>
+            </a:r>
+            <a:r>
+              <a:rPr lang="nl-NL" sz="2400" dirty="0">
+                <a:solidFill>
+                  <a:srgbClr val="00FF00"/>
+                </a:solidFill>
+                <a:latin typeface="Courier New" pitchFamily="49"/>
+                <a:cs typeface="Courier New" pitchFamily="49"/>
+              </a:rPr>
+              <a:t>)</a:t>
+            </a:r>
+          </a:p>
+          <a:p>
+            <a:pPr lvl="0">
+              <a:buFont typeface="Courier New" pitchFamily="49"/>
+              <a:buChar char="_"/>
+            </a:pPr>
+            <a:endParaRPr lang="nl-NL" dirty="0">
+              <a:solidFill>
+                <a:srgbClr val="00FF00"/>
+              </a:solidFill>
+              <a:latin typeface="Courier New" pitchFamily="49"/>
+              <a:cs typeface="Courier New" pitchFamily="49"/>
+            </a:endParaRPr>
+          </a:p>
+          <a:p>
+            <a:pPr lvl="0">
+              <a:buFont typeface="Courier New" pitchFamily="49"/>
+              <a:buChar char="_"/>
+            </a:pPr>
+            <a:endParaRPr lang="nl-NL" dirty="0">
+              <a:solidFill>
+                <a:srgbClr val="00FF00"/>
+              </a:solidFill>
+              <a:latin typeface="Courier New" pitchFamily="49"/>
+              <a:cs typeface="Courier New" pitchFamily="49"/>
+            </a:endParaRPr>
+          </a:p>
+          <a:p>
+            <a:pPr lvl="0">
+              <a:buFont typeface="Courier New" pitchFamily="49"/>
+              <a:buChar char="_"/>
+            </a:pPr>
+            <a:endParaRPr lang="nl-NL" dirty="0">
+              <a:solidFill>
+                <a:srgbClr val="00FF00"/>
+              </a:solidFill>
+              <a:latin typeface="Courier New" pitchFamily="49"/>
+              <a:cs typeface="Courier New" pitchFamily="49"/>
+            </a:endParaRPr>
+          </a:p>
+          <a:p>
+            <a:pPr lvl="0">
+              <a:buFont typeface="Courier New" pitchFamily="49"/>
+              <a:buChar char="_"/>
+            </a:pPr>
+            <a:endParaRPr lang="nl-NL" dirty="0">
+              <a:solidFill>
+                <a:srgbClr val="00FF00"/>
+              </a:solidFill>
+              <a:latin typeface="Courier New" pitchFamily="49"/>
+              <a:cs typeface="Courier New" pitchFamily="49"/>
+            </a:endParaRPr>
+          </a:p>
+          <a:p>
+            <a:pPr lvl="0">
+              <a:buFont typeface="Courier New" pitchFamily="49"/>
+              <a:buChar char="_"/>
+            </a:pPr>
+            <a:endParaRPr lang="nl-NL" dirty="0">
               <a:solidFill>
                 <a:srgbClr val="00FF00"/>
               </a:solidFill>
@@ -13443,8 +13877,8 @@
         </p:nvSpPr>
         <p:spPr>
           <a:xfrm>
-            <a:off x="838203" y="1825627"/>
-            <a:ext cx="10515600" cy="4927601"/>
+            <a:off x="838202" y="1825627"/>
+            <a:ext cx="11353797" cy="4927601"/>
           </a:xfrm>
         </p:spPr>
         <p:txBody>
@@ -13458,7 +13892,7 @@
               <a:buFont typeface="Courier New" pitchFamily="49"/>
               <a:buChar char="_"/>
             </a:pPr>
-            <a:endParaRPr lang="nl-NL">
+            <a:endParaRPr lang="nl-NL" dirty="0">
               <a:solidFill>
                 <a:srgbClr val="00FF00"/>
               </a:solidFill>
@@ -13474,7 +13908,7 @@
               <a:buFont typeface="Courier New" pitchFamily="49"/>
               <a:buChar char="_"/>
             </a:pPr>
-            <a:endParaRPr lang="nl-NL">
+            <a:endParaRPr lang="nl-NL" dirty="0">
               <a:solidFill>
                 <a:srgbClr val="00FF00"/>
               </a:solidFill>
@@ -13490,7 +13924,7 @@
               <a:buFont typeface="Courier New" pitchFamily="49"/>
               <a:buChar char="_"/>
             </a:pPr>
-            <a:endParaRPr lang="nl-NL">
+            <a:endParaRPr lang="nl-NL" dirty="0">
               <a:solidFill>
                 <a:srgbClr val="00FF00"/>
               </a:solidFill>
@@ -13506,7 +13940,7 @@
               <a:buFont typeface="Courier New" pitchFamily="49"/>
               <a:buChar char="_"/>
             </a:pPr>
-            <a:endParaRPr lang="nl-NL">
+            <a:endParaRPr lang="nl-NL" dirty="0">
               <a:solidFill>
                 <a:srgbClr val="00FF00"/>
               </a:solidFill>
@@ -13522,7 +13956,7 @@
               <a:buFont typeface="Courier New" pitchFamily="49"/>
               <a:buChar char="_"/>
             </a:pPr>
-            <a:endParaRPr lang="nl-NL">
+            <a:endParaRPr lang="nl-NL" dirty="0">
               <a:solidFill>
                 <a:srgbClr val="00FF00"/>
               </a:solidFill>
@@ -13539,15 +13973,92 @@
               <a:buChar char="_"/>
             </a:pPr>
             <a:r>
-              <a:rPr lang="nl-NL">
-                <a:solidFill>
-                  <a:srgbClr val="00FF00"/>
-                </a:solidFill>
-                <a:latin typeface="Courier New" pitchFamily="49"/>
-                <a:cs typeface="Courier New" pitchFamily="49"/>
-              </a:rPr>
-              <a:t>Other delay options:</a:t>
-            </a:r>
+              <a:rPr lang="nl-NL" dirty="0">
+                <a:solidFill>
+                  <a:srgbClr val="00FF00"/>
+                </a:solidFill>
+                <a:latin typeface="Courier New" pitchFamily="49"/>
+                <a:cs typeface="Courier New" pitchFamily="49"/>
+              </a:rPr>
+              <a:t>Random delay </a:t>
+            </a:r>
+            <a:r>
+              <a:rPr lang="nl-NL" dirty="0" err="1">
+                <a:solidFill>
+                  <a:srgbClr val="00FF00"/>
+                </a:solidFill>
+                <a:latin typeface="Courier New" pitchFamily="49"/>
+                <a:cs typeface="Courier New" pitchFamily="49"/>
+              </a:rPr>
+              <a:t>can</a:t>
+            </a:r>
+            <a:r>
+              <a:rPr lang="nl-NL" dirty="0">
+                <a:solidFill>
+                  <a:srgbClr val="00FF00"/>
+                </a:solidFill>
+                <a:latin typeface="Courier New" pitchFamily="49"/>
+                <a:cs typeface="Courier New" pitchFamily="49"/>
+              </a:rPr>
+              <a:t> </a:t>
+            </a:r>
+            <a:r>
+              <a:rPr lang="nl-NL" dirty="0" err="1">
+                <a:solidFill>
+                  <a:srgbClr val="00FF00"/>
+                </a:solidFill>
+                <a:latin typeface="Courier New" pitchFamily="49"/>
+                <a:cs typeface="Courier New" pitchFamily="49"/>
+              </a:rPr>
+              <a:t>also</a:t>
+            </a:r>
+            <a:r>
+              <a:rPr lang="nl-NL" dirty="0">
+                <a:solidFill>
+                  <a:srgbClr val="00FF00"/>
+                </a:solidFill>
+                <a:latin typeface="Courier New" pitchFamily="49"/>
+                <a:cs typeface="Courier New" pitchFamily="49"/>
+              </a:rPr>
+              <a:t> </a:t>
+            </a:r>
+            <a:r>
+              <a:rPr lang="nl-NL" dirty="0" err="1">
+                <a:solidFill>
+                  <a:srgbClr val="00FF00"/>
+                </a:solidFill>
+                <a:latin typeface="Courier New" pitchFamily="49"/>
+                <a:cs typeface="Courier New" pitchFamily="49"/>
+              </a:rPr>
+              <a:t>be</a:t>
+            </a:r>
+            <a:r>
+              <a:rPr lang="nl-NL" dirty="0">
+                <a:solidFill>
+                  <a:srgbClr val="00FF00"/>
+                </a:solidFill>
+                <a:latin typeface="Courier New" pitchFamily="49"/>
+                <a:cs typeface="Courier New" pitchFamily="49"/>
+              </a:rPr>
+              <a:t> </a:t>
+            </a:r>
+            <a:r>
+              <a:rPr lang="nl-NL" dirty="0" err="1">
+                <a:solidFill>
+                  <a:srgbClr val="00FF00"/>
+                </a:solidFill>
+                <a:latin typeface="Courier New" pitchFamily="49"/>
+                <a:cs typeface="Courier New" pitchFamily="49"/>
+              </a:rPr>
+              <a:t>used</a:t>
+            </a:r>
+            <a:endParaRPr lang="nl-NL" dirty="0">
+              <a:solidFill>
+                <a:srgbClr val="00FF00"/>
+              </a:solidFill>
+              <a:latin typeface="Courier New" pitchFamily="49"/>
+              <a:cs typeface="Courier New" pitchFamily="49"/>
+            </a:endParaRPr>
           </a:p>
           <a:p>
             <a:pPr lvl="1">
@@ -13558,34 +14069,111 @@
               <a:buChar char="_"/>
             </a:pPr>
             <a:r>
-              <a:rPr lang="nl-NL">
-                <a:solidFill>
-                  <a:srgbClr val="00FF00"/>
-                </a:solidFill>
-                <a:latin typeface="Courier New" pitchFamily="49"/>
-                <a:cs typeface="Courier New" pitchFamily="49"/>
-              </a:rPr>
-              <a:t>Random</a:t>
-            </a:r>
-          </a:p>
-          <a:p>
-            <a:pPr lvl="1">
+              <a:rPr lang="nl-NL" dirty="0">
+                <a:solidFill>
+                  <a:srgbClr val="00FF00"/>
+                </a:solidFill>
+                <a:latin typeface="Courier New" pitchFamily="49"/>
+                <a:cs typeface="Courier New" pitchFamily="49"/>
+              </a:rPr>
+              <a:t>Uniform, </a:t>
+            </a:r>
+            <a:r>
+              <a:rPr lang="nl-NL" dirty="0" err="1">
+                <a:solidFill>
+                  <a:srgbClr val="00FF00"/>
+                </a:solidFill>
+                <a:latin typeface="Courier New" pitchFamily="49"/>
+                <a:cs typeface="Courier New" pitchFamily="49"/>
+              </a:rPr>
+              <a:t>lognormal</a:t>
+            </a:r>
+            <a:r>
+              <a:rPr lang="nl-NL" dirty="0">
+                <a:solidFill>
+                  <a:srgbClr val="00FF00"/>
+                </a:solidFill>
+                <a:latin typeface="Courier New" pitchFamily="49"/>
+                <a:cs typeface="Courier New" pitchFamily="49"/>
+              </a:rPr>
+              <a:t>, </a:t>
+            </a:r>
+            <a:r>
+              <a:rPr lang="nl-NL" dirty="0" err="1">
+                <a:solidFill>
+                  <a:srgbClr val="00FF00"/>
+                </a:solidFill>
+                <a:latin typeface="Courier New" pitchFamily="49"/>
+                <a:cs typeface="Courier New" pitchFamily="49"/>
+              </a:rPr>
+              <a:t>chunked</a:t>
+            </a:r>
+            <a:r>
+              <a:rPr lang="nl-NL" dirty="0">
+                <a:solidFill>
+                  <a:srgbClr val="00FF00"/>
+                </a:solidFill>
+                <a:latin typeface="Courier New" pitchFamily="49"/>
+                <a:cs typeface="Courier New" pitchFamily="49"/>
+              </a:rPr>
+              <a:t> </a:t>
+            </a:r>
+            <a:r>
+              <a:rPr lang="nl-NL" dirty="0" err="1">
+                <a:solidFill>
+                  <a:srgbClr val="00FF00"/>
+                </a:solidFill>
+                <a:latin typeface="Courier New" pitchFamily="49"/>
+                <a:cs typeface="Courier New" pitchFamily="49"/>
+              </a:rPr>
+              <a:t>dribble</a:t>
+            </a:r>
+            <a:r>
+              <a:rPr lang="nl-NL" dirty="0">
+                <a:solidFill>
+                  <a:srgbClr val="00FF00"/>
+                </a:solidFill>
+                <a:latin typeface="Courier New" pitchFamily="49"/>
+                <a:cs typeface="Courier New" pitchFamily="49"/>
+              </a:rPr>
+              <a:t> </a:t>
+            </a:r>
+            <a:r>
+              <a:rPr lang="nl-NL" dirty="0" err="1">
+                <a:solidFill>
+                  <a:srgbClr val="00FF00"/>
+                </a:solidFill>
+                <a:latin typeface="Courier New" pitchFamily="49"/>
+                <a:cs typeface="Courier New" pitchFamily="49"/>
+              </a:rPr>
+              <a:t>distribution</a:t>
+            </a:r>
+            <a:r>
+              <a:rPr lang="nl-NL" dirty="0">
+                <a:solidFill>
+                  <a:srgbClr val="00FF00"/>
+                </a:solidFill>
+                <a:latin typeface="Courier New" pitchFamily="49"/>
+                <a:cs typeface="Courier New" pitchFamily="49"/>
+              </a:rPr>
+              <a:t> options</a:t>
+            </a:r>
+          </a:p>
+          <a:p>
+            <a:pPr lvl="0">
               <a:lnSpc>
                 <a:spcPct val="80000"/>
               </a:lnSpc>
               <a:buFont typeface="Courier New" pitchFamily="49"/>
               <a:buChar char="_"/>
             </a:pPr>
-            <a:r>
-              <a:rPr lang="nl-NL">
-                <a:solidFill>
-                  <a:srgbClr val="00FF00"/>
-                </a:solidFill>
-                <a:latin typeface="Courier New" pitchFamily="49"/>
-                <a:cs typeface="Courier New" pitchFamily="49"/>
-              </a:rPr>
-              <a:t>Uniformly distributed</a:t>
-            </a:r>
+            <a:endParaRPr lang="nl-NL" dirty="0">
+              <a:solidFill>
+                <a:srgbClr val="00FF00"/>
+              </a:solidFill>
+              <a:latin typeface="Courier New" pitchFamily="49"/>
+              <a:cs typeface="Courier New" pitchFamily="49"/>
+            </a:endParaRPr>
           </a:p>
           <a:p>
             <a:pPr lvl="0">
@@ -13595,7 +14183,97 @@
               <a:buFont typeface="Courier New" pitchFamily="49"/>
               <a:buChar char="_"/>
             </a:pPr>
-            <a:endParaRPr lang="nl-NL">
+            <a:r>
+              <a:rPr lang="nl-NL" dirty="0" err="1">
+                <a:solidFill>
+                  <a:srgbClr val="00FF00"/>
+                </a:solidFill>
+                <a:latin typeface="Courier New" pitchFamily="49"/>
+                <a:cs typeface="Courier New" pitchFamily="49"/>
+              </a:rPr>
+              <a:t>Can</a:t>
+            </a:r>
+            <a:r>
+              <a:rPr lang="nl-NL" dirty="0">
+                <a:solidFill>
+                  <a:srgbClr val="00FF00"/>
+                </a:solidFill>
+                <a:latin typeface="Courier New" pitchFamily="49"/>
+                <a:cs typeface="Courier New" pitchFamily="49"/>
+              </a:rPr>
+              <a:t> </a:t>
+            </a:r>
+            <a:r>
+              <a:rPr lang="nl-NL" dirty="0" err="1">
+                <a:solidFill>
+                  <a:srgbClr val="00FF00"/>
+                </a:solidFill>
+                <a:latin typeface="Courier New" pitchFamily="49"/>
+                <a:cs typeface="Courier New" pitchFamily="49"/>
+              </a:rPr>
+              <a:t>be</a:t>
+            </a:r>
+            <a:r>
+              <a:rPr lang="nl-NL" dirty="0">
+                <a:solidFill>
+                  <a:srgbClr val="00FF00"/>
+                </a:solidFill>
+                <a:latin typeface="Courier New" pitchFamily="49"/>
+                <a:cs typeface="Courier New" pitchFamily="49"/>
+              </a:rPr>
+              <a:t> </a:t>
+            </a:r>
+            <a:r>
+              <a:rPr lang="nl-NL" dirty="0" err="1">
+                <a:solidFill>
+                  <a:srgbClr val="00FF00"/>
+                </a:solidFill>
+                <a:latin typeface="Courier New" pitchFamily="49"/>
+                <a:cs typeface="Courier New" pitchFamily="49"/>
+              </a:rPr>
+              <a:t>configured</a:t>
+            </a:r>
+            <a:r>
+              <a:rPr lang="nl-NL" dirty="0">
+                <a:solidFill>
+                  <a:srgbClr val="00FF00"/>
+                </a:solidFill>
+                <a:latin typeface="Courier New" pitchFamily="49"/>
+                <a:cs typeface="Courier New" pitchFamily="49"/>
+              </a:rPr>
+              <a:t> on a per-</a:t>
+            </a:r>
+            <a:r>
+              <a:rPr lang="nl-NL" dirty="0" err="1">
+                <a:solidFill>
+                  <a:srgbClr val="00FF00"/>
+                </a:solidFill>
+                <a:latin typeface="Courier New" pitchFamily="49"/>
+                <a:cs typeface="Courier New" pitchFamily="49"/>
+              </a:rPr>
+              <a:t>stub</a:t>
+            </a:r>
+            <a:r>
+              <a:rPr lang="nl-NL" dirty="0">
+                <a:solidFill>
+                  <a:srgbClr val="00FF00"/>
+                </a:solidFill>
+                <a:latin typeface="Courier New" pitchFamily="49"/>
+                <a:cs typeface="Courier New" pitchFamily="49"/>
+              </a:rPr>
+              <a:t> basis as well as </a:t>
+            </a:r>
+            <a:r>
+              <a:rPr lang="nl-NL" dirty="0" err="1">
+                <a:solidFill>
+                  <a:srgbClr val="00FF00"/>
+                </a:solidFill>
+                <a:latin typeface="Courier New" pitchFamily="49"/>
+                <a:cs typeface="Courier New" pitchFamily="49"/>
+              </a:rPr>
+              <a:t>globally</a:t>
+            </a:r>
+            <a:endParaRPr lang="nl-NL" dirty="0">
               <a:solidFill>
                 <a:srgbClr val="00FF00"/>
               </a:solidFill>
@@ -13611,16 +14289,13 @@
               <a:buFont typeface="Courier New" pitchFamily="49"/>
               <a:buChar char="_"/>
             </a:pPr>
-            <a:r>
-              <a:rPr lang="nl-NL">
-                <a:solidFill>
-                  <a:srgbClr val="00FF00"/>
-                </a:solidFill>
-                <a:latin typeface="Courier New" pitchFamily="49"/>
-                <a:cs typeface="Courier New" pitchFamily="49"/>
-              </a:rPr>
-              <a:t>Can be configured on a per-stub basis as well as globally</a:t>
-            </a:r>
+            <a:endParaRPr lang="nl-NL" dirty="0">
+              <a:solidFill>
+                <a:srgbClr val="00FF00"/>
+              </a:solidFill>
+              <a:latin typeface="Courier New" pitchFamily="49"/>
+              <a:cs typeface="Courier New" pitchFamily="49"/>
+            </a:endParaRPr>
           </a:p>
           <a:p>
             <a:pPr lvl="0">
@@ -13630,7 +14305,7 @@
               <a:buFont typeface="Courier New" pitchFamily="49"/>
               <a:buChar char="_"/>
             </a:pPr>
-            <a:endParaRPr lang="nl-NL">
+            <a:endParaRPr lang="nl-NL" dirty="0">
               <a:solidFill>
                 <a:srgbClr val="00FF00"/>
               </a:solidFill>
@@ -13646,7 +14321,7 @@
               <a:buFont typeface="Courier New" pitchFamily="49"/>
               <a:buChar char="_"/>
             </a:pPr>
-            <a:endParaRPr lang="nl-NL">
+            <a:endParaRPr lang="nl-NL" dirty="0">
               <a:solidFill>
                 <a:srgbClr val="00FF00"/>
               </a:solidFill>
@@ -13662,7 +14337,7 @@
               <a:buFont typeface="Courier New" pitchFamily="49"/>
               <a:buChar char="_"/>
             </a:pPr>
-            <a:endParaRPr lang="nl-NL">
+            <a:endParaRPr lang="nl-NL" dirty="0">
               <a:solidFill>
                 <a:srgbClr val="00FF00"/>
               </a:solidFill>
@@ -13678,23 +14353,7 @@
               <a:buFont typeface="Courier New" pitchFamily="49"/>
               <a:buChar char="_"/>
             </a:pPr>
-            <a:endParaRPr lang="nl-NL">
-              <a:solidFill>
-                <a:srgbClr val="00FF00"/>
-              </a:solidFill>
-              <a:latin typeface="Courier New" pitchFamily="49"/>
-              <a:cs typeface="Courier New" pitchFamily="49"/>
-            </a:endParaRPr>
-          </a:p>
-          <a:p>
-            <a:pPr lvl="0">
-              <a:lnSpc>
-                <a:spcPct val="80000"/>
-              </a:lnSpc>
-              <a:buFont typeface="Courier New" pitchFamily="49"/>
-              <a:buChar char="_"/>
-            </a:pPr>
-            <a:endParaRPr lang="nl-NL">
+            <a:endParaRPr lang="nl-NL" dirty="0">
               <a:solidFill>
                 <a:srgbClr val="00FF00"/>
               </a:solidFill>
@@ -13824,108 +14483,140 @@
         </p:nvSpPr>
         <p:spPr>
           <a:xfrm>
-            <a:off x="838203" y="1825627"/>
-            <a:ext cx="11230157" cy="4351336"/>
+            <a:off x="838203" y="1825626"/>
+            <a:ext cx="11230157" cy="4803773"/>
           </a:xfrm>
         </p:spPr>
         <p:txBody>
-          <a:bodyPr/>
+          <a:bodyPr>
+            <a:normAutofit/>
+          </a:bodyPr>
           <a:lstStyle/>
           <a:p>
             <a:pPr lvl="0">
               <a:buFont typeface="Courier New" pitchFamily="49"/>
               <a:buChar char="_"/>
             </a:pPr>
-            <a:endParaRPr lang="nl-NL">
-              <a:solidFill>
-                <a:srgbClr val="00FF00"/>
-              </a:solidFill>
-              <a:latin typeface="Courier New" pitchFamily="49"/>
-              <a:cs typeface="Courier New" pitchFamily="49"/>
-            </a:endParaRPr>
-          </a:p>
-          <a:p>
-            <a:pPr lvl="0">
-              <a:buFont typeface="Courier New" pitchFamily="49"/>
-              <a:buChar char="_"/>
-            </a:pPr>
-            <a:endParaRPr lang="nl-NL">
-              <a:solidFill>
-                <a:srgbClr val="00FF00"/>
-              </a:solidFill>
-              <a:latin typeface="Courier New" pitchFamily="49"/>
-              <a:cs typeface="Courier New" pitchFamily="49"/>
-            </a:endParaRPr>
-          </a:p>
-          <a:p>
-            <a:pPr lvl="0">
-              <a:buFont typeface="Courier New" pitchFamily="49"/>
-              <a:buChar char="_"/>
-            </a:pPr>
-            <a:endParaRPr lang="nl-NL">
-              <a:solidFill>
-                <a:srgbClr val="00FF00"/>
-              </a:solidFill>
-              <a:latin typeface="Courier New" pitchFamily="49"/>
-              <a:cs typeface="Courier New" pitchFamily="49"/>
-            </a:endParaRPr>
-          </a:p>
-          <a:p>
-            <a:pPr lvl="0">
-              <a:buFont typeface="Courier New" pitchFamily="49"/>
-              <a:buChar char="_"/>
-            </a:pPr>
-            <a:endParaRPr lang="nl-NL">
-              <a:solidFill>
-                <a:srgbClr val="00FF00"/>
-              </a:solidFill>
-              <a:latin typeface="Courier New" pitchFamily="49"/>
-              <a:cs typeface="Courier New" pitchFamily="49"/>
-            </a:endParaRPr>
-          </a:p>
-          <a:p>
-            <a:pPr lvl="0">
-              <a:buFont typeface="Courier New" pitchFamily="49"/>
-              <a:buChar char="_"/>
-            </a:pPr>
-            <a:r>
-              <a:rPr lang="nl-NL">
-                <a:solidFill>
-                  <a:srgbClr val="00FF00"/>
-                </a:solidFill>
-                <a:latin typeface="Courier New" pitchFamily="49"/>
-                <a:cs typeface="Courier New" pitchFamily="49"/>
-              </a:rPr>
-              <a:t>HTTP status code 200, but garbage in response body</a:t>
-            </a:r>
-          </a:p>
-          <a:p>
-            <a:pPr lvl="0">
-              <a:buFont typeface="Courier New" pitchFamily="49"/>
-              <a:buChar char="_"/>
-            </a:pPr>
-            <a:endParaRPr lang="nl-NL">
-              <a:solidFill>
-                <a:srgbClr val="00FF00"/>
-              </a:solidFill>
-              <a:latin typeface="Courier New" pitchFamily="49"/>
-              <a:cs typeface="Courier New" pitchFamily="49"/>
-            </a:endParaRPr>
-          </a:p>
-          <a:p>
-            <a:pPr lvl="0">
-              <a:buFont typeface="Courier New" pitchFamily="49"/>
-              <a:buChar char="_"/>
-            </a:pPr>
-            <a:r>
-              <a:rPr lang="nl-NL">
-                <a:solidFill>
-                  <a:srgbClr val="00FF00"/>
-                </a:solidFill>
-                <a:latin typeface="Courier New" pitchFamily="49"/>
-                <a:cs typeface="Courier New" pitchFamily="49"/>
-              </a:rPr>
-              <a:t>Other options:</a:t>
+            <a:endParaRPr lang="nl-NL" dirty="0">
+              <a:solidFill>
+                <a:srgbClr val="00FF00"/>
+              </a:solidFill>
+              <a:latin typeface="Courier New" pitchFamily="49"/>
+              <a:cs typeface="Courier New" pitchFamily="49"/>
+            </a:endParaRPr>
+          </a:p>
+          <a:p>
+            <a:pPr lvl="0">
+              <a:buFont typeface="Courier New" pitchFamily="49"/>
+              <a:buChar char="_"/>
+            </a:pPr>
+            <a:endParaRPr lang="nl-NL" dirty="0">
+              <a:solidFill>
+                <a:srgbClr val="00FF00"/>
+              </a:solidFill>
+              <a:latin typeface="Courier New" pitchFamily="49"/>
+              <a:cs typeface="Courier New" pitchFamily="49"/>
+            </a:endParaRPr>
+          </a:p>
+          <a:p>
+            <a:pPr lvl="0">
+              <a:buFont typeface="Courier New" pitchFamily="49"/>
+              <a:buChar char="_"/>
+            </a:pPr>
+            <a:endParaRPr lang="nl-NL" dirty="0">
+              <a:solidFill>
+                <a:srgbClr val="00FF00"/>
+              </a:solidFill>
+              <a:latin typeface="Courier New" pitchFamily="49"/>
+              <a:cs typeface="Courier New" pitchFamily="49"/>
+            </a:endParaRPr>
+          </a:p>
+          <a:p>
+            <a:pPr lvl="0">
+              <a:buFont typeface="Courier New" pitchFamily="49"/>
+              <a:buChar char="_"/>
+            </a:pPr>
+            <a:endParaRPr lang="nl-NL" dirty="0">
+              <a:solidFill>
+                <a:srgbClr val="00FF00"/>
+              </a:solidFill>
+              <a:latin typeface="Courier New" pitchFamily="49"/>
+              <a:cs typeface="Courier New" pitchFamily="49"/>
+            </a:endParaRPr>
+          </a:p>
+          <a:p>
+            <a:pPr lvl="0">
+              <a:buFont typeface="Courier New" pitchFamily="49"/>
+              <a:buChar char="_"/>
+            </a:pPr>
+            <a:r>
+              <a:rPr lang="nl-NL" dirty="0">
+                <a:solidFill>
+                  <a:srgbClr val="00FF00"/>
+                </a:solidFill>
+                <a:latin typeface="Courier New" pitchFamily="49"/>
+                <a:cs typeface="Courier New" pitchFamily="49"/>
+              </a:rPr>
+              <a:t>HTTP status code 200, but </a:t>
+            </a:r>
+            <a:r>
+              <a:rPr lang="nl-NL" dirty="0" err="1">
+                <a:solidFill>
+                  <a:srgbClr val="00FF00"/>
+                </a:solidFill>
+                <a:latin typeface="Courier New" pitchFamily="49"/>
+                <a:cs typeface="Courier New" pitchFamily="49"/>
+              </a:rPr>
+              <a:t>garbage</a:t>
+            </a:r>
+            <a:r>
+              <a:rPr lang="nl-NL" dirty="0">
+                <a:solidFill>
+                  <a:srgbClr val="00FF00"/>
+                </a:solidFill>
+                <a:latin typeface="Courier New" pitchFamily="49"/>
+                <a:cs typeface="Courier New" pitchFamily="49"/>
+              </a:rPr>
+              <a:t> in response body</a:t>
+            </a:r>
+          </a:p>
+          <a:p>
+            <a:pPr lvl="0">
+              <a:buFont typeface="Courier New" pitchFamily="49"/>
+              <a:buChar char="_"/>
+            </a:pPr>
+            <a:endParaRPr lang="nl-NL" dirty="0">
+              <a:solidFill>
+                <a:srgbClr val="00FF00"/>
+              </a:solidFill>
+              <a:latin typeface="Courier New" pitchFamily="49"/>
+              <a:cs typeface="Courier New" pitchFamily="49"/>
+            </a:endParaRPr>
+          </a:p>
+          <a:p>
+            <a:pPr lvl="0">
+              <a:buFont typeface="Courier New" pitchFamily="49"/>
+              <a:buChar char="_"/>
+            </a:pPr>
+            <a:r>
+              <a:rPr lang="nl-NL" dirty="0" err="1">
+                <a:solidFill>
+                  <a:srgbClr val="00FF00"/>
+                </a:solidFill>
+                <a:latin typeface="Courier New" pitchFamily="49"/>
+                <a:cs typeface="Courier New" pitchFamily="49"/>
+              </a:rPr>
+              <a:t>Other</a:t>
+            </a:r>
+            <a:r>
+              <a:rPr lang="nl-NL" dirty="0">
+                <a:solidFill>
+                  <a:srgbClr val="00FF00"/>
+                </a:solidFill>
+                <a:latin typeface="Courier New" pitchFamily="49"/>
+                <a:cs typeface="Courier New" pitchFamily="49"/>
+              </a:rPr>
+              <a:t> options:</a:t>
             </a:r>
           </a:p>
           <a:p>
@@ -13934,14 +14625,34 @@
               <a:buChar char="_"/>
             </a:pPr>
             <a:r>
-              <a:rPr lang="nl-NL">
-                <a:solidFill>
-                  <a:srgbClr val="00FF00"/>
-                </a:solidFill>
-                <a:latin typeface="Courier New" pitchFamily="49"/>
-                <a:cs typeface="Courier New" pitchFamily="49"/>
-              </a:rPr>
-              <a:t>RANDOM_DATA_THEN_CLOSE (as above, without HTTP 200)</a:t>
+              <a:rPr lang="nl-NL" dirty="0">
+                <a:solidFill>
+                  <a:srgbClr val="00FF00"/>
+                </a:solidFill>
+                <a:latin typeface="Courier New" pitchFamily="49"/>
+                <a:cs typeface="Courier New" pitchFamily="49"/>
+              </a:rPr>
+              <a:t>RANDOM_DATA_THEN_CLOSE (as </a:t>
+            </a:r>
+            <a:r>
+              <a:rPr lang="nl-NL" dirty="0" err="1">
+                <a:solidFill>
+                  <a:srgbClr val="00FF00"/>
+                </a:solidFill>
+                <a:latin typeface="Courier New" pitchFamily="49"/>
+                <a:cs typeface="Courier New" pitchFamily="49"/>
+              </a:rPr>
+              <a:t>above</a:t>
+            </a:r>
+            <a:r>
+              <a:rPr lang="nl-NL" dirty="0">
+                <a:solidFill>
+                  <a:srgbClr val="00FF00"/>
+                </a:solidFill>
+                <a:latin typeface="Courier New" pitchFamily="49"/>
+                <a:cs typeface="Courier New" pitchFamily="49"/>
+              </a:rPr>
+              <a:t>, without HTTP 200)</a:t>
             </a:r>
           </a:p>
           <a:p>
@@ -13950,74 +14661,190 @@
               <a:buChar char="_"/>
             </a:pPr>
             <a:r>
-              <a:rPr lang="nl-NL">
-                <a:solidFill>
-                  <a:srgbClr val="00FF00"/>
-                </a:solidFill>
-                <a:latin typeface="Courier New" pitchFamily="49"/>
-                <a:cs typeface="Courier New" pitchFamily="49"/>
-              </a:rPr>
-              <a:t>EMPTY_RESPONSE</a:t>
-            </a:r>
-          </a:p>
-          <a:p>
-            <a:pPr lvl="0">
-              <a:buFont typeface="Courier New" pitchFamily="49"/>
-              <a:buChar char="_"/>
-            </a:pPr>
-            <a:endParaRPr lang="nl-NL">
-              <a:solidFill>
-                <a:srgbClr val="00FF00"/>
-              </a:solidFill>
-              <a:latin typeface="Courier New" pitchFamily="49"/>
-              <a:cs typeface="Courier New" pitchFamily="49"/>
-            </a:endParaRPr>
-          </a:p>
-          <a:p>
-            <a:pPr lvl="0">
-              <a:buFont typeface="Courier New" pitchFamily="49"/>
-              <a:buChar char="_"/>
-            </a:pPr>
-            <a:endParaRPr lang="nl-NL">
-              <a:solidFill>
-                <a:srgbClr val="00FF00"/>
-              </a:solidFill>
-              <a:latin typeface="Courier New" pitchFamily="49"/>
-              <a:cs typeface="Courier New" pitchFamily="49"/>
-            </a:endParaRPr>
-          </a:p>
-          <a:p>
-            <a:pPr lvl="0">
-              <a:buFont typeface="Courier New" pitchFamily="49"/>
-              <a:buChar char="_"/>
-            </a:pPr>
-            <a:endParaRPr lang="nl-NL">
-              <a:solidFill>
-                <a:srgbClr val="00FF00"/>
-              </a:solidFill>
-              <a:latin typeface="Courier New" pitchFamily="49"/>
-              <a:cs typeface="Courier New" pitchFamily="49"/>
-            </a:endParaRPr>
-          </a:p>
-          <a:p>
-            <a:pPr lvl="0">
-              <a:buFont typeface="Courier New" pitchFamily="49"/>
-              <a:buChar char="_"/>
-            </a:pPr>
-            <a:endParaRPr lang="nl-NL">
-              <a:solidFill>
-                <a:srgbClr val="00FF00"/>
-              </a:solidFill>
-              <a:latin typeface="Courier New" pitchFamily="49"/>
-              <a:cs typeface="Courier New" pitchFamily="49"/>
-            </a:endParaRPr>
-          </a:p>
-          <a:p>
-            <a:pPr lvl="0">
-              <a:buFont typeface="Courier New" pitchFamily="49"/>
-              <a:buChar char="_"/>
-            </a:pPr>
-            <a:endParaRPr lang="nl-NL">
+              <a:rPr lang="nl-NL" dirty="0">
+                <a:solidFill>
+                  <a:srgbClr val="00FF00"/>
+                </a:solidFill>
+                <a:latin typeface="Courier New" pitchFamily="49"/>
+                <a:cs typeface="Courier New" pitchFamily="49"/>
+              </a:rPr>
+              <a:t>EMPTY_RESPONSE (does </a:t>
+            </a:r>
+            <a:r>
+              <a:rPr lang="nl-NL" dirty="0" err="1">
+                <a:solidFill>
+                  <a:srgbClr val="00FF00"/>
+                </a:solidFill>
+                <a:latin typeface="Courier New" pitchFamily="49"/>
+                <a:cs typeface="Courier New" pitchFamily="49"/>
+              </a:rPr>
+              <a:t>what</a:t>
+            </a:r>
+            <a:r>
+              <a:rPr lang="nl-NL" dirty="0">
+                <a:solidFill>
+                  <a:srgbClr val="00FF00"/>
+                </a:solidFill>
+                <a:latin typeface="Courier New" pitchFamily="49"/>
+                <a:cs typeface="Courier New" pitchFamily="49"/>
+              </a:rPr>
+              <a:t> </a:t>
+            </a:r>
+            <a:r>
+              <a:rPr lang="nl-NL" dirty="0" err="1">
+                <a:solidFill>
+                  <a:srgbClr val="00FF00"/>
+                </a:solidFill>
+                <a:latin typeface="Courier New" pitchFamily="49"/>
+                <a:cs typeface="Courier New" pitchFamily="49"/>
+              </a:rPr>
+              <a:t>it</a:t>
+            </a:r>
+            <a:r>
+              <a:rPr lang="nl-NL" dirty="0">
+                <a:solidFill>
+                  <a:srgbClr val="00FF00"/>
+                </a:solidFill>
+                <a:latin typeface="Courier New" pitchFamily="49"/>
+                <a:cs typeface="Courier New" pitchFamily="49"/>
+              </a:rPr>
+              <a:t> </a:t>
+            </a:r>
+            <a:r>
+              <a:rPr lang="nl-NL" dirty="0" err="1">
+                <a:solidFill>
+                  <a:srgbClr val="00FF00"/>
+                </a:solidFill>
+                <a:latin typeface="Courier New" pitchFamily="49"/>
+                <a:cs typeface="Courier New" pitchFamily="49"/>
+              </a:rPr>
+              <a:t>says</a:t>
+            </a:r>
+            <a:r>
+              <a:rPr lang="nl-NL" dirty="0">
+                <a:solidFill>
+                  <a:srgbClr val="00FF00"/>
+                </a:solidFill>
+                <a:latin typeface="Courier New" pitchFamily="49"/>
+                <a:cs typeface="Courier New" pitchFamily="49"/>
+              </a:rPr>
+              <a:t> on </a:t>
+            </a:r>
+            <a:r>
+              <a:rPr lang="nl-NL" dirty="0" err="1">
+                <a:solidFill>
+                  <a:srgbClr val="00FF00"/>
+                </a:solidFill>
+                <a:latin typeface="Courier New" pitchFamily="49"/>
+                <a:cs typeface="Courier New" pitchFamily="49"/>
+              </a:rPr>
+              <a:t>the</a:t>
+            </a:r>
+            <a:r>
+              <a:rPr lang="nl-NL" dirty="0">
+                <a:solidFill>
+                  <a:srgbClr val="00FF00"/>
+                </a:solidFill>
+                <a:latin typeface="Courier New" pitchFamily="49"/>
+                <a:cs typeface="Courier New" pitchFamily="49"/>
+              </a:rPr>
+              <a:t> tin)</a:t>
+            </a:r>
+          </a:p>
+          <a:p>
+            <a:pPr lvl="1">
+              <a:buFont typeface="Courier New" pitchFamily="49"/>
+              <a:buChar char="_"/>
+            </a:pPr>
+            <a:r>
+              <a:rPr lang="nl-NL" dirty="0">
+                <a:solidFill>
+                  <a:srgbClr val="00FF00"/>
+                </a:solidFill>
+                <a:latin typeface="Courier New" pitchFamily="49"/>
+                <a:cs typeface="Courier New" pitchFamily="49"/>
+              </a:rPr>
+              <a:t>CONNECTION_RESET_BY_PEER (close </a:t>
+            </a:r>
+            <a:r>
+              <a:rPr lang="nl-NL" dirty="0" err="1">
+                <a:solidFill>
+                  <a:srgbClr val="00FF00"/>
+                </a:solidFill>
+                <a:latin typeface="Courier New" pitchFamily="49"/>
+                <a:cs typeface="Courier New" pitchFamily="49"/>
+              </a:rPr>
+              <a:t>connection</a:t>
+            </a:r>
+            <a:r>
+              <a:rPr lang="nl-NL" dirty="0">
+                <a:solidFill>
+                  <a:srgbClr val="00FF00"/>
+                </a:solidFill>
+                <a:latin typeface="Courier New" pitchFamily="49"/>
+                <a:cs typeface="Courier New" pitchFamily="49"/>
+              </a:rPr>
+              <a:t>, no response)</a:t>
+            </a:r>
+          </a:p>
+          <a:p>
+            <a:pPr lvl="0">
+              <a:buFont typeface="Courier New" pitchFamily="49"/>
+              <a:buChar char="_"/>
+            </a:pPr>
+            <a:endParaRPr lang="nl-NL" dirty="0">
+              <a:solidFill>
+                <a:srgbClr val="00FF00"/>
+              </a:solidFill>
+              <a:latin typeface="Courier New" pitchFamily="49"/>
+              <a:cs typeface="Courier New" pitchFamily="49"/>
+            </a:endParaRPr>
+          </a:p>
+          <a:p>
+            <a:pPr lvl="0">
+              <a:buFont typeface="Courier New" pitchFamily="49"/>
+              <a:buChar char="_"/>
+            </a:pPr>
+            <a:endParaRPr lang="nl-NL" dirty="0">
+              <a:solidFill>
+                <a:srgbClr val="00FF00"/>
+              </a:solidFill>
+              <a:latin typeface="Courier New" pitchFamily="49"/>
+              <a:cs typeface="Courier New" pitchFamily="49"/>
+            </a:endParaRPr>
+          </a:p>
+          <a:p>
+            <a:pPr lvl="0">
+              <a:buFont typeface="Courier New" pitchFamily="49"/>
+              <a:buChar char="_"/>
+            </a:pPr>
+            <a:endParaRPr lang="nl-NL" dirty="0">
+              <a:solidFill>
+                <a:srgbClr val="00FF00"/>
+              </a:solidFill>
+              <a:latin typeface="Courier New" pitchFamily="49"/>
+              <a:cs typeface="Courier New" pitchFamily="49"/>
+            </a:endParaRPr>
+          </a:p>
+          <a:p>
+            <a:pPr lvl="0">
+              <a:buFont typeface="Courier New" pitchFamily="49"/>
+              <a:buChar char="_"/>
+            </a:pPr>
+            <a:endParaRPr lang="nl-NL" dirty="0">
+              <a:solidFill>
+                <a:srgbClr val="00FF00"/>
+              </a:solidFill>
+              <a:latin typeface="Courier New" pitchFamily="49"/>
+              <a:cs typeface="Courier New" pitchFamily="49"/>
+            </a:endParaRPr>
+          </a:p>
+          <a:p>
+            <a:pPr lvl="0">
+              <a:buFont typeface="Courier New" pitchFamily="49"/>
+              <a:buChar char="_"/>
+            </a:pPr>
+            <a:endParaRPr lang="nl-NL" dirty="0">
               <a:solidFill>
                 <a:srgbClr val="00FF00"/>
               </a:solidFill>
@@ -14117,14 +14944,24 @@
           <a:p>
             <a:pPr lvl="0"/>
             <a:r>
-              <a:rPr lang="nl-NL">
-                <a:solidFill>
-                  <a:srgbClr val="00FF00"/>
-                </a:solidFill>
-                <a:latin typeface="Courier New" pitchFamily="49"/>
-                <a:cs typeface="Courier New" pitchFamily="49"/>
-              </a:rPr>
-              <a:t>Get your hands dirty!</a:t>
+              <a:rPr lang="nl-NL" dirty="0" err="1">
+                <a:solidFill>
+                  <a:srgbClr val="00FF00"/>
+                </a:solidFill>
+                <a:latin typeface="Courier New" pitchFamily="49"/>
+                <a:cs typeface="Courier New" pitchFamily="49"/>
+              </a:rPr>
+              <a:t>Exercise</a:t>
+            </a:r>
+            <a:r>
+              <a:rPr lang="nl-NL" dirty="0">
+                <a:solidFill>
+                  <a:srgbClr val="00FF00"/>
+                </a:solidFill>
+                <a:latin typeface="Courier New" pitchFamily="49"/>
+                <a:cs typeface="Courier New" pitchFamily="49"/>
+              </a:rPr>
+              <a:t> time!</a:t>
             </a:r>
           </a:p>
         </p:txBody>
@@ -14155,7 +14992,7 @@
               <a:buChar char="_"/>
             </a:pPr>
             <a:r>
-              <a:rPr lang="nl-NL">
+              <a:rPr lang="nl-NL" dirty="0">
                 <a:solidFill>
                   <a:srgbClr val="00FF00"/>
                 </a:solidFill>
@@ -14170,146 +15007,330 @@
               <a:buFont typeface="Courier New" pitchFamily="49"/>
               <a:buChar char="_"/>
             </a:pPr>
-            <a:endParaRPr lang="nl-NL">
-              <a:solidFill>
-                <a:srgbClr val="00FF00"/>
-              </a:solidFill>
-              <a:latin typeface="Courier New" pitchFamily="49"/>
-              <a:cs typeface="Courier New" pitchFamily="49"/>
-            </a:endParaRPr>
-          </a:p>
-          <a:p>
-            <a:pPr lvl="0">
-              <a:buFont typeface="Courier New" pitchFamily="49"/>
-              <a:buChar char="_"/>
-            </a:pPr>
-            <a:r>
-              <a:rPr lang="nl-NL">
-                <a:solidFill>
-                  <a:srgbClr val="00FF00"/>
-                </a:solidFill>
-                <a:latin typeface="Courier New" pitchFamily="49"/>
-                <a:cs typeface="Courier New" pitchFamily="49"/>
-              </a:rPr>
-              <a:t>Use fault simulation</a:t>
-            </a:r>
-          </a:p>
-          <a:p>
-            <a:pPr lvl="0">
-              <a:buFont typeface="Courier New" pitchFamily="49"/>
-              <a:buChar char="_"/>
-            </a:pPr>
-            <a:endParaRPr lang="nl-NL">
-              <a:solidFill>
-                <a:srgbClr val="00FF00"/>
-              </a:solidFill>
-              <a:latin typeface="Courier New" pitchFamily="49"/>
-              <a:cs typeface="Courier New" pitchFamily="49"/>
-            </a:endParaRPr>
-          </a:p>
-          <a:p>
-            <a:pPr lvl="0">
-              <a:buFont typeface="Courier New" pitchFamily="49"/>
-              <a:buChar char="_"/>
-            </a:pPr>
-            <a:r>
-              <a:rPr lang="nl-NL">
-                <a:solidFill>
-                  <a:srgbClr val="00FF00"/>
-                </a:solidFill>
-                <a:latin typeface="Courier New" pitchFamily="49"/>
-                <a:cs typeface="Courier New" pitchFamily="49"/>
-              </a:rPr>
-              <a:t>Exercises are defined in the comments</a:t>
-            </a:r>
-          </a:p>
-          <a:p>
-            <a:pPr lvl="0">
-              <a:buFont typeface="Courier New" pitchFamily="49"/>
-              <a:buChar char="_"/>
-            </a:pPr>
-            <a:endParaRPr lang="nl-NL">
-              <a:solidFill>
-                <a:srgbClr val="00FF00"/>
-              </a:solidFill>
-              <a:latin typeface="Courier New" pitchFamily="49"/>
-              <a:cs typeface="Courier New" pitchFamily="49"/>
-            </a:endParaRPr>
-          </a:p>
-          <a:p>
-            <a:pPr lvl="0">
-              <a:buFont typeface="Courier New" pitchFamily="49"/>
-              <a:buChar char="_"/>
-            </a:pPr>
-            <a:r>
-              <a:rPr lang="nl-NL">
-                <a:solidFill>
-                  <a:srgbClr val="00FF00"/>
-                </a:solidFill>
-                <a:latin typeface="Courier New" pitchFamily="49"/>
-                <a:cs typeface="Courier New" pitchFamily="49"/>
-              </a:rPr>
-              <a:t>Verify your solution by running the tests</a:t>
-            </a:r>
-          </a:p>
-          <a:p>
-            <a:pPr lvl="0">
-              <a:buFont typeface="Courier New" pitchFamily="49"/>
-              <a:buChar char="_"/>
-            </a:pPr>
-            <a:endParaRPr lang="nl-NL">
-              <a:solidFill>
-                <a:srgbClr val="00FF00"/>
-              </a:solidFill>
-              <a:latin typeface="Courier New" pitchFamily="49"/>
-              <a:cs typeface="Courier New" pitchFamily="49"/>
-            </a:endParaRPr>
-          </a:p>
-          <a:p>
-            <a:pPr lvl="0">
-              <a:buFont typeface="Courier New" pitchFamily="49"/>
-              <a:buChar char="_"/>
-            </a:pPr>
-            <a:endParaRPr lang="nl-NL">
-              <a:solidFill>
-                <a:srgbClr val="00FF00"/>
-              </a:solidFill>
-              <a:latin typeface="Courier New" pitchFamily="49"/>
-              <a:cs typeface="Courier New" pitchFamily="49"/>
-            </a:endParaRPr>
-          </a:p>
-          <a:p>
-            <a:pPr lvl="0">
-              <a:buFont typeface="Courier New" pitchFamily="49"/>
-              <a:buChar char="_"/>
-            </a:pPr>
-            <a:endParaRPr lang="nl-NL">
-              <a:solidFill>
-                <a:srgbClr val="00FF00"/>
-              </a:solidFill>
-              <a:latin typeface="Courier New" pitchFamily="49"/>
-              <a:cs typeface="Courier New" pitchFamily="49"/>
-            </a:endParaRPr>
-          </a:p>
-          <a:p>
-            <a:pPr lvl="0">
-              <a:buFont typeface="Courier New" pitchFamily="49"/>
-              <a:buChar char="_"/>
-            </a:pPr>
-            <a:endParaRPr lang="nl-NL">
-              <a:solidFill>
-                <a:srgbClr val="00FF00"/>
-              </a:solidFill>
-              <a:latin typeface="Courier New" pitchFamily="49"/>
-              <a:cs typeface="Courier New" pitchFamily="49"/>
-            </a:endParaRPr>
-          </a:p>
-          <a:p>
-            <a:pPr lvl="0">
-              <a:buFont typeface="Courier New" pitchFamily="49"/>
-              <a:buChar char="_"/>
-            </a:pPr>
-            <a:endParaRPr lang="nl-NL">
+            <a:endParaRPr lang="nl-NL" dirty="0">
+              <a:solidFill>
+                <a:srgbClr val="00FF00"/>
+              </a:solidFill>
+              <a:latin typeface="Courier New" pitchFamily="49"/>
+              <a:cs typeface="Courier New" pitchFamily="49"/>
+            </a:endParaRPr>
+          </a:p>
+          <a:p>
+            <a:pPr lvl="0">
+              <a:buFont typeface="Courier New" pitchFamily="49"/>
+              <a:buChar char="_"/>
+            </a:pPr>
+            <a:r>
+              <a:rPr lang="nl-NL" dirty="0" err="1">
+                <a:solidFill>
+                  <a:srgbClr val="00FF00"/>
+                </a:solidFill>
+                <a:latin typeface="Courier New" pitchFamily="49"/>
+                <a:cs typeface="Courier New" pitchFamily="49"/>
+              </a:rPr>
+              <a:t>Use</a:t>
+            </a:r>
+            <a:r>
+              <a:rPr lang="nl-NL" dirty="0">
+                <a:solidFill>
+                  <a:srgbClr val="00FF00"/>
+                </a:solidFill>
+                <a:latin typeface="Courier New" pitchFamily="49"/>
+                <a:cs typeface="Courier New" pitchFamily="49"/>
+              </a:rPr>
+              <a:t> </a:t>
+            </a:r>
+            <a:r>
+              <a:rPr lang="nl-NL" dirty="0" err="1">
+                <a:solidFill>
+                  <a:srgbClr val="00FF00"/>
+                </a:solidFill>
+                <a:latin typeface="Courier New" pitchFamily="49"/>
+                <a:cs typeface="Courier New" pitchFamily="49"/>
+              </a:rPr>
+              <a:t>fault</a:t>
+            </a:r>
+            <a:r>
+              <a:rPr lang="nl-NL" dirty="0">
+                <a:solidFill>
+                  <a:srgbClr val="00FF00"/>
+                </a:solidFill>
+                <a:latin typeface="Courier New" pitchFamily="49"/>
+                <a:cs typeface="Courier New" pitchFamily="49"/>
+              </a:rPr>
+              <a:t> </a:t>
+            </a:r>
+            <a:r>
+              <a:rPr lang="nl-NL" dirty="0" err="1">
+                <a:solidFill>
+                  <a:srgbClr val="00FF00"/>
+                </a:solidFill>
+                <a:latin typeface="Courier New" pitchFamily="49"/>
+                <a:cs typeface="Courier New" pitchFamily="49"/>
+              </a:rPr>
+              <a:t>simulation</a:t>
+            </a:r>
+            <a:endParaRPr lang="nl-NL" dirty="0">
+              <a:solidFill>
+                <a:srgbClr val="00FF00"/>
+              </a:solidFill>
+              <a:latin typeface="Courier New" pitchFamily="49"/>
+              <a:cs typeface="Courier New" pitchFamily="49"/>
+            </a:endParaRPr>
+          </a:p>
+          <a:p>
+            <a:pPr lvl="0">
+              <a:buFont typeface="Courier New" pitchFamily="49"/>
+              <a:buChar char="_"/>
+            </a:pPr>
+            <a:endParaRPr lang="nl-NL" dirty="0">
+              <a:solidFill>
+                <a:srgbClr val="00FF00"/>
+              </a:solidFill>
+              <a:latin typeface="Courier New" pitchFamily="49"/>
+              <a:cs typeface="Courier New" pitchFamily="49"/>
+            </a:endParaRPr>
+          </a:p>
+          <a:p>
+            <a:pPr lvl="0">
+              <a:buFont typeface="Courier New" pitchFamily="49"/>
+              <a:buChar char="_"/>
+            </a:pPr>
+            <a:r>
+              <a:rPr lang="nl-NL" dirty="0" err="1">
+                <a:solidFill>
+                  <a:srgbClr val="00FF00"/>
+                </a:solidFill>
+                <a:latin typeface="Courier New" pitchFamily="49"/>
+                <a:cs typeface="Courier New" pitchFamily="49"/>
+              </a:rPr>
+              <a:t>Exercises</a:t>
+            </a:r>
+            <a:r>
+              <a:rPr lang="nl-NL" dirty="0">
+                <a:solidFill>
+                  <a:srgbClr val="00FF00"/>
+                </a:solidFill>
+                <a:latin typeface="Courier New" pitchFamily="49"/>
+                <a:cs typeface="Courier New" pitchFamily="49"/>
+              </a:rPr>
+              <a:t> are </a:t>
+            </a:r>
+            <a:r>
+              <a:rPr lang="nl-NL" dirty="0" err="1">
+                <a:solidFill>
+                  <a:srgbClr val="00FF00"/>
+                </a:solidFill>
+                <a:latin typeface="Courier New" pitchFamily="49"/>
+                <a:cs typeface="Courier New" pitchFamily="49"/>
+              </a:rPr>
+              <a:t>defined</a:t>
+            </a:r>
+            <a:r>
+              <a:rPr lang="nl-NL" dirty="0">
+                <a:solidFill>
+                  <a:srgbClr val="00FF00"/>
+                </a:solidFill>
+                <a:latin typeface="Courier New" pitchFamily="49"/>
+                <a:cs typeface="Courier New" pitchFamily="49"/>
+              </a:rPr>
+              <a:t> in </a:t>
+            </a:r>
+            <a:r>
+              <a:rPr lang="nl-NL" dirty="0" err="1">
+                <a:solidFill>
+                  <a:srgbClr val="00FF00"/>
+                </a:solidFill>
+                <a:latin typeface="Courier New" pitchFamily="49"/>
+                <a:cs typeface="Courier New" pitchFamily="49"/>
+              </a:rPr>
+              <a:t>the</a:t>
+            </a:r>
+            <a:r>
+              <a:rPr lang="nl-NL" dirty="0">
+                <a:solidFill>
+                  <a:srgbClr val="00FF00"/>
+                </a:solidFill>
+                <a:latin typeface="Courier New" pitchFamily="49"/>
+                <a:cs typeface="Courier New" pitchFamily="49"/>
+              </a:rPr>
+              <a:t> </a:t>
+            </a:r>
+            <a:r>
+              <a:rPr lang="nl-NL" dirty="0" err="1">
+                <a:solidFill>
+                  <a:srgbClr val="00FF00"/>
+                </a:solidFill>
+                <a:latin typeface="Courier New" pitchFamily="49"/>
+                <a:cs typeface="Courier New" pitchFamily="49"/>
+              </a:rPr>
+              <a:t>comments</a:t>
+            </a:r>
+            <a:endParaRPr lang="nl-NL" dirty="0">
+              <a:solidFill>
+                <a:srgbClr val="00FF00"/>
+              </a:solidFill>
+              <a:latin typeface="Courier New" pitchFamily="49"/>
+              <a:cs typeface="Courier New" pitchFamily="49"/>
+            </a:endParaRPr>
+          </a:p>
+          <a:p>
+            <a:pPr lvl="0">
+              <a:buFont typeface="Courier New" pitchFamily="49"/>
+              <a:buChar char="_"/>
+            </a:pPr>
+            <a:endParaRPr lang="nl-NL" dirty="0">
+              <a:solidFill>
+                <a:srgbClr val="00FF00"/>
+              </a:solidFill>
+              <a:latin typeface="Courier New" pitchFamily="49"/>
+              <a:cs typeface="Courier New" pitchFamily="49"/>
+            </a:endParaRPr>
+          </a:p>
+          <a:p>
+            <a:pPr lvl="0">
+              <a:buFont typeface="Courier New" pitchFamily="49"/>
+              <a:buChar char="_"/>
+            </a:pPr>
+            <a:r>
+              <a:rPr lang="nl-NL" dirty="0" err="1">
+                <a:solidFill>
+                  <a:srgbClr val="00FF00"/>
+                </a:solidFill>
+                <a:latin typeface="Courier New" pitchFamily="49"/>
+                <a:cs typeface="Courier New" pitchFamily="49"/>
+              </a:rPr>
+              <a:t>Verify</a:t>
+            </a:r>
+            <a:r>
+              <a:rPr lang="nl-NL" dirty="0">
+                <a:solidFill>
+                  <a:srgbClr val="00FF00"/>
+                </a:solidFill>
+                <a:latin typeface="Courier New" pitchFamily="49"/>
+                <a:cs typeface="Courier New" pitchFamily="49"/>
+              </a:rPr>
+              <a:t> </a:t>
+            </a:r>
+            <a:r>
+              <a:rPr lang="nl-NL" dirty="0" err="1">
+                <a:solidFill>
+                  <a:srgbClr val="00FF00"/>
+                </a:solidFill>
+                <a:latin typeface="Courier New" pitchFamily="49"/>
+                <a:cs typeface="Courier New" pitchFamily="49"/>
+              </a:rPr>
+              <a:t>your</a:t>
+            </a:r>
+            <a:r>
+              <a:rPr lang="nl-NL" dirty="0">
+                <a:solidFill>
+                  <a:srgbClr val="00FF00"/>
+                </a:solidFill>
+                <a:latin typeface="Courier New" pitchFamily="49"/>
+                <a:cs typeface="Courier New" pitchFamily="49"/>
+              </a:rPr>
+              <a:t> solution </a:t>
+            </a:r>
+            <a:r>
+              <a:rPr lang="nl-NL" dirty="0" err="1">
+                <a:solidFill>
+                  <a:srgbClr val="00FF00"/>
+                </a:solidFill>
+                <a:latin typeface="Courier New" pitchFamily="49"/>
+                <a:cs typeface="Courier New" pitchFamily="49"/>
+              </a:rPr>
+              <a:t>by</a:t>
+            </a:r>
+            <a:r>
+              <a:rPr lang="nl-NL" dirty="0">
+                <a:solidFill>
+                  <a:srgbClr val="00FF00"/>
+                </a:solidFill>
+                <a:latin typeface="Courier New" pitchFamily="49"/>
+                <a:cs typeface="Courier New" pitchFamily="49"/>
+              </a:rPr>
+              <a:t> running </a:t>
+            </a:r>
+            <a:r>
+              <a:rPr lang="nl-NL" dirty="0" err="1">
+                <a:solidFill>
+                  <a:srgbClr val="00FF00"/>
+                </a:solidFill>
+                <a:latin typeface="Courier New" pitchFamily="49"/>
+                <a:cs typeface="Courier New" pitchFamily="49"/>
+              </a:rPr>
+              <a:t>the</a:t>
+            </a:r>
+            <a:r>
+              <a:rPr lang="nl-NL" dirty="0">
+                <a:solidFill>
+                  <a:srgbClr val="00FF00"/>
+                </a:solidFill>
+                <a:latin typeface="Courier New" pitchFamily="49"/>
+                <a:cs typeface="Courier New" pitchFamily="49"/>
+              </a:rPr>
+              <a:t> tests</a:t>
+            </a:r>
+          </a:p>
+          <a:p>
+            <a:pPr lvl="0">
+              <a:buFont typeface="Courier New" pitchFamily="49"/>
+              <a:buChar char="_"/>
+            </a:pPr>
+            <a:endParaRPr lang="nl-NL" dirty="0">
+              <a:solidFill>
+                <a:srgbClr val="00FF00"/>
+              </a:solidFill>
+              <a:latin typeface="Courier New" pitchFamily="49"/>
+              <a:cs typeface="Courier New" pitchFamily="49"/>
+            </a:endParaRPr>
+          </a:p>
+          <a:p>
+            <a:pPr lvl="0">
+              <a:buFont typeface="Courier New" pitchFamily="49"/>
+              <a:buChar char="_"/>
+            </a:pPr>
+            <a:endParaRPr lang="nl-NL" dirty="0">
+              <a:solidFill>
+                <a:srgbClr val="00FF00"/>
+              </a:solidFill>
+              <a:latin typeface="Courier New" pitchFamily="49"/>
+              <a:cs typeface="Courier New" pitchFamily="49"/>
+            </a:endParaRPr>
+          </a:p>
+          <a:p>
+            <a:pPr lvl="0">
+              <a:buFont typeface="Courier New" pitchFamily="49"/>
+              <a:buChar char="_"/>
+            </a:pPr>
+            <a:endParaRPr lang="nl-NL" dirty="0">
+              <a:solidFill>
+                <a:srgbClr val="00FF00"/>
+              </a:solidFill>
+              <a:latin typeface="Courier New" pitchFamily="49"/>
+              <a:cs typeface="Courier New" pitchFamily="49"/>
+            </a:endParaRPr>
+          </a:p>
+          <a:p>
+            <a:pPr lvl="0">
+              <a:buFont typeface="Courier New" pitchFamily="49"/>
+              <a:buChar char="_"/>
+            </a:pPr>
+            <a:endParaRPr lang="nl-NL" dirty="0">
+              <a:solidFill>
+                <a:srgbClr val="00FF00"/>
+              </a:solidFill>
+              <a:latin typeface="Courier New" pitchFamily="49"/>
+              <a:cs typeface="Courier New" pitchFamily="49"/>
+            </a:endParaRPr>
+          </a:p>
+          <a:p>
+            <a:pPr lvl="0">
+              <a:buFont typeface="Courier New" pitchFamily="49"/>
+              <a:buChar char="_"/>
+            </a:pPr>
+            <a:endParaRPr lang="nl-NL" dirty="0">
               <a:solidFill>
                 <a:srgbClr val="00FF00"/>
               </a:solidFill>

</xml_diff>